<commit_message>
ppt and other docs
</commit_message>
<xml_diff>
--- a/GenAI-2.pptx
+++ b/GenAI-2.pptx
@@ -10,6 +10,26 @@
     <p:sldId id="258" r:id="rId4"/>
     <p:sldId id="259" r:id="rId5"/>
     <p:sldId id="260" r:id="rId6"/>
+    <p:sldId id="263" r:id="rId7"/>
+    <p:sldId id="261" r:id="rId8"/>
+    <p:sldId id="262" r:id="rId9"/>
+    <p:sldId id="266" r:id="rId10"/>
+    <p:sldId id="267" r:id="rId11"/>
+    <p:sldId id="264" r:id="rId12"/>
+    <p:sldId id="279" r:id="rId13"/>
+    <p:sldId id="280" r:id="rId14"/>
+    <p:sldId id="268" r:id="rId15"/>
+    <p:sldId id="265" r:id="rId16"/>
+    <p:sldId id="277" r:id="rId17"/>
+    <p:sldId id="278" r:id="rId18"/>
+    <p:sldId id="276" r:id="rId19"/>
+    <p:sldId id="275" r:id="rId20"/>
+    <p:sldId id="269" r:id="rId21"/>
+    <p:sldId id="270" r:id="rId22"/>
+    <p:sldId id="271" r:id="rId23"/>
+    <p:sldId id="272" r:id="rId24"/>
+    <p:sldId id="273" r:id="rId25"/>
+    <p:sldId id="274" r:id="rId26"/>
   </p:sldIdLst>
   <p:sldSz cx="12192000" cy="6858000"/>
   <p:notesSz cx="6858000" cy="9144000"/>
@@ -108,6 +128,11 @@
       </a:defRPr>
     </a:lvl9pPr>
   </p:defaultTextStyle>
+  <p:extLst>
+    <p:ext uri="{EFAFB233-063F-42B5-8137-9DF3F51BA10A}">
+      <p15:sldGuideLst xmlns:p15="http://schemas.microsoft.com/office/powerpoint/2012/main"/>
+    </p:ext>
+  </p:extLst>
 </p:presentation>
 </file>
 
@@ -260,7 +285,7 @@
           <a:p>
             <a:fld id="{EB46B97A-D642-4BC0-A224-5C6F9DB818D0}" type="datetimeFigureOut">
               <a:rPr lang="en-IN" smtClean="0"/>
-              <a:t>03-09-2024</a:t>
+              <a:t>06-09-2024</a:t>
             </a:fld>
             <a:endParaRPr lang="en-IN"/>
           </a:p>
@@ -460,7 +485,7 @@
           <a:p>
             <a:fld id="{EB46B97A-D642-4BC0-A224-5C6F9DB818D0}" type="datetimeFigureOut">
               <a:rPr lang="en-IN" smtClean="0"/>
-              <a:t>03-09-2024</a:t>
+              <a:t>06-09-2024</a:t>
             </a:fld>
             <a:endParaRPr lang="en-IN"/>
           </a:p>
@@ -670,7 +695,7 @@
           <a:p>
             <a:fld id="{EB46B97A-D642-4BC0-A224-5C6F9DB818D0}" type="datetimeFigureOut">
               <a:rPr lang="en-IN" smtClean="0"/>
-              <a:t>03-09-2024</a:t>
+              <a:t>06-09-2024</a:t>
             </a:fld>
             <a:endParaRPr lang="en-IN"/>
           </a:p>
@@ -870,7 +895,7 @@
           <a:p>
             <a:fld id="{EB46B97A-D642-4BC0-A224-5C6F9DB818D0}" type="datetimeFigureOut">
               <a:rPr lang="en-IN" smtClean="0"/>
-              <a:t>03-09-2024</a:t>
+              <a:t>06-09-2024</a:t>
             </a:fld>
             <a:endParaRPr lang="en-IN"/>
           </a:p>
@@ -1146,7 +1171,7 @@
           <a:p>
             <a:fld id="{EB46B97A-D642-4BC0-A224-5C6F9DB818D0}" type="datetimeFigureOut">
               <a:rPr lang="en-IN" smtClean="0"/>
-              <a:t>03-09-2024</a:t>
+              <a:t>06-09-2024</a:t>
             </a:fld>
             <a:endParaRPr lang="en-IN"/>
           </a:p>
@@ -1414,7 +1439,7 @@
           <a:p>
             <a:fld id="{EB46B97A-D642-4BC0-A224-5C6F9DB818D0}" type="datetimeFigureOut">
               <a:rPr lang="en-IN" smtClean="0"/>
-              <a:t>03-09-2024</a:t>
+              <a:t>06-09-2024</a:t>
             </a:fld>
             <a:endParaRPr lang="en-IN"/>
           </a:p>
@@ -1829,7 +1854,7 @@
           <a:p>
             <a:fld id="{EB46B97A-D642-4BC0-A224-5C6F9DB818D0}" type="datetimeFigureOut">
               <a:rPr lang="en-IN" smtClean="0"/>
-              <a:t>03-09-2024</a:t>
+              <a:t>06-09-2024</a:t>
             </a:fld>
             <a:endParaRPr lang="en-IN"/>
           </a:p>
@@ -1971,7 +1996,7 @@
           <a:p>
             <a:fld id="{EB46B97A-D642-4BC0-A224-5C6F9DB818D0}" type="datetimeFigureOut">
               <a:rPr lang="en-IN" smtClean="0"/>
-              <a:t>03-09-2024</a:t>
+              <a:t>06-09-2024</a:t>
             </a:fld>
             <a:endParaRPr lang="en-IN"/>
           </a:p>
@@ -2084,7 +2109,7 @@
           <a:p>
             <a:fld id="{EB46B97A-D642-4BC0-A224-5C6F9DB818D0}" type="datetimeFigureOut">
               <a:rPr lang="en-IN" smtClean="0"/>
-              <a:t>03-09-2024</a:t>
+              <a:t>06-09-2024</a:t>
             </a:fld>
             <a:endParaRPr lang="en-IN"/>
           </a:p>
@@ -2397,7 +2422,7 @@
           <a:p>
             <a:fld id="{EB46B97A-D642-4BC0-A224-5C6F9DB818D0}" type="datetimeFigureOut">
               <a:rPr lang="en-IN" smtClean="0"/>
-              <a:t>03-09-2024</a:t>
+              <a:t>06-09-2024</a:t>
             </a:fld>
             <a:endParaRPr lang="en-IN"/>
           </a:p>
@@ -2686,7 +2711,7 @@
           <a:p>
             <a:fld id="{EB46B97A-D642-4BC0-A224-5C6F9DB818D0}" type="datetimeFigureOut">
               <a:rPr lang="en-IN" smtClean="0"/>
-              <a:t>03-09-2024</a:t>
+              <a:t>06-09-2024</a:t>
             </a:fld>
             <a:endParaRPr lang="en-IN"/>
           </a:p>
@@ -2929,7 +2954,7 @@
           <a:p>
             <a:fld id="{EB46B97A-D642-4BC0-A224-5C6F9DB818D0}" type="datetimeFigureOut">
               <a:rPr lang="en-IN" smtClean="0"/>
-              <a:t>03-09-2024</a:t>
+              <a:t>06-09-2024</a:t>
             </a:fld>
             <a:endParaRPr lang="en-IN"/>
           </a:p>
@@ -3413,6 +3438,1243 @@
 </p:sld>
 </file>
 
+<file path=ppt/slides/slide10.xml><?xml version="1.0" encoding="utf-8"?>
+<p:sld xmlns:a="http://schemas.openxmlformats.org/drawingml/2006/main" xmlns:r="http://schemas.openxmlformats.org/officeDocument/2006/relationships" xmlns:p="http://schemas.openxmlformats.org/presentationml/2006/main">
+  <p:cSld>
+    <p:spTree>
+      <p:nvGrpSpPr>
+        <p:cNvPr id="1" name=""/>
+        <p:cNvGrpSpPr/>
+        <p:nvPr/>
+      </p:nvGrpSpPr>
+      <p:grpSpPr>
+        <a:xfrm>
+          <a:off x="0" y="0"/>
+          <a:ext cx="0" cy="0"/>
+          <a:chOff x="0" y="0"/>
+          <a:chExt cx="0" cy="0"/>
+        </a:xfrm>
+      </p:grpSpPr>
+      <p:sp>
+        <p:nvSpPr>
+          <p:cNvPr id="2" name="Title 1">
+            <a:extLst>
+              <a:ext uri="{FF2B5EF4-FFF2-40B4-BE49-F238E27FC236}">
+                <a16:creationId xmlns:a16="http://schemas.microsoft.com/office/drawing/2014/main" id="{BC3186A3-80E4-4F73-AB7C-3600AFE61047}"/>
+              </a:ext>
+            </a:extLst>
+          </p:cNvPr>
+          <p:cNvSpPr>
+            <a:spLocks noGrp="1"/>
+          </p:cNvSpPr>
+          <p:nvPr>
+            <p:ph type="title"/>
+          </p:nvPr>
+        </p:nvSpPr>
+        <p:spPr/>
+        <p:txBody>
+          <a:bodyPr/>
+          <a:lstStyle/>
+          <a:p>
+            <a:r>
+              <a:rPr lang="en-US" dirty="0"/>
+              <a:t>Stage -1 </a:t>
+            </a:r>
+            <a:endParaRPr lang="en-IN" dirty="0"/>
+          </a:p>
+        </p:txBody>
+      </p:sp>
+      <p:sp>
+        <p:nvSpPr>
+          <p:cNvPr id="3" name="Content Placeholder 2">
+            <a:extLst>
+              <a:ext uri="{FF2B5EF4-FFF2-40B4-BE49-F238E27FC236}">
+                <a16:creationId xmlns:a16="http://schemas.microsoft.com/office/drawing/2014/main" id="{95FC7C13-0B82-4ADF-81E1-66022F7A2116}"/>
+              </a:ext>
+            </a:extLst>
+          </p:cNvPr>
+          <p:cNvSpPr>
+            <a:spLocks noGrp="1"/>
+          </p:cNvSpPr>
+          <p:nvPr>
+            <p:ph idx="1"/>
+          </p:nvPr>
+        </p:nvSpPr>
+        <p:spPr/>
+        <p:txBody>
+          <a:bodyPr>
+            <a:normAutofit fontScale="85000" lnSpcReduction="20000"/>
+          </a:bodyPr>
+          <a:lstStyle/>
+          <a:p>
+            <a:r>
+              <a:rPr lang="en-US" b="1" dirty="0">
+                <a:latin typeface="Times New Roman" panose="02020603050405020304" pitchFamily="18" charset="0"/>
+                <a:cs typeface="Times New Roman" panose="02020603050405020304" pitchFamily="18" charset="0"/>
+              </a:rPr>
+              <a:t>Pretraining (Self-Supervised Learning)</a:t>
+            </a:r>
+          </a:p>
+          <a:p>
+            <a:r>
+              <a:rPr lang="en-US" b="1" dirty="0">
+                <a:latin typeface="Times New Roman" panose="02020603050405020304" pitchFamily="18" charset="0"/>
+                <a:cs typeface="Times New Roman" panose="02020603050405020304" pitchFamily="18" charset="0"/>
+              </a:rPr>
+              <a:t>Objective:</a:t>
+            </a:r>
+            <a:r>
+              <a:rPr lang="en-US" dirty="0">
+                <a:latin typeface="Times New Roman" panose="02020603050405020304" pitchFamily="18" charset="0"/>
+                <a:cs typeface="Times New Roman" panose="02020603050405020304" pitchFamily="18" charset="0"/>
+              </a:rPr>
+              <a:t> Train the model in a self-supervised manner to predict tokens in text, learning general language patterns.</a:t>
+            </a:r>
+          </a:p>
+          <a:p>
+            <a:r>
+              <a:rPr lang="en-US" b="1" dirty="0">
+                <a:latin typeface="Times New Roman" panose="02020603050405020304" pitchFamily="18" charset="0"/>
+                <a:cs typeface="Times New Roman" panose="02020603050405020304" pitchFamily="18" charset="0"/>
+              </a:rPr>
+              <a:t>Key Components:</a:t>
+            </a:r>
+            <a:endParaRPr lang="en-US" dirty="0">
+              <a:latin typeface="Times New Roman" panose="02020603050405020304" pitchFamily="18" charset="0"/>
+              <a:cs typeface="Times New Roman" panose="02020603050405020304" pitchFamily="18" charset="0"/>
+            </a:endParaRPr>
+          </a:p>
+          <a:p>
+            <a:pPr lvl="1"/>
+            <a:r>
+              <a:rPr lang="en-US" b="1" dirty="0">
+                <a:latin typeface="Times New Roman" panose="02020603050405020304" pitchFamily="18" charset="0"/>
+                <a:cs typeface="Times New Roman" panose="02020603050405020304" pitchFamily="18" charset="0"/>
+              </a:rPr>
+              <a:t>Masked Language Modeling (MLM):</a:t>
+            </a:r>
+            <a:r>
+              <a:rPr lang="en-US" dirty="0">
+                <a:latin typeface="Times New Roman" panose="02020603050405020304" pitchFamily="18" charset="0"/>
+                <a:cs typeface="Times New Roman" panose="02020603050405020304" pitchFamily="18" charset="0"/>
+              </a:rPr>
+              <a:t> The model is trained by masking certain tokens in the input text and predicting the masked tokens. This helps the model understand context and relationships between words.</a:t>
+            </a:r>
+          </a:p>
+          <a:p>
+            <a:pPr lvl="1"/>
+            <a:r>
+              <a:rPr lang="en-US" b="1" dirty="0">
+                <a:latin typeface="Times New Roman" panose="02020603050405020304" pitchFamily="18" charset="0"/>
+                <a:cs typeface="Times New Roman" panose="02020603050405020304" pitchFamily="18" charset="0"/>
+              </a:rPr>
+              <a:t>Next Sentence Prediction (NSP):</a:t>
+            </a:r>
+            <a:r>
+              <a:rPr lang="en-US" dirty="0">
+                <a:latin typeface="Times New Roman" panose="02020603050405020304" pitchFamily="18" charset="0"/>
+                <a:cs typeface="Times New Roman" panose="02020603050405020304" pitchFamily="18" charset="0"/>
+              </a:rPr>
+              <a:t> The model learns to predict whether two sentences are consecutive. This helps in understanding text flow and relationships between sentences.</a:t>
+            </a:r>
+          </a:p>
+          <a:p>
+            <a:pPr lvl="1"/>
+            <a:r>
+              <a:rPr lang="en-US" b="1" dirty="0">
+                <a:latin typeface="Times New Roman" panose="02020603050405020304" pitchFamily="18" charset="0"/>
+                <a:cs typeface="Times New Roman" panose="02020603050405020304" pitchFamily="18" charset="0"/>
+              </a:rPr>
+              <a:t>Self-Supervised Learning:</a:t>
+            </a:r>
+            <a:r>
+              <a:rPr lang="en-US" dirty="0">
+                <a:latin typeface="Times New Roman" panose="02020603050405020304" pitchFamily="18" charset="0"/>
+                <a:cs typeface="Times New Roman" panose="02020603050405020304" pitchFamily="18" charset="0"/>
+              </a:rPr>
+              <a:t> The model learns without explicit labels, using patterns within the data to make predictions. This includes tasks like token prediction, sentence ordering, etc.</a:t>
+            </a:r>
+          </a:p>
+          <a:p>
+            <a:r>
+              <a:rPr lang="en-US" b="1" dirty="0">
+                <a:latin typeface="Times New Roman" panose="02020603050405020304" pitchFamily="18" charset="0"/>
+                <a:cs typeface="Times New Roman" panose="02020603050405020304" pitchFamily="18" charset="0"/>
+              </a:rPr>
+              <a:t>Outcome:</a:t>
+            </a:r>
+            <a:r>
+              <a:rPr lang="en-US" dirty="0">
+                <a:latin typeface="Times New Roman" panose="02020603050405020304" pitchFamily="18" charset="0"/>
+                <a:cs typeface="Times New Roman" panose="02020603050405020304" pitchFamily="18" charset="0"/>
+              </a:rPr>
+              <a:t> The model gains a general understanding of language syntax, semantics, and context. It can generate fluent text but might not be perfectly aligned with specific goals or safety concerns.</a:t>
+            </a:r>
+          </a:p>
+          <a:p>
+            <a:endParaRPr lang="en-IN" dirty="0"/>
+          </a:p>
+        </p:txBody>
+      </p:sp>
+    </p:spTree>
+    <p:extLst>
+      <p:ext uri="{BB962C8B-B14F-4D97-AF65-F5344CB8AC3E}">
+        <p14:creationId xmlns:p14="http://schemas.microsoft.com/office/powerpoint/2010/main" val="631528086"/>
+      </p:ext>
+    </p:extLst>
+  </p:cSld>
+  <p:clrMapOvr>
+    <a:masterClrMapping/>
+  </p:clrMapOvr>
+</p:sld>
+</file>
+
+<file path=ppt/slides/slide11.xml><?xml version="1.0" encoding="utf-8"?>
+<p:sld xmlns:a="http://schemas.openxmlformats.org/drawingml/2006/main" xmlns:r="http://schemas.openxmlformats.org/officeDocument/2006/relationships" xmlns:p="http://schemas.openxmlformats.org/presentationml/2006/main">
+  <p:cSld>
+    <p:spTree>
+      <p:nvGrpSpPr>
+        <p:cNvPr id="1" name=""/>
+        <p:cNvGrpSpPr/>
+        <p:nvPr/>
+      </p:nvGrpSpPr>
+      <p:grpSpPr>
+        <a:xfrm>
+          <a:off x="0" y="0"/>
+          <a:ext cx="0" cy="0"/>
+          <a:chOff x="0" y="0"/>
+          <a:chExt cx="0" cy="0"/>
+        </a:xfrm>
+      </p:grpSpPr>
+      <p:sp>
+        <p:nvSpPr>
+          <p:cNvPr id="2" name="Title 1">
+            <a:extLst>
+              <a:ext uri="{FF2B5EF4-FFF2-40B4-BE49-F238E27FC236}">
+                <a16:creationId xmlns:a16="http://schemas.microsoft.com/office/drawing/2014/main" id="{476E5186-FDAB-4B8A-8F7A-27809D40524A}"/>
+              </a:ext>
+            </a:extLst>
+          </p:cNvPr>
+          <p:cNvSpPr>
+            <a:spLocks noGrp="1"/>
+          </p:cNvSpPr>
+          <p:nvPr>
+            <p:ph type="title"/>
+          </p:nvPr>
+        </p:nvSpPr>
+        <p:spPr/>
+        <p:txBody>
+          <a:bodyPr/>
+          <a:lstStyle/>
+          <a:p>
+            <a:r>
+              <a:rPr lang="en-US" dirty="0"/>
+              <a:t>Stage 2 Supervised Fine Tuning</a:t>
+            </a:r>
+            <a:endParaRPr lang="en-IN" dirty="0"/>
+          </a:p>
+        </p:txBody>
+      </p:sp>
+      <p:pic>
+        <p:nvPicPr>
+          <p:cNvPr id="4" name="Content Placeholder 3">
+            <a:extLst>
+              <a:ext uri="{FF2B5EF4-FFF2-40B4-BE49-F238E27FC236}">
+                <a16:creationId xmlns:a16="http://schemas.microsoft.com/office/drawing/2014/main" id="{9AECA444-BB06-441E-A432-4CB6B1EFC79C}"/>
+              </a:ext>
+            </a:extLst>
+          </p:cNvPr>
+          <p:cNvPicPr>
+            <a:picLocks noGrp="1" noChangeAspect="1"/>
+          </p:cNvPicPr>
+          <p:nvPr>
+            <p:ph idx="1"/>
+          </p:nvPr>
+        </p:nvPicPr>
+        <p:blipFill>
+          <a:blip r:embed="rId2"/>
+          <a:stretch>
+            <a:fillRect/>
+          </a:stretch>
+        </p:blipFill>
+        <p:spPr>
+          <a:xfrm>
+            <a:off x="3469848" y="1825625"/>
+            <a:ext cx="5252304" cy="4351338"/>
+          </a:xfrm>
+          <a:prstGeom prst="rect">
+            <a:avLst/>
+          </a:prstGeom>
+        </p:spPr>
+      </p:pic>
+    </p:spTree>
+    <p:extLst>
+      <p:ext uri="{BB962C8B-B14F-4D97-AF65-F5344CB8AC3E}">
+        <p14:creationId xmlns:p14="http://schemas.microsoft.com/office/powerpoint/2010/main" val="3326516476"/>
+      </p:ext>
+    </p:extLst>
+  </p:cSld>
+  <p:clrMapOvr>
+    <a:masterClrMapping/>
+  </p:clrMapOvr>
+</p:sld>
+</file>
+
+<file path=ppt/slides/slide12.xml><?xml version="1.0" encoding="utf-8"?>
+<p:sld xmlns:a="http://schemas.openxmlformats.org/drawingml/2006/main" xmlns:r="http://schemas.openxmlformats.org/officeDocument/2006/relationships" xmlns:p="http://schemas.openxmlformats.org/presentationml/2006/main">
+  <p:cSld>
+    <p:spTree>
+      <p:nvGrpSpPr>
+        <p:cNvPr id="1" name=""/>
+        <p:cNvGrpSpPr/>
+        <p:nvPr/>
+      </p:nvGrpSpPr>
+      <p:grpSpPr>
+        <a:xfrm>
+          <a:off x="0" y="0"/>
+          <a:ext cx="0" cy="0"/>
+          <a:chOff x="0" y="0"/>
+          <a:chExt cx="0" cy="0"/>
+        </a:xfrm>
+      </p:grpSpPr>
+      <p:sp>
+        <p:nvSpPr>
+          <p:cNvPr id="2" name="Title 1">
+            <a:extLst>
+              <a:ext uri="{FF2B5EF4-FFF2-40B4-BE49-F238E27FC236}">
+                <a16:creationId xmlns:a16="http://schemas.microsoft.com/office/drawing/2014/main" id="{476E5186-FDAB-4B8A-8F7A-27809D40524A}"/>
+              </a:ext>
+            </a:extLst>
+          </p:cNvPr>
+          <p:cNvSpPr>
+            <a:spLocks noGrp="1"/>
+          </p:cNvSpPr>
+          <p:nvPr>
+            <p:ph type="title"/>
+          </p:nvPr>
+        </p:nvSpPr>
+        <p:spPr/>
+        <p:txBody>
+          <a:bodyPr/>
+          <a:lstStyle/>
+          <a:p>
+            <a:r>
+              <a:rPr lang="en-US" dirty="0"/>
+              <a:t>Stage 2 Supervised Fine Tuning</a:t>
+            </a:r>
+            <a:endParaRPr lang="en-IN" dirty="0"/>
+          </a:p>
+        </p:txBody>
+      </p:sp>
+      <p:sp>
+        <p:nvSpPr>
+          <p:cNvPr id="5" name="Content Placeholder 4">
+            <a:extLst>
+              <a:ext uri="{FF2B5EF4-FFF2-40B4-BE49-F238E27FC236}">
+                <a16:creationId xmlns:a16="http://schemas.microsoft.com/office/drawing/2014/main" id="{AEAB74EE-6B4C-4E37-A486-7BD41DA8B833}"/>
+              </a:ext>
+            </a:extLst>
+          </p:cNvPr>
+          <p:cNvSpPr>
+            <a:spLocks noGrp="1"/>
+          </p:cNvSpPr>
+          <p:nvPr>
+            <p:ph idx="1"/>
+          </p:nvPr>
+        </p:nvSpPr>
+        <p:spPr/>
+        <p:txBody>
+          <a:bodyPr/>
+          <a:lstStyle/>
+          <a:p>
+            <a:endParaRPr lang="en-IN"/>
+          </a:p>
+        </p:txBody>
+      </p:sp>
+    </p:spTree>
+    <p:extLst>
+      <p:ext uri="{BB962C8B-B14F-4D97-AF65-F5344CB8AC3E}">
+        <p14:creationId xmlns:p14="http://schemas.microsoft.com/office/powerpoint/2010/main" val="74455575"/>
+      </p:ext>
+    </p:extLst>
+  </p:cSld>
+  <p:clrMapOvr>
+    <a:masterClrMapping/>
+  </p:clrMapOvr>
+</p:sld>
+</file>
+
+<file path=ppt/slides/slide13.xml><?xml version="1.0" encoding="utf-8"?>
+<p:sld xmlns:a="http://schemas.openxmlformats.org/drawingml/2006/main" xmlns:r="http://schemas.openxmlformats.org/officeDocument/2006/relationships" xmlns:p="http://schemas.openxmlformats.org/presentationml/2006/main">
+  <p:cSld>
+    <p:spTree>
+      <p:nvGrpSpPr>
+        <p:cNvPr id="1" name=""/>
+        <p:cNvGrpSpPr/>
+        <p:nvPr/>
+      </p:nvGrpSpPr>
+      <p:grpSpPr>
+        <a:xfrm>
+          <a:off x="0" y="0"/>
+          <a:ext cx="0" cy="0"/>
+          <a:chOff x="0" y="0"/>
+          <a:chExt cx="0" cy="0"/>
+        </a:xfrm>
+      </p:grpSpPr>
+      <p:sp>
+        <p:nvSpPr>
+          <p:cNvPr id="2" name="Title 1">
+            <a:extLst>
+              <a:ext uri="{FF2B5EF4-FFF2-40B4-BE49-F238E27FC236}">
+                <a16:creationId xmlns:a16="http://schemas.microsoft.com/office/drawing/2014/main" id="{476E5186-FDAB-4B8A-8F7A-27809D40524A}"/>
+              </a:ext>
+            </a:extLst>
+          </p:cNvPr>
+          <p:cNvSpPr>
+            <a:spLocks noGrp="1"/>
+          </p:cNvSpPr>
+          <p:nvPr>
+            <p:ph type="title"/>
+          </p:nvPr>
+        </p:nvSpPr>
+        <p:spPr/>
+        <p:txBody>
+          <a:bodyPr/>
+          <a:lstStyle/>
+          <a:p>
+            <a:r>
+              <a:rPr lang="en-US" dirty="0"/>
+              <a:t>Stage 2 Supervised Fine Tuning</a:t>
+            </a:r>
+            <a:endParaRPr lang="en-IN" dirty="0"/>
+          </a:p>
+        </p:txBody>
+      </p:sp>
+      <p:pic>
+        <p:nvPicPr>
+          <p:cNvPr id="6" name="Picture 5">
+            <a:extLst>
+              <a:ext uri="{FF2B5EF4-FFF2-40B4-BE49-F238E27FC236}">
+                <a16:creationId xmlns:a16="http://schemas.microsoft.com/office/drawing/2014/main" id="{1549BC1C-F45A-4338-AF03-F2A06279ACAD}"/>
+              </a:ext>
+            </a:extLst>
+          </p:cNvPr>
+          <p:cNvPicPr>
+            <a:picLocks noChangeAspect="1"/>
+          </p:cNvPicPr>
+          <p:nvPr/>
+        </p:nvPicPr>
+        <p:blipFill>
+          <a:blip r:embed="rId2"/>
+          <a:stretch>
+            <a:fillRect/>
+          </a:stretch>
+        </p:blipFill>
+        <p:spPr>
+          <a:xfrm>
+            <a:off x="2125788" y="1825625"/>
+            <a:ext cx="7563906" cy="4534533"/>
+          </a:xfrm>
+          <a:prstGeom prst="rect">
+            <a:avLst/>
+          </a:prstGeom>
+        </p:spPr>
+      </p:pic>
+    </p:spTree>
+    <p:extLst>
+      <p:ext uri="{BB962C8B-B14F-4D97-AF65-F5344CB8AC3E}">
+        <p14:creationId xmlns:p14="http://schemas.microsoft.com/office/powerpoint/2010/main" val="734857718"/>
+      </p:ext>
+    </p:extLst>
+  </p:cSld>
+  <p:clrMapOvr>
+    <a:masterClrMapping/>
+  </p:clrMapOvr>
+</p:sld>
+</file>
+
+<file path=ppt/slides/slide14.xml><?xml version="1.0" encoding="utf-8"?>
+<p:sld xmlns:a="http://schemas.openxmlformats.org/drawingml/2006/main" xmlns:r="http://schemas.openxmlformats.org/officeDocument/2006/relationships" xmlns:p="http://schemas.openxmlformats.org/presentationml/2006/main">
+  <p:cSld>
+    <p:spTree>
+      <p:nvGrpSpPr>
+        <p:cNvPr id="1" name=""/>
+        <p:cNvGrpSpPr/>
+        <p:nvPr/>
+      </p:nvGrpSpPr>
+      <p:grpSpPr>
+        <a:xfrm>
+          <a:off x="0" y="0"/>
+          <a:ext cx="0" cy="0"/>
+          <a:chOff x="0" y="0"/>
+          <a:chExt cx="0" cy="0"/>
+        </a:xfrm>
+      </p:grpSpPr>
+      <p:sp>
+        <p:nvSpPr>
+          <p:cNvPr id="2" name="Title 1">
+            <a:extLst>
+              <a:ext uri="{FF2B5EF4-FFF2-40B4-BE49-F238E27FC236}">
+                <a16:creationId xmlns:a16="http://schemas.microsoft.com/office/drawing/2014/main" id="{D45250ED-7944-4139-BB6E-4565843B139B}"/>
+              </a:ext>
+            </a:extLst>
+          </p:cNvPr>
+          <p:cNvSpPr>
+            <a:spLocks noGrp="1"/>
+          </p:cNvSpPr>
+          <p:nvPr>
+            <p:ph type="title"/>
+          </p:nvPr>
+        </p:nvSpPr>
+        <p:spPr/>
+        <p:txBody>
+          <a:bodyPr/>
+          <a:lstStyle/>
+          <a:p>
+            <a:r>
+              <a:rPr lang="en-US" dirty="0"/>
+              <a:t>Stage -2 </a:t>
+            </a:r>
+            <a:r>
+              <a:rPr lang="en-IN" dirty="0"/>
+              <a:t>Supervised Fine-Tuning (SFT)</a:t>
+            </a:r>
+          </a:p>
+        </p:txBody>
+      </p:sp>
+      <p:sp>
+        <p:nvSpPr>
+          <p:cNvPr id="5" name="Content Placeholder 4">
+            <a:extLst>
+              <a:ext uri="{FF2B5EF4-FFF2-40B4-BE49-F238E27FC236}">
+                <a16:creationId xmlns:a16="http://schemas.microsoft.com/office/drawing/2014/main" id="{2339203B-1B9B-4546-94E0-3DBD21A7C951}"/>
+              </a:ext>
+            </a:extLst>
+          </p:cNvPr>
+          <p:cNvSpPr>
+            <a:spLocks noGrp="1"/>
+          </p:cNvSpPr>
+          <p:nvPr>
+            <p:ph idx="1"/>
+          </p:nvPr>
+        </p:nvSpPr>
+        <p:spPr/>
+        <p:txBody>
+          <a:bodyPr>
+            <a:noAutofit/>
+          </a:bodyPr>
+          <a:lstStyle/>
+          <a:p>
+            <a:r>
+              <a:rPr lang="en-US" sz="1400" dirty="0">
+                <a:latin typeface="Times New Roman" panose="02020603050405020304" pitchFamily="18" charset="0"/>
+                <a:cs typeface="Times New Roman" panose="02020603050405020304" pitchFamily="18" charset="0"/>
+              </a:rPr>
+              <a:t>In Stage 2, the primary goal is to </a:t>
+            </a:r>
+            <a:r>
+              <a:rPr lang="en-US" sz="1400" b="1" dirty="0">
+                <a:latin typeface="Times New Roman" panose="02020603050405020304" pitchFamily="18" charset="0"/>
+                <a:cs typeface="Times New Roman" panose="02020603050405020304" pitchFamily="18" charset="0"/>
+              </a:rPr>
+              <a:t>fine-tune</a:t>
+            </a:r>
+            <a:r>
+              <a:rPr lang="en-US" sz="1400" dirty="0">
+                <a:latin typeface="Times New Roman" panose="02020603050405020304" pitchFamily="18" charset="0"/>
+                <a:cs typeface="Times New Roman" panose="02020603050405020304" pitchFamily="18" charset="0"/>
+              </a:rPr>
+              <a:t> the pretrained model using </a:t>
+            </a:r>
+            <a:r>
+              <a:rPr lang="en-US" sz="1400" b="1" dirty="0">
+                <a:latin typeface="Times New Roman" panose="02020603050405020304" pitchFamily="18" charset="0"/>
+                <a:cs typeface="Times New Roman" panose="02020603050405020304" pitchFamily="18" charset="0"/>
+              </a:rPr>
+              <a:t>Supervised Fine-Tuning (SFT)</a:t>
+            </a:r>
+            <a:r>
+              <a:rPr lang="en-US" sz="1400" dirty="0">
+                <a:latin typeface="Times New Roman" panose="02020603050405020304" pitchFamily="18" charset="0"/>
+                <a:cs typeface="Times New Roman" panose="02020603050405020304" pitchFamily="18" charset="0"/>
+              </a:rPr>
+              <a:t>. This involves human annotators carefully crafting responses that align with how a model should ideally respond to specific requests or prompts. The purpose is to align the pretrained model more closely with specific tasks and scenarios, making its responses more structured, coherent, and contextually appropriate.</a:t>
+            </a:r>
+            <a:r>
+              <a:rPr lang="en-US" sz="1400" b="1" dirty="0">
+                <a:latin typeface="Times New Roman" panose="02020603050405020304" pitchFamily="18" charset="0"/>
+                <a:cs typeface="Times New Roman" panose="02020603050405020304" pitchFamily="18" charset="0"/>
+              </a:rPr>
+              <a:t> </a:t>
+            </a:r>
+          </a:p>
+          <a:p>
+            <a:endParaRPr lang="en-US" sz="1400" b="1" dirty="0">
+              <a:latin typeface="Times New Roman" panose="02020603050405020304" pitchFamily="18" charset="0"/>
+              <a:cs typeface="Times New Roman" panose="02020603050405020304" pitchFamily="18" charset="0"/>
+            </a:endParaRPr>
+          </a:p>
+          <a:p>
+            <a:pPr marL="0" indent="0">
+              <a:buNone/>
+            </a:pPr>
+            <a:r>
+              <a:rPr lang="en-US" sz="1400" b="1" dirty="0">
+                <a:latin typeface="Times New Roman" panose="02020603050405020304" pitchFamily="18" charset="0"/>
+                <a:cs typeface="Times New Roman" panose="02020603050405020304" pitchFamily="18" charset="0"/>
+              </a:rPr>
+              <a:t>Components of Stage 2:</a:t>
+            </a:r>
+          </a:p>
+          <a:p>
+            <a:r>
+              <a:rPr lang="en-US" sz="1400" b="1" dirty="0">
+                <a:latin typeface="Times New Roman" panose="02020603050405020304" pitchFamily="18" charset="0"/>
+                <a:cs typeface="Times New Roman" panose="02020603050405020304" pitchFamily="18" charset="0"/>
+              </a:rPr>
+              <a:t>Crafted Conversations:</a:t>
+            </a:r>
+            <a:endParaRPr lang="en-US" sz="1400" dirty="0">
+              <a:latin typeface="Times New Roman" panose="02020603050405020304" pitchFamily="18" charset="0"/>
+              <a:cs typeface="Times New Roman" panose="02020603050405020304" pitchFamily="18" charset="0"/>
+            </a:endParaRPr>
+          </a:p>
+          <a:p>
+            <a:pPr lvl="1"/>
+            <a:r>
+              <a:rPr lang="en-US" sz="1400" dirty="0">
+                <a:latin typeface="Times New Roman" panose="02020603050405020304" pitchFamily="18" charset="0"/>
+                <a:cs typeface="Times New Roman" panose="02020603050405020304" pitchFamily="18" charset="0"/>
+              </a:rPr>
+              <a:t>The process begins with </a:t>
+            </a:r>
+            <a:r>
+              <a:rPr lang="en-US" sz="1400" b="1" dirty="0">
+                <a:latin typeface="Times New Roman" panose="02020603050405020304" pitchFamily="18" charset="0"/>
+                <a:cs typeface="Times New Roman" panose="02020603050405020304" pitchFamily="18" charset="0"/>
+              </a:rPr>
+              <a:t>human agents</a:t>
+            </a:r>
+            <a:r>
+              <a:rPr lang="en-US" sz="1400" dirty="0">
+                <a:latin typeface="Times New Roman" panose="02020603050405020304" pitchFamily="18" charset="0"/>
+                <a:cs typeface="Times New Roman" panose="02020603050405020304" pitchFamily="18" charset="0"/>
+              </a:rPr>
+              <a:t> engaging in conversations where one human acts like a chatbot. This human provides responses as if they were an "ideal bot," offering the perfect next response to each request </a:t>
+            </a:r>
+          </a:p>
+          <a:p>
+            <a:pPr lvl="1"/>
+            <a:r>
+              <a:rPr lang="en-US" sz="1400" b="1" dirty="0">
+                <a:latin typeface="Times New Roman" panose="02020603050405020304" pitchFamily="18" charset="0"/>
+                <a:cs typeface="Times New Roman" panose="02020603050405020304" pitchFamily="18" charset="0"/>
+              </a:rPr>
+              <a:t>Request-Response Pairing:</a:t>
+            </a:r>
+            <a:r>
+              <a:rPr lang="en-US" sz="1400" dirty="0">
+                <a:latin typeface="Times New Roman" panose="02020603050405020304" pitchFamily="18" charset="0"/>
+                <a:cs typeface="Times New Roman" panose="02020603050405020304" pitchFamily="18" charset="0"/>
+              </a:rPr>
+              <a:t> The human annotator provides responses to multiple requests, which help generate the </a:t>
+            </a:r>
+            <a:r>
+              <a:rPr lang="en-US" sz="1400" b="1" dirty="0">
+                <a:latin typeface="Times New Roman" panose="02020603050405020304" pitchFamily="18" charset="0"/>
+                <a:cs typeface="Times New Roman" panose="02020603050405020304" pitchFamily="18" charset="0"/>
+              </a:rPr>
+              <a:t>ideal response</a:t>
+            </a:r>
+            <a:r>
+              <a:rPr lang="en-US" sz="1400" dirty="0">
+                <a:latin typeface="Times New Roman" panose="02020603050405020304" pitchFamily="18" charset="0"/>
+                <a:cs typeface="Times New Roman" panose="02020603050405020304" pitchFamily="18" charset="0"/>
+              </a:rPr>
+              <a:t> for the training data. These conversations form the </a:t>
+            </a:r>
+            <a:r>
+              <a:rPr lang="en-US" sz="1400" b="1" dirty="0">
+                <a:latin typeface="Times New Roman" panose="02020603050405020304" pitchFamily="18" charset="0"/>
+                <a:cs typeface="Times New Roman" panose="02020603050405020304" pitchFamily="18" charset="0"/>
+              </a:rPr>
+              <a:t>SFT Training Data Corpus</a:t>
+            </a:r>
+            <a:r>
+              <a:rPr lang="en-US" sz="1400" dirty="0">
+                <a:latin typeface="Times New Roman" panose="02020603050405020304" pitchFamily="18" charset="0"/>
+                <a:cs typeface="Times New Roman" panose="02020603050405020304" pitchFamily="18" charset="0"/>
+              </a:rPr>
+              <a:t>, where each request has its ideal answer.</a:t>
+            </a:r>
+          </a:p>
+          <a:p>
+            <a:r>
+              <a:rPr lang="en-US" sz="1400" b="1" dirty="0">
+                <a:latin typeface="Times New Roman" panose="02020603050405020304" pitchFamily="18" charset="0"/>
+                <a:cs typeface="Times New Roman" panose="02020603050405020304" pitchFamily="18" charset="0"/>
+              </a:rPr>
+              <a:t>Supervised Learning:</a:t>
+            </a:r>
+            <a:endParaRPr lang="en-US" sz="1400" dirty="0">
+              <a:latin typeface="Times New Roman" panose="02020603050405020304" pitchFamily="18" charset="0"/>
+              <a:cs typeface="Times New Roman" panose="02020603050405020304" pitchFamily="18" charset="0"/>
+            </a:endParaRPr>
+          </a:p>
+          <a:p>
+            <a:pPr lvl="1"/>
+            <a:r>
+              <a:rPr lang="en-US" sz="1400" dirty="0">
+                <a:latin typeface="Times New Roman" panose="02020603050405020304" pitchFamily="18" charset="0"/>
+                <a:cs typeface="Times New Roman" panose="02020603050405020304" pitchFamily="18" charset="0"/>
+              </a:rPr>
+              <a:t>The conversation data is fed into the </a:t>
+            </a:r>
+            <a:r>
+              <a:rPr lang="en-US" sz="1400" b="1" dirty="0">
+                <a:latin typeface="Times New Roman" panose="02020603050405020304" pitchFamily="18" charset="0"/>
+                <a:cs typeface="Times New Roman" panose="02020603050405020304" pitchFamily="18" charset="0"/>
+              </a:rPr>
+              <a:t>Base GPT model</a:t>
+            </a:r>
+            <a:r>
+              <a:rPr lang="en-US" sz="1400" dirty="0">
+                <a:latin typeface="Times New Roman" panose="02020603050405020304" pitchFamily="18" charset="0"/>
+                <a:cs typeface="Times New Roman" panose="02020603050405020304" pitchFamily="18" charset="0"/>
+              </a:rPr>
+              <a:t>, and an optimization algorithm like </a:t>
+            </a:r>
+            <a:r>
+              <a:rPr lang="en-US" sz="1400" b="1" dirty="0">
+                <a:latin typeface="Times New Roman" panose="02020603050405020304" pitchFamily="18" charset="0"/>
+                <a:cs typeface="Times New Roman" panose="02020603050405020304" pitchFamily="18" charset="0"/>
+              </a:rPr>
+              <a:t>Stochastic Gradient Descent (SGD)</a:t>
+            </a:r>
+            <a:r>
+              <a:rPr lang="en-US" sz="1400" dirty="0">
+                <a:latin typeface="Times New Roman" panose="02020603050405020304" pitchFamily="18" charset="0"/>
+                <a:cs typeface="Times New Roman" panose="02020603050405020304" pitchFamily="18" charset="0"/>
+              </a:rPr>
+              <a:t> is used to fine-tune the model.</a:t>
+            </a:r>
+          </a:p>
+          <a:p>
+            <a:pPr lvl="1"/>
+            <a:r>
+              <a:rPr lang="en-US" sz="1400" dirty="0">
+                <a:latin typeface="Times New Roman" panose="02020603050405020304" pitchFamily="18" charset="0"/>
+                <a:cs typeface="Times New Roman" panose="02020603050405020304" pitchFamily="18" charset="0"/>
+              </a:rPr>
+              <a:t>During training, the model is adjusted to learn the correct responses for given conversation histories, matching them with the </a:t>
+            </a:r>
+            <a:r>
+              <a:rPr lang="en-US" sz="1400" b="1" dirty="0">
+                <a:latin typeface="Times New Roman" panose="02020603050405020304" pitchFamily="18" charset="0"/>
+                <a:cs typeface="Times New Roman" panose="02020603050405020304" pitchFamily="18" charset="0"/>
+              </a:rPr>
+              <a:t>ideal next response</a:t>
+            </a:r>
+            <a:r>
+              <a:rPr lang="en-US" sz="1400" dirty="0">
+                <a:latin typeface="Times New Roman" panose="02020603050405020304" pitchFamily="18" charset="0"/>
+                <a:cs typeface="Times New Roman" panose="02020603050405020304" pitchFamily="18" charset="0"/>
+              </a:rPr>
+              <a:t>. This supervised process helps the model learn to mimic high-quality, human-like responses.</a:t>
+            </a:r>
+          </a:p>
+          <a:p>
+            <a:r>
+              <a:rPr lang="en-US" sz="1400" b="1" dirty="0">
+                <a:latin typeface="Times New Roman" panose="02020603050405020304" pitchFamily="18" charset="0"/>
+                <a:cs typeface="Times New Roman" panose="02020603050405020304" pitchFamily="18" charset="0"/>
+              </a:rPr>
+              <a:t>SFT Model Output:</a:t>
+            </a:r>
+            <a:endParaRPr lang="en-US" sz="1400" dirty="0">
+              <a:latin typeface="Times New Roman" panose="02020603050405020304" pitchFamily="18" charset="0"/>
+              <a:cs typeface="Times New Roman" panose="02020603050405020304" pitchFamily="18" charset="0"/>
+            </a:endParaRPr>
+          </a:p>
+          <a:p>
+            <a:pPr lvl="1"/>
+            <a:r>
+              <a:rPr lang="en-US" sz="1400" dirty="0">
+                <a:latin typeface="Times New Roman" panose="02020603050405020304" pitchFamily="18" charset="0"/>
+                <a:cs typeface="Times New Roman" panose="02020603050405020304" pitchFamily="18" charset="0"/>
+              </a:rPr>
+              <a:t>After SFT, the model produces a </a:t>
+            </a:r>
+            <a:r>
+              <a:rPr lang="en-US" sz="1400" b="1" dirty="0">
+                <a:latin typeface="Times New Roman" panose="02020603050405020304" pitchFamily="18" charset="0"/>
+                <a:cs typeface="Times New Roman" panose="02020603050405020304" pitchFamily="18" charset="0"/>
+              </a:rPr>
+              <a:t>SFT </a:t>
+            </a:r>
+            <a:r>
+              <a:rPr lang="en-US" sz="1400" b="1" dirty="0" err="1">
+                <a:latin typeface="Times New Roman" panose="02020603050405020304" pitchFamily="18" charset="0"/>
+                <a:cs typeface="Times New Roman" panose="02020603050405020304" pitchFamily="18" charset="0"/>
+              </a:rPr>
+              <a:t>ChatGPT</a:t>
+            </a:r>
+            <a:r>
+              <a:rPr lang="en-US" sz="1400" b="1" dirty="0">
+                <a:latin typeface="Times New Roman" panose="02020603050405020304" pitchFamily="18" charset="0"/>
+                <a:cs typeface="Times New Roman" panose="02020603050405020304" pitchFamily="18" charset="0"/>
+              </a:rPr>
+              <a:t> model</a:t>
+            </a:r>
+            <a:r>
+              <a:rPr lang="en-US" sz="1400" dirty="0">
+                <a:latin typeface="Times New Roman" panose="02020603050405020304" pitchFamily="18" charset="0"/>
+                <a:cs typeface="Times New Roman" panose="02020603050405020304" pitchFamily="18" charset="0"/>
+              </a:rPr>
+              <a:t>. This version of the model can respond more accurately and coherently to specific queries. It’s tailored for better task-specific performance, such as handling questions on policies, employee benefits, or other business-related tasks.</a:t>
+            </a:r>
+          </a:p>
+          <a:p>
+            <a:endParaRPr lang="en-IN" sz="1400" dirty="0">
+              <a:latin typeface="Times New Roman" panose="02020603050405020304" pitchFamily="18" charset="0"/>
+              <a:cs typeface="Times New Roman" panose="02020603050405020304" pitchFamily="18" charset="0"/>
+            </a:endParaRPr>
+          </a:p>
+        </p:txBody>
+      </p:sp>
+    </p:spTree>
+    <p:extLst>
+      <p:ext uri="{BB962C8B-B14F-4D97-AF65-F5344CB8AC3E}">
+        <p14:creationId xmlns:p14="http://schemas.microsoft.com/office/powerpoint/2010/main" val="2276163422"/>
+      </p:ext>
+    </p:extLst>
+  </p:cSld>
+  <p:clrMapOvr>
+    <a:masterClrMapping/>
+  </p:clrMapOvr>
+</p:sld>
+</file>
+
+<file path=ppt/slides/slide15.xml><?xml version="1.0" encoding="utf-8"?>
+<p:sld xmlns:a="http://schemas.openxmlformats.org/drawingml/2006/main" xmlns:r="http://schemas.openxmlformats.org/officeDocument/2006/relationships" xmlns:p="http://schemas.openxmlformats.org/presentationml/2006/main">
+  <p:cSld>
+    <p:spTree>
+      <p:nvGrpSpPr>
+        <p:cNvPr id="1" name=""/>
+        <p:cNvGrpSpPr/>
+        <p:nvPr/>
+      </p:nvGrpSpPr>
+      <p:grpSpPr>
+        <a:xfrm>
+          <a:off x="0" y="0"/>
+          <a:ext cx="0" cy="0"/>
+          <a:chOff x="0" y="0"/>
+          <a:chExt cx="0" cy="0"/>
+        </a:xfrm>
+      </p:grpSpPr>
+      <p:sp>
+        <p:nvSpPr>
+          <p:cNvPr id="2" name="Title 1">
+            <a:extLst>
+              <a:ext uri="{FF2B5EF4-FFF2-40B4-BE49-F238E27FC236}">
+                <a16:creationId xmlns:a16="http://schemas.microsoft.com/office/drawing/2014/main" id="{D458CE39-E1C4-4723-8FA6-B8B02FE2F019}"/>
+              </a:ext>
+            </a:extLst>
+          </p:cNvPr>
+          <p:cNvSpPr>
+            <a:spLocks noGrp="1"/>
+          </p:cNvSpPr>
+          <p:nvPr>
+            <p:ph type="title"/>
+          </p:nvPr>
+        </p:nvSpPr>
+        <p:spPr/>
+        <p:txBody>
+          <a:bodyPr/>
+          <a:lstStyle/>
+          <a:p>
+            <a:r>
+              <a:rPr lang="en-US" dirty="0"/>
+              <a:t>Stage -2 </a:t>
+            </a:r>
+            <a:endParaRPr lang="en-IN" dirty="0"/>
+          </a:p>
+        </p:txBody>
+      </p:sp>
+      <p:sp>
+        <p:nvSpPr>
+          <p:cNvPr id="5" name="Content Placeholder 4">
+            <a:extLst>
+              <a:ext uri="{FF2B5EF4-FFF2-40B4-BE49-F238E27FC236}">
+                <a16:creationId xmlns:a16="http://schemas.microsoft.com/office/drawing/2014/main" id="{41411D7C-95FD-40CC-ACA4-54C20D7A3574}"/>
+              </a:ext>
+            </a:extLst>
+          </p:cNvPr>
+          <p:cNvSpPr>
+            <a:spLocks noGrp="1"/>
+          </p:cNvSpPr>
+          <p:nvPr>
+            <p:ph idx="1"/>
+          </p:nvPr>
+        </p:nvSpPr>
+        <p:spPr/>
+        <p:txBody>
+          <a:bodyPr/>
+          <a:lstStyle/>
+          <a:p>
+            <a:endParaRPr lang="en-IN"/>
+          </a:p>
+        </p:txBody>
+      </p:sp>
+    </p:spTree>
+    <p:extLst>
+      <p:ext uri="{BB962C8B-B14F-4D97-AF65-F5344CB8AC3E}">
+        <p14:creationId xmlns:p14="http://schemas.microsoft.com/office/powerpoint/2010/main" val="136493357"/>
+      </p:ext>
+    </p:extLst>
+  </p:cSld>
+  <p:clrMapOvr>
+    <a:masterClrMapping/>
+  </p:clrMapOvr>
+</p:sld>
+</file>
+
+<file path=ppt/slides/slide16.xml><?xml version="1.0" encoding="utf-8"?>
+<p:sld xmlns:a="http://schemas.openxmlformats.org/drawingml/2006/main" xmlns:r="http://schemas.openxmlformats.org/officeDocument/2006/relationships" xmlns:p="http://schemas.openxmlformats.org/presentationml/2006/main">
+  <p:cSld>
+    <p:spTree>
+      <p:nvGrpSpPr>
+        <p:cNvPr id="1" name=""/>
+        <p:cNvGrpSpPr/>
+        <p:nvPr/>
+      </p:nvGrpSpPr>
+      <p:grpSpPr>
+        <a:xfrm>
+          <a:off x="0" y="0"/>
+          <a:ext cx="0" cy="0"/>
+          <a:chOff x="0" y="0"/>
+          <a:chExt cx="0" cy="0"/>
+        </a:xfrm>
+      </p:grpSpPr>
+      <p:sp>
+        <p:nvSpPr>
+          <p:cNvPr id="2" name="Title 1">
+            <a:extLst>
+              <a:ext uri="{FF2B5EF4-FFF2-40B4-BE49-F238E27FC236}">
+                <a16:creationId xmlns:a16="http://schemas.microsoft.com/office/drawing/2014/main" id="{D458CE39-E1C4-4723-8FA6-B8B02FE2F019}"/>
+              </a:ext>
+            </a:extLst>
+          </p:cNvPr>
+          <p:cNvSpPr>
+            <a:spLocks noGrp="1"/>
+          </p:cNvSpPr>
+          <p:nvPr>
+            <p:ph type="title"/>
+          </p:nvPr>
+        </p:nvSpPr>
+        <p:spPr/>
+        <p:txBody>
+          <a:bodyPr/>
+          <a:lstStyle/>
+          <a:p>
+            <a:r>
+              <a:rPr lang="en-US" dirty="0"/>
+              <a:t>Stage -2 </a:t>
+            </a:r>
+            <a:endParaRPr lang="en-IN" dirty="0"/>
+          </a:p>
+        </p:txBody>
+      </p:sp>
+      <p:sp>
+        <p:nvSpPr>
+          <p:cNvPr id="5" name="Content Placeholder 4">
+            <a:extLst>
+              <a:ext uri="{FF2B5EF4-FFF2-40B4-BE49-F238E27FC236}">
+                <a16:creationId xmlns:a16="http://schemas.microsoft.com/office/drawing/2014/main" id="{41411D7C-95FD-40CC-ACA4-54C20D7A3574}"/>
+              </a:ext>
+            </a:extLst>
+          </p:cNvPr>
+          <p:cNvSpPr>
+            <a:spLocks noGrp="1"/>
+          </p:cNvSpPr>
+          <p:nvPr>
+            <p:ph idx="1"/>
+          </p:nvPr>
+        </p:nvSpPr>
+        <p:spPr/>
+        <p:txBody>
+          <a:bodyPr/>
+          <a:lstStyle/>
+          <a:p>
+            <a:endParaRPr lang="en-IN"/>
+          </a:p>
+        </p:txBody>
+      </p:sp>
+    </p:spTree>
+    <p:extLst>
+      <p:ext uri="{BB962C8B-B14F-4D97-AF65-F5344CB8AC3E}">
+        <p14:creationId xmlns:p14="http://schemas.microsoft.com/office/powerpoint/2010/main" val="3451504258"/>
+      </p:ext>
+    </p:extLst>
+  </p:cSld>
+  <p:clrMapOvr>
+    <a:masterClrMapping/>
+  </p:clrMapOvr>
+</p:sld>
+</file>
+
+<file path=ppt/slides/slide17.xml><?xml version="1.0" encoding="utf-8"?>
+<p:sld xmlns:a="http://schemas.openxmlformats.org/drawingml/2006/main" xmlns:r="http://schemas.openxmlformats.org/officeDocument/2006/relationships" xmlns:p="http://schemas.openxmlformats.org/presentationml/2006/main">
+  <p:cSld>
+    <p:spTree>
+      <p:nvGrpSpPr>
+        <p:cNvPr id="1" name=""/>
+        <p:cNvGrpSpPr/>
+        <p:nvPr/>
+      </p:nvGrpSpPr>
+      <p:grpSpPr>
+        <a:xfrm>
+          <a:off x="0" y="0"/>
+          <a:ext cx="0" cy="0"/>
+          <a:chOff x="0" y="0"/>
+          <a:chExt cx="0" cy="0"/>
+        </a:xfrm>
+      </p:grpSpPr>
+      <p:sp>
+        <p:nvSpPr>
+          <p:cNvPr id="2" name="Title 1">
+            <a:extLst>
+              <a:ext uri="{FF2B5EF4-FFF2-40B4-BE49-F238E27FC236}">
+                <a16:creationId xmlns:a16="http://schemas.microsoft.com/office/drawing/2014/main" id="{D458CE39-E1C4-4723-8FA6-B8B02FE2F019}"/>
+              </a:ext>
+            </a:extLst>
+          </p:cNvPr>
+          <p:cNvSpPr>
+            <a:spLocks noGrp="1"/>
+          </p:cNvSpPr>
+          <p:nvPr>
+            <p:ph type="title"/>
+          </p:nvPr>
+        </p:nvSpPr>
+        <p:spPr/>
+        <p:txBody>
+          <a:bodyPr/>
+          <a:lstStyle/>
+          <a:p>
+            <a:r>
+              <a:rPr lang="en-US" dirty="0"/>
+              <a:t>Stage -2 </a:t>
+            </a:r>
+            <a:endParaRPr lang="en-IN" dirty="0"/>
+          </a:p>
+        </p:txBody>
+      </p:sp>
+      <p:sp>
+        <p:nvSpPr>
+          <p:cNvPr id="5" name="Content Placeholder 4">
+            <a:extLst>
+              <a:ext uri="{FF2B5EF4-FFF2-40B4-BE49-F238E27FC236}">
+                <a16:creationId xmlns:a16="http://schemas.microsoft.com/office/drawing/2014/main" id="{41411D7C-95FD-40CC-ACA4-54C20D7A3574}"/>
+              </a:ext>
+            </a:extLst>
+          </p:cNvPr>
+          <p:cNvSpPr>
+            <a:spLocks noGrp="1"/>
+          </p:cNvSpPr>
+          <p:nvPr>
+            <p:ph idx="1"/>
+          </p:nvPr>
+        </p:nvSpPr>
+        <p:spPr/>
+        <p:txBody>
+          <a:bodyPr/>
+          <a:lstStyle/>
+          <a:p>
+            <a:endParaRPr lang="en-IN"/>
+          </a:p>
+        </p:txBody>
+      </p:sp>
+    </p:spTree>
+    <p:extLst>
+      <p:ext uri="{BB962C8B-B14F-4D97-AF65-F5344CB8AC3E}">
+        <p14:creationId xmlns:p14="http://schemas.microsoft.com/office/powerpoint/2010/main" val="1902120802"/>
+      </p:ext>
+    </p:extLst>
+  </p:cSld>
+  <p:clrMapOvr>
+    <a:masterClrMapping/>
+  </p:clrMapOvr>
+</p:sld>
+</file>
+
+<file path=ppt/slides/slide18.xml><?xml version="1.0" encoding="utf-8"?>
+<p:sld xmlns:a="http://schemas.openxmlformats.org/drawingml/2006/main" xmlns:r="http://schemas.openxmlformats.org/officeDocument/2006/relationships" xmlns:p="http://schemas.openxmlformats.org/presentationml/2006/main">
+  <p:cSld>
+    <p:spTree>
+      <p:nvGrpSpPr>
+        <p:cNvPr id="1" name=""/>
+        <p:cNvGrpSpPr/>
+        <p:nvPr/>
+      </p:nvGrpSpPr>
+      <p:grpSpPr>
+        <a:xfrm>
+          <a:off x="0" y="0"/>
+          <a:ext cx="0" cy="0"/>
+          <a:chOff x="0" y="0"/>
+          <a:chExt cx="0" cy="0"/>
+        </a:xfrm>
+      </p:grpSpPr>
+      <p:sp>
+        <p:nvSpPr>
+          <p:cNvPr id="2" name="Title 1">
+            <a:extLst>
+              <a:ext uri="{FF2B5EF4-FFF2-40B4-BE49-F238E27FC236}">
+                <a16:creationId xmlns:a16="http://schemas.microsoft.com/office/drawing/2014/main" id="{0F9EB1D2-2DE3-4BBB-8B63-51EE284AB5E7}"/>
+              </a:ext>
+            </a:extLst>
+          </p:cNvPr>
+          <p:cNvSpPr>
+            <a:spLocks noGrp="1"/>
+          </p:cNvSpPr>
+          <p:nvPr>
+            <p:ph type="title"/>
+          </p:nvPr>
+        </p:nvSpPr>
+        <p:spPr/>
+        <p:txBody>
+          <a:bodyPr/>
+          <a:lstStyle/>
+          <a:p>
+            <a:r>
+              <a:rPr lang="en-US" dirty="0"/>
+              <a:t>Stage-3 </a:t>
+            </a:r>
+            <a:endParaRPr lang="en-IN" dirty="0"/>
+          </a:p>
+        </p:txBody>
+      </p:sp>
+      <p:sp>
+        <p:nvSpPr>
+          <p:cNvPr id="3" name="Content Placeholder 2">
+            <a:extLst>
+              <a:ext uri="{FF2B5EF4-FFF2-40B4-BE49-F238E27FC236}">
+                <a16:creationId xmlns:a16="http://schemas.microsoft.com/office/drawing/2014/main" id="{74498610-A757-4E0B-868E-AC5E4505D203}"/>
+              </a:ext>
+            </a:extLst>
+          </p:cNvPr>
+          <p:cNvSpPr>
+            <a:spLocks noGrp="1"/>
+          </p:cNvSpPr>
+          <p:nvPr>
+            <p:ph idx="1"/>
+          </p:nvPr>
+        </p:nvSpPr>
+        <p:spPr/>
+        <p:txBody>
+          <a:bodyPr/>
+          <a:lstStyle/>
+          <a:p>
+            <a:endParaRPr lang="en-IN"/>
+          </a:p>
+        </p:txBody>
+      </p:sp>
+    </p:spTree>
+    <p:extLst>
+      <p:ext uri="{BB962C8B-B14F-4D97-AF65-F5344CB8AC3E}">
+        <p14:creationId xmlns:p14="http://schemas.microsoft.com/office/powerpoint/2010/main" val="1075049865"/>
+      </p:ext>
+    </p:extLst>
+  </p:cSld>
+  <p:clrMapOvr>
+    <a:masterClrMapping/>
+  </p:clrMapOvr>
+</p:sld>
+</file>
+
+<file path=ppt/slides/slide19.xml><?xml version="1.0" encoding="utf-8"?>
+<p:sld xmlns:a="http://schemas.openxmlformats.org/drawingml/2006/main" xmlns:r="http://schemas.openxmlformats.org/officeDocument/2006/relationships" xmlns:p="http://schemas.openxmlformats.org/presentationml/2006/main">
+  <p:cSld>
+    <p:spTree>
+      <p:nvGrpSpPr>
+        <p:cNvPr id="1" name=""/>
+        <p:cNvGrpSpPr/>
+        <p:nvPr/>
+      </p:nvGrpSpPr>
+      <p:grpSpPr>
+        <a:xfrm>
+          <a:off x="0" y="0"/>
+          <a:ext cx="0" cy="0"/>
+          <a:chOff x="0" y="0"/>
+          <a:chExt cx="0" cy="0"/>
+        </a:xfrm>
+      </p:grpSpPr>
+      <p:sp>
+        <p:nvSpPr>
+          <p:cNvPr id="2" name="Title 1">
+            <a:extLst>
+              <a:ext uri="{FF2B5EF4-FFF2-40B4-BE49-F238E27FC236}">
+                <a16:creationId xmlns:a16="http://schemas.microsoft.com/office/drawing/2014/main" id="{928403F5-2549-4BEC-BC3F-1A793B83F7A5}"/>
+              </a:ext>
+            </a:extLst>
+          </p:cNvPr>
+          <p:cNvSpPr>
+            <a:spLocks noGrp="1"/>
+          </p:cNvSpPr>
+          <p:nvPr>
+            <p:ph type="title"/>
+          </p:nvPr>
+        </p:nvSpPr>
+        <p:spPr/>
+        <p:txBody>
+          <a:bodyPr/>
+          <a:lstStyle/>
+          <a:p>
+            <a:r>
+              <a:rPr lang="en-US" dirty="0"/>
+              <a:t>Appendix</a:t>
+            </a:r>
+            <a:endParaRPr lang="en-IN" dirty="0"/>
+          </a:p>
+        </p:txBody>
+      </p:sp>
+      <p:sp>
+        <p:nvSpPr>
+          <p:cNvPr id="3" name="Content Placeholder 2">
+            <a:extLst>
+              <a:ext uri="{FF2B5EF4-FFF2-40B4-BE49-F238E27FC236}">
+                <a16:creationId xmlns:a16="http://schemas.microsoft.com/office/drawing/2014/main" id="{A3B69B32-0A3D-46C6-825D-A81AEEC03118}"/>
+              </a:ext>
+            </a:extLst>
+          </p:cNvPr>
+          <p:cNvSpPr>
+            <a:spLocks noGrp="1"/>
+          </p:cNvSpPr>
+          <p:nvPr>
+            <p:ph idx="1"/>
+          </p:nvPr>
+        </p:nvSpPr>
+        <p:spPr/>
+        <p:txBody>
+          <a:bodyPr/>
+          <a:lstStyle/>
+          <a:p>
+            <a:endParaRPr lang="en-IN"/>
+          </a:p>
+        </p:txBody>
+      </p:sp>
+    </p:spTree>
+    <p:extLst>
+      <p:ext uri="{BB962C8B-B14F-4D97-AF65-F5344CB8AC3E}">
+        <p14:creationId xmlns:p14="http://schemas.microsoft.com/office/powerpoint/2010/main" val="2549448092"/>
+      </p:ext>
+    </p:extLst>
+  </p:cSld>
+  <p:clrMapOvr>
+    <a:masterClrMapping/>
+  </p:clrMapOvr>
+</p:sld>
+</file>
+
 <file path=ppt/slides/slide2.xml><?xml version="1.0" encoding="utf-8"?>
 <p:sld xmlns:a="http://schemas.openxmlformats.org/drawingml/2006/main" xmlns:r="http://schemas.openxmlformats.org/officeDocument/2006/relationships" xmlns:p="http://schemas.openxmlformats.org/presentationml/2006/main">
   <p:cSld>
@@ -3529,6 +4791,2229 @@
     <p:extLst>
       <p:ext uri="{BB962C8B-B14F-4D97-AF65-F5344CB8AC3E}">
         <p14:creationId xmlns:p14="http://schemas.microsoft.com/office/powerpoint/2010/main" val="3730152001"/>
+      </p:ext>
+    </p:extLst>
+  </p:cSld>
+  <p:clrMapOvr>
+    <a:masterClrMapping/>
+  </p:clrMapOvr>
+</p:sld>
+</file>
+
+<file path=ppt/slides/slide20.xml><?xml version="1.0" encoding="utf-8"?>
+<p:sld xmlns:a="http://schemas.openxmlformats.org/drawingml/2006/main" xmlns:r="http://schemas.openxmlformats.org/officeDocument/2006/relationships" xmlns:p="http://schemas.openxmlformats.org/presentationml/2006/main">
+  <p:cSld>
+    <p:spTree>
+      <p:nvGrpSpPr>
+        <p:cNvPr id="1" name=""/>
+        <p:cNvGrpSpPr/>
+        <p:nvPr/>
+      </p:nvGrpSpPr>
+      <p:grpSpPr>
+        <a:xfrm>
+          <a:off x="0" y="0"/>
+          <a:ext cx="0" cy="0"/>
+          <a:chOff x="0" y="0"/>
+          <a:chExt cx="0" cy="0"/>
+        </a:xfrm>
+      </p:grpSpPr>
+      <p:sp>
+        <p:nvSpPr>
+          <p:cNvPr id="2" name="Title 1">
+            <a:extLst>
+              <a:ext uri="{FF2B5EF4-FFF2-40B4-BE49-F238E27FC236}">
+                <a16:creationId xmlns:a16="http://schemas.microsoft.com/office/drawing/2014/main" id="{A4CD6BA6-F777-4003-B8C2-FFD702682563}"/>
+              </a:ext>
+            </a:extLst>
+          </p:cNvPr>
+          <p:cNvSpPr>
+            <a:spLocks noGrp="1"/>
+          </p:cNvSpPr>
+          <p:nvPr>
+            <p:ph type="title"/>
+          </p:nvPr>
+        </p:nvSpPr>
+        <p:spPr/>
+        <p:txBody>
+          <a:bodyPr/>
+          <a:lstStyle/>
+          <a:p>
+            <a:r>
+              <a:rPr lang="en-US" dirty="0"/>
+              <a:t>SGD</a:t>
+            </a:r>
+            <a:endParaRPr lang="en-IN" dirty="0"/>
+          </a:p>
+        </p:txBody>
+      </p:sp>
+      <p:sp>
+        <p:nvSpPr>
+          <p:cNvPr id="3" name="Content Placeholder 2">
+            <a:extLst>
+              <a:ext uri="{FF2B5EF4-FFF2-40B4-BE49-F238E27FC236}">
+                <a16:creationId xmlns:a16="http://schemas.microsoft.com/office/drawing/2014/main" id="{ED42F1E0-88D4-4547-8516-860C4EFE9D3A}"/>
+              </a:ext>
+            </a:extLst>
+          </p:cNvPr>
+          <p:cNvSpPr>
+            <a:spLocks noGrp="1"/>
+          </p:cNvSpPr>
+          <p:nvPr>
+            <p:ph idx="1"/>
+          </p:nvPr>
+        </p:nvSpPr>
+        <p:spPr/>
+        <p:txBody>
+          <a:bodyPr>
+            <a:normAutofit fontScale="70000" lnSpcReduction="20000"/>
+          </a:bodyPr>
+          <a:lstStyle/>
+          <a:p>
+            <a:r>
+              <a:rPr lang="en-US" b="1" dirty="0"/>
+              <a:t>SGD</a:t>
+            </a:r>
+            <a:r>
+              <a:rPr lang="en-US" dirty="0"/>
+              <a:t> (Stochastic Gradient Descent) is an optimizer. It's a fundamental algorithm used in machine learning and deep learning to optimize (or "train") models by adjusting their parameters (weights) to minimize the loss function.</a:t>
+            </a:r>
+          </a:p>
+          <a:p>
+            <a:r>
+              <a:rPr lang="en-US" b="1" dirty="0"/>
+              <a:t>How SGD Works:</a:t>
+            </a:r>
+          </a:p>
+          <a:p>
+            <a:r>
+              <a:rPr lang="en-US" b="1" dirty="0"/>
+              <a:t>Initialize Weights:</a:t>
+            </a:r>
+            <a:endParaRPr lang="en-US" dirty="0"/>
+          </a:p>
+          <a:p>
+            <a:pPr lvl="1"/>
+            <a:r>
+              <a:rPr lang="en-US" dirty="0"/>
+              <a:t>When training a neural network, the model's weights (parameters) are typically initialized randomly.</a:t>
+            </a:r>
+          </a:p>
+          <a:p>
+            <a:r>
+              <a:rPr lang="en-US" b="1" dirty="0"/>
+              <a:t>Forward Pass (Prediction):</a:t>
+            </a:r>
+            <a:endParaRPr lang="en-US" dirty="0"/>
+          </a:p>
+          <a:p>
+            <a:pPr lvl="1"/>
+            <a:r>
+              <a:rPr lang="en-US" dirty="0"/>
+              <a:t>The model makes predictions by passing the input through its layers. This is called the </a:t>
+            </a:r>
+            <a:r>
+              <a:rPr lang="en-US" b="1" dirty="0"/>
+              <a:t>forward pass</a:t>
+            </a:r>
+            <a:r>
+              <a:rPr lang="en-US" dirty="0"/>
+              <a:t>.</a:t>
+            </a:r>
+          </a:p>
+          <a:p>
+            <a:r>
+              <a:rPr lang="en-US" b="1" dirty="0"/>
+              <a:t>Calculate Loss:</a:t>
+            </a:r>
+            <a:endParaRPr lang="en-US" dirty="0"/>
+          </a:p>
+          <a:p>
+            <a:pPr lvl="1"/>
+            <a:r>
+              <a:rPr lang="en-US" dirty="0"/>
+              <a:t>The difference between the predicted output and the true output (label) is calculated using a </a:t>
+            </a:r>
+            <a:r>
+              <a:rPr lang="en-US" b="1" dirty="0"/>
+              <a:t>loss function</a:t>
+            </a:r>
+            <a:r>
+              <a:rPr lang="en-US" dirty="0"/>
+              <a:t> (e.g. Categorical Cross Entropy / </a:t>
+            </a:r>
+            <a:r>
+              <a:rPr lang="en-US" dirty="0" err="1"/>
+              <a:t>Softmax</a:t>
+            </a:r>
+            <a:r>
+              <a:rPr lang="en-US" dirty="0"/>
+              <a:t> Cross Entropy).</a:t>
+            </a:r>
+          </a:p>
+          <a:p>
+            <a:r>
+              <a:rPr lang="en-US" b="1" dirty="0"/>
+              <a:t>Backward Pass (Gradient Calculation):</a:t>
+            </a:r>
+            <a:endParaRPr lang="en-US" dirty="0"/>
+          </a:p>
+          <a:p>
+            <a:pPr lvl="1"/>
+            <a:r>
+              <a:rPr lang="en-US" dirty="0"/>
+              <a:t>After calculating the loss, </a:t>
+            </a:r>
+            <a:r>
+              <a:rPr lang="en-US" b="1" dirty="0"/>
+              <a:t>backpropagation</a:t>
+            </a:r>
+            <a:r>
+              <a:rPr lang="en-US" dirty="0"/>
+              <a:t> is used to compute the gradients (partial derivatives of the loss function with respect to each model parameter).</a:t>
+            </a:r>
+          </a:p>
+          <a:p>
+            <a:pPr marL="0" indent="0">
+              <a:buNone/>
+            </a:pPr>
+            <a:endParaRPr lang="en-IN" dirty="0"/>
+          </a:p>
+        </p:txBody>
+      </p:sp>
+    </p:spTree>
+    <p:extLst>
+      <p:ext uri="{BB962C8B-B14F-4D97-AF65-F5344CB8AC3E}">
+        <p14:creationId xmlns:p14="http://schemas.microsoft.com/office/powerpoint/2010/main" val="1426931882"/>
+      </p:ext>
+    </p:extLst>
+  </p:cSld>
+  <p:clrMapOvr>
+    <a:masterClrMapping/>
+  </p:clrMapOvr>
+</p:sld>
+</file>
+
+<file path=ppt/slides/slide21.xml><?xml version="1.0" encoding="utf-8"?>
+<p:sld xmlns:a="http://schemas.openxmlformats.org/drawingml/2006/main" xmlns:r="http://schemas.openxmlformats.org/officeDocument/2006/relationships" xmlns:p="http://schemas.openxmlformats.org/presentationml/2006/main">
+  <p:cSld>
+    <p:spTree>
+      <p:nvGrpSpPr>
+        <p:cNvPr id="1" name=""/>
+        <p:cNvGrpSpPr/>
+        <p:nvPr/>
+      </p:nvGrpSpPr>
+      <p:grpSpPr>
+        <a:xfrm>
+          <a:off x="0" y="0"/>
+          <a:ext cx="0" cy="0"/>
+          <a:chOff x="0" y="0"/>
+          <a:chExt cx="0" cy="0"/>
+        </a:xfrm>
+      </p:grpSpPr>
+      <p:sp>
+        <p:nvSpPr>
+          <p:cNvPr id="2" name="Title 1">
+            <a:extLst>
+              <a:ext uri="{FF2B5EF4-FFF2-40B4-BE49-F238E27FC236}">
+                <a16:creationId xmlns:a16="http://schemas.microsoft.com/office/drawing/2014/main" id="{D75FBB3E-B169-4E8A-8CAC-C10488A60EDE}"/>
+              </a:ext>
+            </a:extLst>
+          </p:cNvPr>
+          <p:cNvSpPr>
+            <a:spLocks noGrp="1"/>
+          </p:cNvSpPr>
+          <p:nvPr>
+            <p:ph type="title"/>
+          </p:nvPr>
+        </p:nvSpPr>
+        <p:spPr/>
+        <p:txBody>
+          <a:bodyPr/>
+          <a:lstStyle/>
+          <a:p>
+            <a:r>
+              <a:rPr lang="en-US" dirty="0"/>
+              <a:t>SGD</a:t>
+            </a:r>
+            <a:endParaRPr lang="en-IN" dirty="0"/>
+          </a:p>
+        </p:txBody>
+      </p:sp>
+      <p:sp>
+        <p:nvSpPr>
+          <p:cNvPr id="4" name="Rectangle 1">
+            <a:extLst>
+              <a:ext uri="{FF2B5EF4-FFF2-40B4-BE49-F238E27FC236}">
+                <a16:creationId xmlns:a16="http://schemas.microsoft.com/office/drawing/2014/main" id="{AA3B4B97-A962-436F-9A89-46702721006C}"/>
+              </a:ext>
+            </a:extLst>
+          </p:cNvPr>
+          <p:cNvSpPr>
+            <a:spLocks noGrp="1" noChangeArrowheads="1"/>
+          </p:cNvSpPr>
+          <p:nvPr>
+            <p:ph idx="1"/>
+          </p:nvPr>
+        </p:nvSpPr>
+        <p:spPr bwMode="auto">
+          <a:xfrm>
+            <a:off x="766482" y="1690688"/>
+            <a:ext cx="10515600" cy="5078313"/>
+          </a:xfrm>
+          <a:prstGeom prst="rect">
+            <a:avLst/>
+          </a:prstGeom>
+          <a:noFill/>
+          <a:ln>
+            <a:noFill/>
+          </a:ln>
+          <a:effectLst/>
+          <a:extLst>
+            <a:ext uri="{909E8E84-426E-40DD-AFC4-6F175D3DCCD1}">
+              <a14:hiddenFill xmlns:a14="http://schemas.microsoft.com/office/drawing/2010/main">
+                <a:solidFill>
+                  <a:schemeClr val="accent1"/>
+                </a:solidFill>
+              </a14:hiddenFill>
+            </a:ext>
+            <a:ext uri="{91240B29-F687-4F45-9708-019B960494DF}">
+              <a14:hiddenLine xmlns:a14="http://schemas.microsoft.com/office/drawing/2010/main" w="9525">
+                <a:solidFill>
+                  <a:schemeClr val="tx1"/>
+                </a:solidFill>
+                <a:miter lim="800000"/>
+                <a:headEnd/>
+                <a:tailEnd/>
+              </a14:hiddenLine>
+            </a:ext>
+            <a:ext uri="{AF507438-7753-43E0-B8FC-AC1667EBCBE1}">
+              <a14:hiddenEffects xmlns:a14="http://schemas.microsoft.com/office/drawing/2010/main">
+                <a:effectLst>
+                  <a:outerShdw dist="35921" dir="2700000" algn="ctr" rotWithShape="0">
+                    <a:schemeClr val="bg2"/>
+                  </a:outerShdw>
+                </a:effectLst>
+              </a14:hiddenEffects>
+            </a:ext>
+          </a:extLst>
+        </p:spPr>
+        <p:txBody>
+          <a:bodyPr vert="horz" wrap="square" lIns="91440" tIns="45720" rIns="91440" bIns="45720" numCol="1" anchor="ctr" anchorCtr="0" compatLnSpc="1">
+            <a:prstTxWarp prst="textNoShape">
+              <a:avLst/>
+            </a:prstTxWarp>
+            <a:spAutoFit/>
+          </a:bodyPr>
+          <a:lstStyle/>
+          <a:p>
+            <a:pPr marL="0" marR="0" lvl="0" indent="0" algn="l" defTabSz="914400" rtl="0" eaLnBrk="0" fontAlgn="base" latinLnBrk="0" hangingPunct="0">
+              <a:lnSpc>
+                <a:spcPct val="100000"/>
+              </a:lnSpc>
+              <a:spcBef>
+                <a:spcPct val="0"/>
+              </a:spcBef>
+              <a:spcAft>
+                <a:spcPct val="0"/>
+              </a:spcAft>
+              <a:buClrTx/>
+              <a:buSzTx/>
+              <a:buNone/>
+              <a:tabLst/>
+            </a:pPr>
+            <a:r>
+              <a:rPr kumimoji="0" lang="en-US" altLang="en-US" sz="1800" b="1" i="0" u="none" strike="noStrike" cap="none" normalizeH="0" baseline="0" dirty="0">
+                <a:ln>
+                  <a:noFill/>
+                </a:ln>
+                <a:solidFill>
+                  <a:schemeClr val="tx1"/>
+                </a:solidFill>
+                <a:effectLst/>
+                <a:latin typeface="Arial" panose="020B0604020202020204" pitchFamily="34" charset="0"/>
+              </a:rPr>
+              <a:t>Weight Update (Optimization):</a:t>
+            </a:r>
+          </a:p>
+          <a:p>
+            <a:pPr marL="0" marR="0" lvl="0" indent="0" algn="l" defTabSz="914400" rtl="0" eaLnBrk="0" fontAlgn="base" latinLnBrk="0" hangingPunct="0">
+              <a:lnSpc>
+                <a:spcPct val="100000"/>
+              </a:lnSpc>
+              <a:spcBef>
+                <a:spcPct val="0"/>
+              </a:spcBef>
+              <a:spcAft>
+                <a:spcPct val="0"/>
+              </a:spcAft>
+              <a:buClrTx/>
+              <a:buSzTx/>
+              <a:buNone/>
+              <a:tabLst/>
+            </a:pPr>
+            <a:endParaRPr kumimoji="0" lang="en-US" altLang="en-US" sz="1800" b="0" i="0" u="none" strike="noStrike" cap="none" normalizeH="0" baseline="0" dirty="0">
+              <a:ln>
+                <a:noFill/>
+              </a:ln>
+              <a:solidFill>
+                <a:schemeClr val="tx1"/>
+              </a:solidFill>
+              <a:effectLst/>
+              <a:latin typeface="Arial" panose="020B0604020202020204" pitchFamily="34" charset="0"/>
+            </a:endParaRPr>
+          </a:p>
+          <a:p>
+            <a:pPr marL="0" marR="0" lvl="0" indent="0" algn="l" defTabSz="914400" rtl="0" eaLnBrk="0" fontAlgn="base" latinLnBrk="0" hangingPunct="0">
+              <a:lnSpc>
+                <a:spcPct val="100000"/>
+              </a:lnSpc>
+              <a:spcBef>
+                <a:spcPct val="0"/>
+              </a:spcBef>
+              <a:spcAft>
+                <a:spcPct val="0"/>
+              </a:spcAft>
+              <a:buClrTx/>
+              <a:buSzTx/>
+              <a:buFontTx/>
+              <a:buChar char="•"/>
+              <a:tabLst/>
+            </a:pPr>
+            <a:r>
+              <a:rPr kumimoji="0" lang="en-US" altLang="en-US" sz="1800" b="0" i="0" u="none" strike="noStrike" cap="none" normalizeH="0" baseline="0" dirty="0">
+                <a:ln>
+                  <a:noFill/>
+                </a:ln>
+                <a:solidFill>
+                  <a:schemeClr val="tx1"/>
+                </a:solidFill>
+                <a:effectLst/>
+                <a:latin typeface="Arial" panose="020B0604020202020204" pitchFamily="34" charset="0"/>
+              </a:rPr>
+              <a:t>The </a:t>
+            </a:r>
+            <a:r>
+              <a:rPr kumimoji="0" lang="en-US" altLang="en-US" sz="1800" b="1" i="0" u="none" strike="noStrike" cap="none" normalizeH="0" baseline="0" dirty="0">
+                <a:ln>
+                  <a:noFill/>
+                </a:ln>
+                <a:solidFill>
+                  <a:schemeClr val="tx1"/>
+                </a:solidFill>
+                <a:effectLst/>
+                <a:latin typeface="Arial" panose="020B0604020202020204" pitchFamily="34" charset="0"/>
+              </a:rPr>
+              <a:t>SGD optimizer</a:t>
+            </a:r>
+            <a:r>
+              <a:rPr kumimoji="0" lang="en-US" altLang="en-US" sz="1800" b="0" i="0" u="none" strike="noStrike" cap="none" normalizeH="0" baseline="0" dirty="0">
+                <a:ln>
+                  <a:noFill/>
+                </a:ln>
+                <a:solidFill>
+                  <a:schemeClr val="tx1"/>
+                </a:solidFill>
+                <a:effectLst/>
+                <a:latin typeface="Arial" panose="020B0604020202020204" pitchFamily="34" charset="0"/>
+              </a:rPr>
+              <a:t> updates the model's parameters by subtracting the product of the gradient and a learning rate from the current weights: </a:t>
+            </a:r>
+          </a:p>
+          <a:p>
+            <a:pPr marL="0" marR="0" lvl="0" indent="0" algn="l" defTabSz="914400" rtl="0" eaLnBrk="0" fontAlgn="base" latinLnBrk="0" hangingPunct="0">
+              <a:lnSpc>
+                <a:spcPct val="100000"/>
+              </a:lnSpc>
+              <a:spcBef>
+                <a:spcPct val="0"/>
+              </a:spcBef>
+              <a:spcAft>
+                <a:spcPct val="0"/>
+              </a:spcAft>
+              <a:buClrTx/>
+              <a:buSzTx/>
+              <a:buNone/>
+              <a:tabLst/>
+            </a:pPr>
+            <a:endParaRPr lang="en-US" altLang="en-US" sz="1800" dirty="0">
+              <a:latin typeface="Arial" panose="020B0604020202020204" pitchFamily="34" charset="0"/>
+            </a:endParaRPr>
+          </a:p>
+          <a:p>
+            <a:pPr marL="0" marR="0" lvl="0" indent="0" algn="l" defTabSz="914400" rtl="0" eaLnBrk="0" fontAlgn="base" latinLnBrk="0" hangingPunct="0">
+              <a:lnSpc>
+                <a:spcPct val="100000"/>
+              </a:lnSpc>
+              <a:spcBef>
+                <a:spcPct val="0"/>
+              </a:spcBef>
+              <a:spcAft>
+                <a:spcPct val="0"/>
+              </a:spcAft>
+              <a:buClrTx/>
+              <a:buSzTx/>
+              <a:buNone/>
+              <a:tabLst/>
+            </a:pPr>
+            <a:r>
+              <a:rPr lang="en-US" altLang="en-US" sz="1800" dirty="0" err="1">
+                <a:latin typeface="Arial" panose="020B0604020202020204" pitchFamily="34" charset="0"/>
+              </a:rPr>
+              <a:t>W</a:t>
+            </a:r>
+            <a:r>
+              <a:rPr kumimoji="0" lang="en-US" altLang="en-US" sz="1800" b="0" i="0" u="none" strike="noStrike" cap="none" normalizeH="0" baseline="-25000" dirty="0" err="1">
+                <a:ln>
+                  <a:noFill/>
+                </a:ln>
+                <a:solidFill>
+                  <a:schemeClr val="tx1"/>
+                </a:solidFill>
+                <a:effectLst/>
+                <a:latin typeface="Arial" panose="020B0604020202020204" pitchFamily="34" charset="0"/>
+              </a:rPr>
+              <a:t>new</a:t>
+            </a:r>
+            <a:r>
+              <a:rPr kumimoji="0" lang="en-US" altLang="en-US" sz="1800" b="0" i="0" u="none" strike="noStrike" cap="none" normalizeH="0" baseline="-25000" dirty="0">
+                <a:ln>
+                  <a:noFill/>
+                </a:ln>
+                <a:solidFill>
+                  <a:schemeClr val="tx1"/>
+                </a:solidFill>
+                <a:effectLst/>
+                <a:latin typeface="Arial" panose="020B0604020202020204" pitchFamily="34" charset="0"/>
+              </a:rPr>
+              <a:t> </a:t>
+            </a:r>
+            <a:r>
+              <a:rPr kumimoji="0" lang="en-US" altLang="en-US" sz="1800" b="0" i="0" u="none" strike="noStrike" cap="none" normalizeH="0" baseline="0" dirty="0">
+                <a:ln>
+                  <a:noFill/>
+                </a:ln>
+                <a:solidFill>
+                  <a:schemeClr val="tx1"/>
+                </a:solidFill>
+                <a:effectLst/>
+                <a:latin typeface="Arial" panose="020B0604020202020204" pitchFamily="34" charset="0"/>
+              </a:rPr>
+              <a:t>= </a:t>
+            </a:r>
+            <a:r>
+              <a:rPr lang="en-US" altLang="en-US" sz="1800" dirty="0" err="1">
+                <a:latin typeface="Arial" panose="020B0604020202020204" pitchFamily="34" charset="0"/>
+              </a:rPr>
+              <a:t>W</a:t>
+            </a:r>
+            <a:r>
+              <a:rPr kumimoji="0" lang="en-US" altLang="en-US" sz="1800" b="0" i="0" u="none" strike="noStrike" cap="none" normalizeH="0" baseline="-25000" dirty="0" err="1">
+                <a:ln>
+                  <a:noFill/>
+                </a:ln>
+                <a:solidFill>
+                  <a:schemeClr val="tx1"/>
+                </a:solidFill>
+                <a:effectLst/>
+                <a:latin typeface="Arial" panose="020B0604020202020204" pitchFamily="34" charset="0"/>
+              </a:rPr>
+              <a:t>old</a:t>
+            </a:r>
+            <a:r>
+              <a:rPr kumimoji="0" lang="en-US" altLang="en-US" sz="1800" b="0" i="0" u="none" strike="noStrike" cap="none" normalizeH="0" baseline="-25000" dirty="0">
+                <a:ln>
+                  <a:noFill/>
+                </a:ln>
+                <a:solidFill>
+                  <a:schemeClr val="tx1"/>
+                </a:solidFill>
+                <a:effectLst/>
+                <a:latin typeface="Arial" panose="020B0604020202020204" pitchFamily="34" charset="0"/>
+              </a:rPr>
+              <a:t> </a:t>
+            </a:r>
+            <a:r>
+              <a:rPr kumimoji="0" lang="en-US" altLang="en-US" sz="1800" b="0" i="0" u="none" strike="noStrike" cap="none" normalizeH="0" baseline="0" dirty="0">
+                <a:ln>
+                  <a:noFill/>
+                </a:ln>
+                <a:solidFill>
+                  <a:schemeClr val="tx1"/>
+                </a:solidFill>
+                <a:effectLst/>
+                <a:latin typeface="Arial" panose="020B0604020202020204" pitchFamily="34" charset="0"/>
+              </a:rPr>
+              <a:t>− η⋅∇L</a:t>
+            </a:r>
+          </a:p>
+          <a:p>
+            <a:pPr marL="0" marR="0" lvl="0" indent="0" algn="l" defTabSz="914400" rtl="0" eaLnBrk="0" fontAlgn="base" latinLnBrk="0" hangingPunct="0">
+              <a:lnSpc>
+                <a:spcPct val="100000"/>
+              </a:lnSpc>
+              <a:spcBef>
+                <a:spcPct val="0"/>
+              </a:spcBef>
+              <a:spcAft>
+                <a:spcPct val="0"/>
+              </a:spcAft>
+              <a:buClrTx/>
+              <a:buSzTx/>
+              <a:buNone/>
+              <a:tabLst/>
+            </a:pPr>
+            <a:endParaRPr lang="en-US" altLang="en-US" sz="1800" dirty="0">
+              <a:latin typeface="Arial" panose="020B0604020202020204" pitchFamily="34" charset="0"/>
+            </a:endParaRPr>
+          </a:p>
+          <a:p>
+            <a:pPr marL="0" marR="0" lvl="0" indent="0" algn="l" defTabSz="914400" rtl="0" eaLnBrk="0" fontAlgn="base" latinLnBrk="0" hangingPunct="0">
+              <a:lnSpc>
+                <a:spcPct val="100000"/>
+              </a:lnSpc>
+              <a:spcBef>
+                <a:spcPct val="0"/>
+              </a:spcBef>
+              <a:spcAft>
+                <a:spcPct val="0"/>
+              </a:spcAft>
+              <a:buClrTx/>
+              <a:buSzTx/>
+              <a:buNone/>
+              <a:tabLst/>
+            </a:pPr>
+            <a:endParaRPr kumimoji="0" lang="en-US" altLang="en-US" sz="1800" b="0" i="0" u="none" strike="noStrike" cap="none" normalizeH="0" baseline="0" dirty="0">
+              <a:ln>
+                <a:noFill/>
+              </a:ln>
+              <a:solidFill>
+                <a:schemeClr val="tx1"/>
+              </a:solidFill>
+              <a:effectLst/>
+              <a:latin typeface="Arial" panose="020B0604020202020204" pitchFamily="34" charset="0"/>
+            </a:endParaRPr>
+          </a:p>
+          <a:p>
+            <a:pPr marL="0" marR="0" lvl="0" indent="0" algn="l" defTabSz="914400" rtl="0" eaLnBrk="0" fontAlgn="base" latinLnBrk="0" hangingPunct="0">
+              <a:lnSpc>
+                <a:spcPct val="100000"/>
+              </a:lnSpc>
+              <a:spcBef>
+                <a:spcPct val="0"/>
+              </a:spcBef>
+              <a:spcAft>
+                <a:spcPct val="0"/>
+              </a:spcAft>
+              <a:buClrTx/>
+              <a:buSzTx/>
+              <a:buNone/>
+              <a:tabLst/>
+            </a:pPr>
+            <a:r>
+              <a:rPr kumimoji="0" lang="en-US" altLang="en-US" sz="1800" b="0" i="0" u="none" strike="noStrike" cap="none" normalizeH="0" baseline="0" dirty="0">
+                <a:ln>
+                  <a:noFill/>
+                </a:ln>
+                <a:solidFill>
+                  <a:schemeClr val="tx1"/>
+                </a:solidFill>
+                <a:effectLst/>
+                <a:latin typeface="Arial" panose="020B0604020202020204" pitchFamily="34" charset="0"/>
+              </a:rPr>
+              <a:t>Where:</a:t>
+            </a:r>
+          </a:p>
+          <a:p>
+            <a:pPr marL="457200" lvl="1" indent="0" eaLnBrk="0" fontAlgn="base" hangingPunct="0">
+              <a:lnSpc>
+                <a:spcPct val="100000"/>
+              </a:lnSpc>
+              <a:spcBef>
+                <a:spcPct val="0"/>
+              </a:spcBef>
+              <a:spcAft>
+                <a:spcPct val="0"/>
+              </a:spcAft>
+              <a:buFontTx/>
+              <a:buChar char="•"/>
+            </a:pPr>
+            <a:r>
+              <a:rPr lang="en-US" altLang="en-US" sz="1800" dirty="0" err="1">
+                <a:latin typeface="Arial" panose="020B0604020202020204" pitchFamily="34" charset="0"/>
+              </a:rPr>
+              <a:t>W</a:t>
+            </a:r>
+            <a:r>
+              <a:rPr lang="en-US" altLang="en-US" sz="1800" baseline="-25000" dirty="0" err="1">
+                <a:latin typeface="Arial" panose="020B0604020202020204" pitchFamily="34" charset="0"/>
+              </a:rPr>
+              <a:t>new</a:t>
+            </a:r>
+            <a:r>
+              <a:rPr lang="en-US" altLang="en-US" sz="1800" baseline="-25000" dirty="0">
+                <a:latin typeface="Arial" panose="020B0604020202020204" pitchFamily="34" charset="0"/>
+              </a:rPr>
+              <a:t>  </a:t>
+            </a:r>
+            <a:r>
+              <a:rPr kumimoji="0" lang="en-US" altLang="en-US" sz="1800" b="0" i="0" u="none" strike="noStrike" cap="none" normalizeH="0" baseline="0" dirty="0">
+                <a:ln>
+                  <a:noFill/>
+                </a:ln>
+                <a:solidFill>
+                  <a:schemeClr val="tx1"/>
+                </a:solidFill>
+                <a:effectLst/>
+                <a:latin typeface="Arial" panose="020B0604020202020204" pitchFamily="34" charset="0"/>
+              </a:rPr>
+              <a:t>are the updated weights.</a:t>
+            </a:r>
+          </a:p>
+          <a:p>
+            <a:pPr marL="457200" lvl="1" indent="0" eaLnBrk="0" fontAlgn="base" hangingPunct="0">
+              <a:lnSpc>
+                <a:spcPct val="100000"/>
+              </a:lnSpc>
+              <a:spcBef>
+                <a:spcPct val="0"/>
+              </a:spcBef>
+              <a:spcAft>
+                <a:spcPct val="0"/>
+              </a:spcAft>
+              <a:buFontTx/>
+              <a:buChar char="•"/>
+            </a:pPr>
+            <a:r>
+              <a:rPr lang="en-US" altLang="en-US" sz="1800" dirty="0" err="1">
+                <a:latin typeface="Arial" panose="020B0604020202020204" pitchFamily="34" charset="0"/>
+              </a:rPr>
+              <a:t>W</a:t>
+            </a:r>
+            <a:r>
+              <a:rPr lang="en-US" altLang="en-US" sz="1800" baseline="-25000" dirty="0" err="1">
+                <a:latin typeface="Arial" panose="020B0604020202020204" pitchFamily="34" charset="0"/>
+              </a:rPr>
+              <a:t>old</a:t>
+            </a:r>
+            <a:r>
+              <a:rPr lang="en-US" altLang="en-US" sz="1800" baseline="-25000" dirty="0">
+                <a:latin typeface="Arial" panose="020B0604020202020204" pitchFamily="34" charset="0"/>
+              </a:rPr>
+              <a:t>  </a:t>
+            </a:r>
+            <a:r>
+              <a:rPr kumimoji="0" lang="en-US" altLang="en-US" sz="1800" b="0" i="0" u="none" strike="noStrike" cap="none" normalizeH="0" baseline="0" dirty="0">
+                <a:ln>
+                  <a:noFill/>
+                </a:ln>
+                <a:solidFill>
+                  <a:schemeClr val="tx1"/>
+                </a:solidFill>
+                <a:effectLst/>
+                <a:latin typeface="Arial" panose="020B0604020202020204" pitchFamily="34" charset="0"/>
+              </a:rPr>
+              <a:t>are the current weights.</a:t>
+            </a:r>
+          </a:p>
+          <a:p>
+            <a:pPr marL="457200" marR="0" lvl="1" indent="0" algn="l" defTabSz="914400" rtl="0" eaLnBrk="0" fontAlgn="base" latinLnBrk="0" hangingPunct="0">
+              <a:lnSpc>
+                <a:spcPct val="100000"/>
+              </a:lnSpc>
+              <a:spcBef>
+                <a:spcPct val="0"/>
+              </a:spcBef>
+              <a:spcAft>
+                <a:spcPct val="0"/>
+              </a:spcAft>
+              <a:buClrTx/>
+              <a:buSzTx/>
+              <a:buFontTx/>
+              <a:buChar char="•"/>
+              <a:tabLst/>
+            </a:pPr>
+            <a:r>
+              <a:rPr kumimoji="0" lang="en-US" altLang="en-US" sz="1800" b="0" i="0" u="none" strike="noStrike" cap="none" normalizeH="0" baseline="0" dirty="0">
+                <a:ln>
+                  <a:noFill/>
+                </a:ln>
+                <a:solidFill>
+                  <a:schemeClr val="tx1"/>
+                </a:solidFill>
+                <a:effectLst/>
+                <a:latin typeface="Arial" panose="020B0604020202020204" pitchFamily="34" charset="0"/>
+              </a:rPr>
+              <a:t>η is the </a:t>
+            </a:r>
+            <a:r>
+              <a:rPr kumimoji="0" lang="en-US" altLang="en-US" sz="1800" b="1" i="0" u="none" strike="noStrike" cap="none" normalizeH="0" baseline="0" dirty="0">
+                <a:ln>
+                  <a:noFill/>
+                </a:ln>
+                <a:solidFill>
+                  <a:schemeClr val="tx1"/>
+                </a:solidFill>
+                <a:effectLst/>
+                <a:latin typeface="Arial" panose="020B0604020202020204" pitchFamily="34" charset="0"/>
+              </a:rPr>
+              <a:t>learning rate</a:t>
+            </a:r>
+            <a:r>
+              <a:rPr kumimoji="0" lang="en-US" altLang="en-US" sz="1800" b="0" i="0" u="none" strike="noStrike" cap="none" normalizeH="0" baseline="0" dirty="0">
+                <a:ln>
+                  <a:noFill/>
+                </a:ln>
+                <a:solidFill>
+                  <a:schemeClr val="tx1"/>
+                </a:solidFill>
+                <a:effectLst/>
+                <a:latin typeface="Arial" panose="020B0604020202020204" pitchFamily="34" charset="0"/>
+              </a:rPr>
+              <a:t> (a hyperparameter that controls how much the weights are adjusted).</a:t>
+            </a:r>
+          </a:p>
+          <a:p>
+            <a:pPr marL="457200" marR="0" lvl="1" indent="0" algn="l" defTabSz="914400" rtl="0" eaLnBrk="0" fontAlgn="base" latinLnBrk="0" hangingPunct="0">
+              <a:lnSpc>
+                <a:spcPct val="100000"/>
+              </a:lnSpc>
+              <a:spcBef>
+                <a:spcPct val="0"/>
+              </a:spcBef>
+              <a:spcAft>
+                <a:spcPct val="0"/>
+              </a:spcAft>
+              <a:buClrTx/>
+              <a:buSzTx/>
+              <a:buFontTx/>
+              <a:buChar char="•"/>
+              <a:tabLst/>
+            </a:pPr>
+            <a:r>
+              <a:rPr kumimoji="0" lang="en-US" altLang="en-US" sz="1800" b="0" i="0" u="none" strike="noStrike" cap="none" normalizeH="0" baseline="0" dirty="0">
+                <a:ln>
+                  <a:noFill/>
+                </a:ln>
+                <a:solidFill>
+                  <a:schemeClr val="tx1"/>
+                </a:solidFill>
+                <a:effectLst/>
+                <a:latin typeface="Arial" panose="020B0604020202020204" pitchFamily="34" charset="0"/>
+              </a:rPr>
+              <a:t>∇L ∇L is the gradient of the loss with respect to the weights.</a:t>
+            </a:r>
+          </a:p>
+          <a:p>
+            <a:pPr marL="0" marR="0" lvl="0" indent="0" algn="l" defTabSz="914400" rtl="0" eaLnBrk="0" fontAlgn="base" latinLnBrk="0" hangingPunct="0">
+              <a:lnSpc>
+                <a:spcPct val="100000"/>
+              </a:lnSpc>
+              <a:spcBef>
+                <a:spcPct val="0"/>
+              </a:spcBef>
+              <a:spcAft>
+                <a:spcPct val="0"/>
+              </a:spcAft>
+              <a:buClrTx/>
+              <a:buSzTx/>
+              <a:buNone/>
+              <a:tabLst/>
+            </a:pPr>
+            <a:endParaRPr kumimoji="0" lang="en-US" altLang="en-US" sz="1800" b="1" i="0" u="none" strike="noStrike" cap="none" normalizeH="0" baseline="0" dirty="0">
+              <a:ln>
+                <a:noFill/>
+              </a:ln>
+              <a:solidFill>
+                <a:schemeClr val="tx1"/>
+              </a:solidFill>
+              <a:effectLst/>
+              <a:latin typeface="Arial" panose="020B0604020202020204" pitchFamily="34" charset="0"/>
+            </a:endParaRPr>
+          </a:p>
+          <a:p>
+            <a:pPr marL="0" marR="0" lvl="0" indent="0" algn="l" defTabSz="914400" rtl="0" eaLnBrk="0" fontAlgn="base" latinLnBrk="0" hangingPunct="0">
+              <a:lnSpc>
+                <a:spcPct val="100000"/>
+              </a:lnSpc>
+              <a:spcBef>
+                <a:spcPct val="0"/>
+              </a:spcBef>
+              <a:spcAft>
+                <a:spcPct val="0"/>
+              </a:spcAft>
+              <a:buClrTx/>
+              <a:buSzTx/>
+              <a:buNone/>
+              <a:tabLst/>
+            </a:pPr>
+            <a:r>
+              <a:rPr kumimoji="0" lang="en-US" altLang="en-US" sz="1800" b="1" i="0" u="none" strike="noStrike" cap="none" normalizeH="0" baseline="0" dirty="0">
+                <a:ln>
+                  <a:noFill/>
+                </a:ln>
+                <a:solidFill>
+                  <a:schemeClr val="tx1"/>
+                </a:solidFill>
+                <a:effectLst/>
+                <a:latin typeface="Arial" panose="020B0604020202020204" pitchFamily="34" charset="0"/>
+              </a:rPr>
+              <a:t>Repeat:</a:t>
+            </a:r>
+            <a:endParaRPr kumimoji="0" lang="en-US" altLang="en-US" sz="1800" b="0" i="0" u="none" strike="noStrike" cap="none" normalizeH="0" baseline="0" dirty="0">
+              <a:ln>
+                <a:noFill/>
+              </a:ln>
+              <a:solidFill>
+                <a:schemeClr val="tx1"/>
+              </a:solidFill>
+              <a:effectLst/>
+              <a:latin typeface="Arial" panose="020B0604020202020204" pitchFamily="34" charset="0"/>
+            </a:endParaRPr>
+          </a:p>
+          <a:p>
+            <a:pPr marL="0" marR="0" lvl="0" indent="0" algn="l" defTabSz="914400" rtl="0" eaLnBrk="0" fontAlgn="base" latinLnBrk="0" hangingPunct="0">
+              <a:lnSpc>
+                <a:spcPct val="100000"/>
+              </a:lnSpc>
+              <a:spcBef>
+                <a:spcPct val="0"/>
+              </a:spcBef>
+              <a:spcAft>
+                <a:spcPct val="0"/>
+              </a:spcAft>
+              <a:buClrTx/>
+              <a:buSzTx/>
+              <a:buFontTx/>
+              <a:buChar char="•"/>
+              <a:tabLst/>
+            </a:pPr>
+            <a:r>
+              <a:rPr kumimoji="0" lang="en-US" altLang="en-US" sz="1800" b="0" i="0" u="none" strike="noStrike" cap="none" normalizeH="0" baseline="0" dirty="0">
+                <a:ln>
+                  <a:noFill/>
+                </a:ln>
+                <a:solidFill>
+                  <a:schemeClr val="tx1"/>
+                </a:solidFill>
+                <a:effectLst/>
+                <a:latin typeface="Arial" panose="020B0604020202020204" pitchFamily="34" charset="0"/>
+              </a:rPr>
+              <a:t>This process is repeated across many iterations (epochs), gradually improving the model's performance.</a:t>
+            </a:r>
+          </a:p>
+          <a:p>
+            <a:pPr marL="0" marR="0" lvl="0" indent="0" algn="l" defTabSz="914400" rtl="0" eaLnBrk="0" fontAlgn="base" latinLnBrk="0" hangingPunct="0">
+              <a:lnSpc>
+                <a:spcPct val="100000"/>
+              </a:lnSpc>
+              <a:spcBef>
+                <a:spcPct val="0"/>
+              </a:spcBef>
+              <a:spcAft>
+                <a:spcPct val="0"/>
+              </a:spcAft>
+              <a:buClrTx/>
+              <a:buSzTx/>
+              <a:buFontTx/>
+              <a:buNone/>
+              <a:tabLst/>
+            </a:pPr>
+            <a:endParaRPr kumimoji="0" lang="en-US" altLang="en-US" sz="1800" b="0" i="0" u="none" strike="noStrike" cap="none" normalizeH="0" baseline="0" dirty="0">
+              <a:ln>
+                <a:noFill/>
+              </a:ln>
+              <a:solidFill>
+                <a:schemeClr val="tx1"/>
+              </a:solidFill>
+              <a:effectLst/>
+              <a:latin typeface="Arial" panose="020B0604020202020204" pitchFamily="34" charset="0"/>
+            </a:endParaRPr>
+          </a:p>
+        </p:txBody>
+      </p:sp>
+    </p:spTree>
+    <p:extLst>
+      <p:ext uri="{BB962C8B-B14F-4D97-AF65-F5344CB8AC3E}">
+        <p14:creationId xmlns:p14="http://schemas.microsoft.com/office/powerpoint/2010/main" val="4254868263"/>
+      </p:ext>
+    </p:extLst>
+  </p:cSld>
+  <p:clrMapOvr>
+    <a:masterClrMapping/>
+  </p:clrMapOvr>
+</p:sld>
+</file>
+
+<file path=ppt/slides/slide22.xml><?xml version="1.0" encoding="utf-8"?>
+<p:sld xmlns:a="http://schemas.openxmlformats.org/drawingml/2006/main" xmlns:r="http://schemas.openxmlformats.org/officeDocument/2006/relationships" xmlns:p="http://schemas.openxmlformats.org/presentationml/2006/main">
+  <p:cSld>
+    <p:spTree>
+      <p:nvGrpSpPr>
+        <p:cNvPr id="1" name=""/>
+        <p:cNvGrpSpPr/>
+        <p:nvPr/>
+      </p:nvGrpSpPr>
+      <p:grpSpPr>
+        <a:xfrm>
+          <a:off x="0" y="0"/>
+          <a:ext cx="0" cy="0"/>
+          <a:chOff x="0" y="0"/>
+          <a:chExt cx="0" cy="0"/>
+        </a:xfrm>
+      </p:grpSpPr>
+      <p:sp>
+        <p:nvSpPr>
+          <p:cNvPr id="2" name="Title 1">
+            <a:extLst>
+              <a:ext uri="{FF2B5EF4-FFF2-40B4-BE49-F238E27FC236}">
+                <a16:creationId xmlns:a16="http://schemas.microsoft.com/office/drawing/2014/main" id="{64FA17B7-3296-4C14-9FDF-1F9117EC5879}"/>
+              </a:ext>
+            </a:extLst>
+          </p:cNvPr>
+          <p:cNvSpPr>
+            <a:spLocks noGrp="1"/>
+          </p:cNvSpPr>
+          <p:nvPr>
+            <p:ph type="title"/>
+          </p:nvPr>
+        </p:nvSpPr>
+        <p:spPr/>
+        <p:txBody>
+          <a:bodyPr/>
+          <a:lstStyle/>
+          <a:p>
+            <a:r>
+              <a:rPr lang="en-US" dirty="0"/>
+              <a:t>Categorical Cross Entropy / </a:t>
+            </a:r>
+            <a:r>
+              <a:rPr lang="en-US" dirty="0" err="1"/>
+              <a:t>Softmax</a:t>
+            </a:r>
+            <a:r>
+              <a:rPr lang="en-US" dirty="0"/>
+              <a:t> Cross Entropy</a:t>
+            </a:r>
+            <a:endParaRPr lang="en-IN" dirty="0"/>
+          </a:p>
+        </p:txBody>
+      </p:sp>
+      <p:sp>
+        <p:nvSpPr>
+          <p:cNvPr id="3" name="Content Placeholder 2">
+            <a:extLst>
+              <a:ext uri="{FF2B5EF4-FFF2-40B4-BE49-F238E27FC236}">
+                <a16:creationId xmlns:a16="http://schemas.microsoft.com/office/drawing/2014/main" id="{21379B7E-878B-42CC-BBE7-0B3CCEE4DC94}"/>
+              </a:ext>
+            </a:extLst>
+          </p:cNvPr>
+          <p:cNvSpPr>
+            <a:spLocks noGrp="1"/>
+          </p:cNvSpPr>
+          <p:nvPr>
+            <p:ph idx="1"/>
+          </p:nvPr>
+        </p:nvSpPr>
+        <p:spPr/>
+        <p:txBody>
+          <a:bodyPr>
+            <a:normAutofit/>
+          </a:bodyPr>
+          <a:lstStyle/>
+          <a:p>
+            <a:pPr marL="0" indent="0">
+              <a:buNone/>
+            </a:pPr>
+            <a:r>
+              <a:rPr lang="en-US" sz="2200" dirty="0">
+                <a:latin typeface="Times New Roman" panose="02020603050405020304" pitchFamily="18" charset="0"/>
+                <a:cs typeface="Times New Roman" panose="02020603050405020304" pitchFamily="18" charset="0"/>
+              </a:rPr>
+              <a:t>In </a:t>
+            </a:r>
+            <a:r>
+              <a:rPr lang="en-US" sz="2200" b="1" dirty="0">
+                <a:latin typeface="Times New Roman" panose="02020603050405020304" pitchFamily="18" charset="0"/>
+                <a:cs typeface="Times New Roman" panose="02020603050405020304" pitchFamily="18" charset="0"/>
+              </a:rPr>
+              <a:t>Stage 2: Supervised Fine-Tuning (SFT)</a:t>
+            </a:r>
+            <a:r>
+              <a:rPr lang="en-US" sz="2200" dirty="0">
+                <a:latin typeface="Times New Roman" panose="02020603050405020304" pitchFamily="18" charset="0"/>
+                <a:cs typeface="Times New Roman" panose="02020603050405020304" pitchFamily="18" charset="0"/>
+              </a:rPr>
+              <a:t>, the model is trained on </a:t>
+            </a:r>
+            <a:r>
+              <a:rPr lang="en-US" sz="2200" b="1" dirty="0">
+                <a:latin typeface="Times New Roman" panose="02020603050405020304" pitchFamily="18" charset="0"/>
+                <a:cs typeface="Times New Roman" panose="02020603050405020304" pitchFamily="18" charset="0"/>
+              </a:rPr>
+              <a:t>human-labeled examples</a:t>
+            </a:r>
+            <a:r>
+              <a:rPr lang="en-US" sz="2200" dirty="0">
+                <a:latin typeface="Times New Roman" panose="02020603050405020304" pitchFamily="18" charset="0"/>
+                <a:cs typeface="Times New Roman" panose="02020603050405020304" pitchFamily="18" charset="0"/>
+              </a:rPr>
+              <a:t> of conversations. Specifically, the model learns to predict the next response based on an input (a question, for example). The loss function used in this stage is typically </a:t>
+            </a:r>
+            <a:r>
+              <a:rPr lang="en-US" sz="2200" b="1" dirty="0">
+                <a:latin typeface="Times New Roman" panose="02020603050405020304" pitchFamily="18" charset="0"/>
+                <a:cs typeface="Times New Roman" panose="02020603050405020304" pitchFamily="18" charset="0"/>
+              </a:rPr>
+              <a:t>categorical cross-entropy</a:t>
+            </a:r>
+            <a:r>
+              <a:rPr lang="en-US" sz="2200" dirty="0">
+                <a:latin typeface="Times New Roman" panose="02020603050405020304" pitchFamily="18" charset="0"/>
+                <a:cs typeface="Times New Roman" panose="02020603050405020304" pitchFamily="18" charset="0"/>
+              </a:rPr>
+              <a:t> (also referred to as </a:t>
+            </a:r>
+            <a:r>
+              <a:rPr lang="en-US" sz="2200" dirty="0" err="1">
+                <a:latin typeface="Times New Roman" panose="02020603050405020304" pitchFamily="18" charset="0"/>
+                <a:cs typeface="Times New Roman" panose="02020603050405020304" pitchFamily="18" charset="0"/>
+              </a:rPr>
+              <a:t>softmax</a:t>
+            </a:r>
+            <a:r>
+              <a:rPr lang="en-US" sz="2200" dirty="0">
+                <a:latin typeface="Times New Roman" panose="02020603050405020304" pitchFamily="18" charset="0"/>
+                <a:cs typeface="Times New Roman" panose="02020603050405020304" pitchFamily="18" charset="0"/>
+              </a:rPr>
+              <a:t> cross-entropy).</a:t>
+            </a:r>
+          </a:p>
+          <a:p>
+            <a:endParaRPr lang="en-US" b="1" dirty="0">
+              <a:latin typeface="Times New Roman" panose="02020603050405020304" pitchFamily="18" charset="0"/>
+              <a:cs typeface="Times New Roman" panose="02020603050405020304" pitchFamily="18" charset="0"/>
+            </a:endParaRPr>
+          </a:p>
+          <a:p>
+            <a:pPr marL="0" indent="0">
+              <a:buNone/>
+            </a:pPr>
+            <a:r>
+              <a:rPr lang="en-US" b="1" dirty="0">
+                <a:latin typeface="Times New Roman" panose="02020603050405020304" pitchFamily="18" charset="0"/>
+                <a:cs typeface="Times New Roman" panose="02020603050405020304" pitchFamily="18" charset="0"/>
+              </a:rPr>
+              <a:t>How does this work?</a:t>
+            </a:r>
+          </a:p>
+          <a:p>
+            <a:pPr marL="0" indent="0">
+              <a:buNone/>
+            </a:pPr>
+            <a:r>
+              <a:rPr lang="en-US" b="1" dirty="0">
+                <a:latin typeface="Times New Roman" panose="02020603050405020304" pitchFamily="18" charset="0"/>
+                <a:cs typeface="Times New Roman" panose="02020603050405020304" pitchFamily="18" charset="0"/>
+              </a:rPr>
+              <a:t>Task in SFT</a:t>
+            </a:r>
+            <a:r>
+              <a:rPr lang="en-US" dirty="0">
+                <a:latin typeface="Times New Roman" panose="02020603050405020304" pitchFamily="18" charset="0"/>
+                <a:cs typeface="Times New Roman" panose="02020603050405020304" pitchFamily="18" charset="0"/>
+              </a:rPr>
+              <a:t>:</a:t>
+            </a:r>
+          </a:p>
+          <a:p>
+            <a:pPr lvl="1"/>
+            <a:r>
+              <a:rPr lang="en-US" sz="2000" dirty="0">
+                <a:latin typeface="Times New Roman" panose="02020603050405020304" pitchFamily="18" charset="0"/>
+                <a:cs typeface="Times New Roman" panose="02020603050405020304" pitchFamily="18" charset="0"/>
+              </a:rPr>
+              <a:t>In SFT, the task is essentially a </a:t>
+            </a:r>
+            <a:r>
+              <a:rPr lang="en-US" sz="2000" b="1" dirty="0">
+                <a:latin typeface="Times New Roman" panose="02020603050405020304" pitchFamily="18" charset="0"/>
+                <a:cs typeface="Times New Roman" panose="02020603050405020304" pitchFamily="18" charset="0"/>
+              </a:rPr>
+              <a:t>sequence generation task</a:t>
+            </a:r>
+            <a:r>
+              <a:rPr lang="en-US" sz="2000" dirty="0">
+                <a:latin typeface="Times New Roman" panose="02020603050405020304" pitchFamily="18" charset="0"/>
+                <a:cs typeface="Times New Roman" panose="02020603050405020304" pitchFamily="18" charset="0"/>
+              </a:rPr>
+              <a:t>. The model is provided with a prompt (e.g., a question) and is trained to predict the next </a:t>
+            </a:r>
+            <a:r>
+              <a:rPr lang="en-US" sz="2000" b="1" dirty="0">
+                <a:latin typeface="Times New Roman" panose="02020603050405020304" pitchFamily="18" charset="0"/>
+                <a:cs typeface="Times New Roman" panose="02020603050405020304" pitchFamily="18" charset="0"/>
+              </a:rPr>
+              <a:t>correct response</a:t>
+            </a:r>
+            <a:r>
+              <a:rPr lang="en-US" sz="2000" dirty="0">
+                <a:latin typeface="Times New Roman" panose="02020603050405020304" pitchFamily="18" charset="0"/>
+                <a:cs typeface="Times New Roman" panose="02020603050405020304" pitchFamily="18" charset="0"/>
+              </a:rPr>
+              <a:t> as provided by a human annotator.</a:t>
+            </a:r>
+          </a:p>
+          <a:p>
+            <a:pPr lvl="1"/>
+            <a:r>
+              <a:rPr lang="en-US" sz="2000" dirty="0">
+                <a:latin typeface="Times New Roman" panose="02020603050405020304" pitchFamily="18" charset="0"/>
+                <a:cs typeface="Times New Roman" panose="02020603050405020304" pitchFamily="18" charset="0"/>
+              </a:rPr>
+              <a:t>The process is similar to </a:t>
+            </a:r>
+            <a:r>
+              <a:rPr lang="en-US" sz="2000" b="1" dirty="0">
+                <a:latin typeface="Times New Roman" panose="02020603050405020304" pitchFamily="18" charset="0"/>
+                <a:cs typeface="Times New Roman" panose="02020603050405020304" pitchFamily="18" charset="0"/>
+              </a:rPr>
+              <a:t>multi-class classification</a:t>
+            </a:r>
+            <a:r>
+              <a:rPr lang="en-US" sz="2000" dirty="0">
+                <a:latin typeface="Times New Roman" panose="02020603050405020304" pitchFamily="18" charset="0"/>
+                <a:cs typeface="Times New Roman" panose="02020603050405020304" pitchFamily="18" charset="0"/>
+              </a:rPr>
+              <a:t> where each possible token in the vocabulary is considered a class.</a:t>
+            </a:r>
+          </a:p>
+          <a:p>
+            <a:endParaRPr lang="en-IN" dirty="0">
+              <a:latin typeface="Times New Roman" panose="02020603050405020304" pitchFamily="18" charset="0"/>
+              <a:cs typeface="Times New Roman" panose="02020603050405020304" pitchFamily="18" charset="0"/>
+            </a:endParaRPr>
+          </a:p>
+        </p:txBody>
+      </p:sp>
+    </p:spTree>
+    <p:extLst>
+      <p:ext uri="{BB962C8B-B14F-4D97-AF65-F5344CB8AC3E}">
+        <p14:creationId xmlns:p14="http://schemas.microsoft.com/office/powerpoint/2010/main" val="2729815585"/>
+      </p:ext>
+    </p:extLst>
+  </p:cSld>
+  <p:clrMapOvr>
+    <a:masterClrMapping/>
+  </p:clrMapOvr>
+</p:sld>
+</file>
+
+<file path=ppt/slides/slide23.xml><?xml version="1.0" encoding="utf-8"?>
+<p:sld xmlns:a="http://schemas.openxmlformats.org/drawingml/2006/main" xmlns:r="http://schemas.openxmlformats.org/officeDocument/2006/relationships" xmlns:p="http://schemas.openxmlformats.org/presentationml/2006/main">
+  <p:cSld>
+    <p:spTree>
+      <p:nvGrpSpPr>
+        <p:cNvPr id="1" name=""/>
+        <p:cNvGrpSpPr/>
+        <p:nvPr/>
+      </p:nvGrpSpPr>
+      <p:grpSpPr>
+        <a:xfrm>
+          <a:off x="0" y="0"/>
+          <a:ext cx="0" cy="0"/>
+          <a:chOff x="0" y="0"/>
+          <a:chExt cx="0" cy="0"/>
+        </a:xfrm>
+      </p:grpSpPr>
+      <p:sp>
+        <p:nvSpPr>
+          <p:cNvPr id="2" name="Title 1">
+            <a:extLst>
+              <a:ext uri="{FF2B5EF4-FFF2-40B4-BE49-F238E27FC236}">
+                <a16:creationId xmlns:a16="http://schemas.microsoft.com/office/drawing/2014/main" id="{650F808E-CBA3-4E2D-B0BD-B073FD360A70}"/>
+              </a:ext>
+            </a:extLst>
+          </p:cNvPr>
+          <p:cNvSpPr>
+            <a:spLocks noGrp="1"/>
+          </p:cNvSpPr>
+          <p:nvPr>
+            <p:ph type="title"/>
+          </p:nvPr>
+        </p:nvSpPr>
+        <p:spPr/>
+        <p:txBody>
+          <a:bodyPr/>
+          <a:lstStyle/>
+          <a:p>
+            <a:endParaRPr lang="en-IN"/>
+          </a:p>
+        </p:txBody>
+      </p:sp>
+      <p:sp>
+        <p:nvSpPr>
+          <p:cNvPr id="3" name="Content Placeholder 2">
+            <a:extLst>
+              <a:ext uri="{FF2B5EF4-FFF2-40B4-BE49-F238E27FC236}">
+                <a16:creationId xmlns:a16="http://schemas.microsoft.com/office/drawing/2014/main" id="{DD0EE7BA-2CA3-458E-B418-F4879C6823CB}"/>
+              </a:ext>
+            </a:extLst>
+          </p:cNvPr>
+          <p:cNvSpPr>
+            <a:spLocks noGrp="1"/>
+          </p:cNvSpPr>
+          <p:nvPr>
+            <p:ph idx="1"/>
+          </p:nvPr>
+        </p:nvSpPr>
+        <p:spPr/>
+        <p:txBody>
+          <a:bodyPr/>
+          <a:lstStyle/>
+          <a:p>
+            <a:pPr marL="0" indent="0">
+              <a:buNone/>
+            </a:pPr>
+            <a:r>
+              <a:rPr lang="en-US" b="1" dirty="0"/>
+              <a:t>Why </a:t>
+            </a:r>
+            <a:r>
+              <a:rPr lang="en-US" b="1" dirty="0">
+                <a:latin typeface="Times New Roman" panose="02020603050405020304" pitchFamily="18" charset="0"/>
+                <a:cs typeface="Times New Roman" panose="02020603050405020304" pitchFamily="18" charset="0"/>
+              </a:rPr>
+              <a:t>Categorical</a:t>
+            </a:r>
+            <a:r>
+              <a:rPr lang="en-US" b="1" dirty="0"/>
+              <a:t> Cross-Entropy</a:t>
+            </a:r>
+            <a:r>
+              <a:rPr lang="en-US" dirty="0"/>
+              <a:t>:</a:t>
+            </a:r>
+          </a:p>
+          <a:p>
+            <a:pPr lvl="1"/>
+            <a:r>
+              <a:rPr lang="en-US" dirty="0"/>
+              <a:t>The model outputs a </a:t>
+            </a:r>
+            <a:r>
+              <a:rPr lang="en-US" b="1" dirty="0"/>
+              <a:t>probability distribution</a:t>
+            </a:r>
+            <a:r>
+              <a:rPr lang="en-US" dirty="0"/>
+              <a:t> over the entire vocabulary for the next word (token) in the response.</a:t>
+            </a:r>
+          </a:p>
+          <a:p>
+            <a:pPr lvl="1"/>
+            <a:r>
+              <a:rPr lang="en-US" dirty="0"/>
+              <a:t>Categorical cross-entropy is the standard loss function for multi-class classification tasks, and in this case, each token (word) in the vocabulary is treated as a class.</a:t>
+            </a:r>
+          </a:p>
+          <a:p>
+            <a:pPr lvl="1"/>
+            <a:r>
+              <a:rPr lang="en-US" dirty="0"/>
+              <a:t>The model’s goal is to </a:t>
+            </a:r>
+            <a:r>
+              <a:rPr lang="en-US" b="1" dirty="0"/>
+              <a:t>minimize</a:t>
+            </a:r>
+            <a:r>
+              <a:rPr lang="en-US" dirty="0"/>
+              <a:t> the difference between its predicted probability for the correct token and the actual token as given in the human-labeled example.</a:t>
+            </a:r>
+          </a:p>
+          <a:p>
+            <a:pPr marL="0" indent="0">
+              <a:buNone/>
+            </a:pPr>
+            <a:endParaRPr lang="en-IN" dirty="0"/>
+          </a:p>
+        </p:txBody>
+      </p:sp>
+    </p:spTree>
+    <p:extLst>
+      <p:ext uri="{BB962C8B-B14F-4D97-AF65-F5344CB8AC3E}">
+        <p14:creationId xmlns:p14="http://schemas.microsoft.com/office/powerpoint/2010/main" val="2728513921"/>
+      </p:ext>
+    </p:extLst>
+  </p:cSld>
+  <p:clrMapOvr>
+    <a:masterClrMapping/>
+  </p:clrMapOvr>
+</p:sld>
+</file>
+
+<file path=ppt/slides/slide24.xml><?xml version="1.0" encoding="utf-8"?>
+<p:sld xmlns:a="http://schemas.openxmlformats.org/drawingml/2006/main" xmlns:r="http://schemas.openxmlformats.org/officeDocument/2006/relationships" xmlns:p="http://schemas.openxmlformats.org/presentationml/2006/main">
+  <p:cSld>
+    <p:spTree>
+      <p:nvGrpSpPr>
+        <p:cNvPr id="1" name=""/>
+        <p:cNvGrpSpPr/>
+        <p:nvPr/>
+      </p:nvGrpSpPr>
+      <p:grpSpPr>
+        <a:xfrm>
+          <a:off x="0" y="0"/>
+          <a:ext cx="0" cy="0"/>
+          <a:chOff x="0" y="0"/>
+          <a:chExt cx="0" cy="0"/>
+        </a:xfrm>
+      </p:grpSpPr>
+      <p:sp>
+        <p:nvSpPr>
+          <p:cNvPr id="2" name="Title 1">
+            <a:extLst>
+              <a:ext uri="{FF2B5EF4-FFF2-40B4-BE49-F238E27FC236}">
+                <a16:creationId xmlns:a16="http://schemas.microsoft.com/office/drawing/2014/main" id="{191D3945-8397-47EF-86E2-89BB534BD0B3}"/>
+              </a:ext>
+            </a:extLst>
+          </p:cNvPr>
+          <p:cNvSpPr>
+            <a:spLocks noGrp="1"/>
+          </p:cNvSpPr>
+          <p:nvPr>
+            <p:ph type="title"/>
+          </p:nvPr>
+        </p:nvSpPr>
+        <p:spPr/>
+        <p:txBody>
+          <a:bodyPr/>
+          <a:lstStyle/>
+          <a:p>
+            <a:r>
+              <a:rPr lang="en-US" dirty="0"/>
+              <a:t>Example of Categorical Cross-Entropy in </a:t>
+            </a:r>
+            <a:r>
+              <a:rPr lang="en-US" dirty="0" err="1"/>
+              <a:t>ChatGPT’s</a:t>
+            </a:r>
+            <a:r>
+              <a:rPr lang="en-US" dirty="0"/>
+              <a:t> SFT:</a:t>
+            </a:r>
+            <a:endParaRPr lang="en-IN" dirty="0"/>
+          </a:p>
+        </p:txBody>
+      </p:sp>
+      <p:sp>
+        <p:nvSpPr>
+          <p:cNvPr id="4" name="Rectangle 1">
+            <a:extLst>
+              <a:ext uri="{FF2B5EF4-FFF2-40B4-BE49-F238E27FC236}">
+                <a16:creationId xmlns:a16="http://schemas.microsoft.com/office/drawing/2014/main" id="{8D0AB9C6-4A7D-4EB1-8596-6D2D2B0B7C06}"/>
+              </a:ext>
+            </a:extLst>
+          </p:cNvPr>
+          <p:cNvSpPr>
+            <a:spLocks noGrp="1" noChangeArrowheads="1"/>
+          </p:cNvSpPr>
+          <p:nvPr>
+            <p:ph idx="1"/>
+          </p:nvPr>
+        </p:nvSpPr>
+        <p:spPr bwMode="auto">
+          <a:xfrm>
+            <a:off x="838200" y="1739138"/>
+            <a:ext cx="10515600" cy="4524315"/>
+          </a:xfrm>
+          <a:prstGeom prst="rect">
+            <a:avLst/>
+          </a:prstGeom>
+          <a:noFill/>
+          <a:ln>
+            <a:noFill/>
+          </a:ln>
+          <a:effectLst/>
+          <a:extLst>
+            <a:ext uri="{909E8E84-426E-40DD-AFC4-6F175D3DCCD1}">
+              <a14:hiddenFill xmlns:a14="http://schemas.microsoft.com/office/drawing/2010/main">
+                <a:solidFill>
+                  <a:schemeClr val="accent1"/>
+                </a:solidFill>
+              </a14:hiddenFill>
+            </a:ext>
+            <a:ext uri="{91240B29-F687-4F45-9708-019B960494DF}">
+              <a14:hiddenLine xmlns:a14="http://schemas.microsoft.com/office/drawing/2010/main" w="9525">
+                <a:solidFill>
+                  <a:schemeClr val="tx1"/>
+                </a:solidFill>
+                <a:miter lim="800000"/>
+                <a:headEnd/>
+                <a:tailEnd/>
+              </a14:hiddenLine>
+            </a:ext>
+            <a:ext uri="{AF507438-7753-43E0-B8FC-AC1667EBCBE1}">
+              <a14:hiddenEffects xmlns:a14="http://schemas.microsoft.com/office/drawing/2010/main">
+                <a:effectLst>
+                  <a:outerShdw dist="35921" dir="2700000" algn="ctr" rotWithShape="0">
+                    <a:schemeClr val="bg2"/>
+                  </a:outerShdw>
+                </a:effectLst>
+              </a14:hiddenEffects>
+            </a:ext>
+          </a:extLst>
+        </p:spPr>
+        <p:txBody>
+          <a:bodyPr vert="horz" wrap="square" lIns="91440" tIns="45720" rIns="91440" bIns="45720" numCol="1" anchor="ctr" anchorCtr="0" compatLnSpc="1">
+            <a:prstTxWarp prst="textNoShape">
+              <a:avLst/>
+            </a:prstTxWarp>
+            <a:spAutoFit/>
+          </a:bodyPr>
+          <a:lstStyle/>
+          <a:p>
+            <a:pPr marL="0" marR="0" lvl="0" indent="0" algn="l" defTabSz="914400" rtl="0" eaLnBrk="0" fontAlgn="base" latinLnBrk="0" hangingPunct="0">
+              <a:lnSpc>
+                <a:spcPct val="100000"/>
+              </a:lnSpc>
+              <a:spcBef>
+                <a:spcPct val="0"/>
+              </a:spcBef>
+              <a:spcAft>
+                <a:spcPct val="0"/>
+              </a:spcAft>
+              <a:buClrTx/>
+              <a:buSzTx/>
+              <a:buFontTx/>
+              <a:buNone/>
+              <a:tabLst/>
+            </a:pPr>
+            <a:r>
+              <a:rPr kumimoji="0" lang="en-US" altLang="en-US" sz="1800" b="0" i="0" u="none" strike="noStrike" cap="none" normalizeH="0" baseline="0" dirty="0">
+                <a:ln>
+                  <a:noFill/>
+                </a:ln>
+                <a:solidFill>
+                  <a:schemeClr val="tx1"/>
+                </a:solidFill>
+                <a:effectLst/>
+                <a:latin typeface="Arial" panose="020B0604020202020204" pitchFamily="34" charset="0"/>
+              </a:rPr>
+              <a:t>Let’s break it down with an example:</a:t>
+            </a:r>
+          </a:p>
+          <a:p>
+            <a:pPr marL="0" marR="0" lvl="0" indent="0" algn="l" defTabSz="914400" rtl="0" eaLnBrk="0" fontAlgn="base" latinLnBrk="0" hangingPunct="0">
+              <a:lnSpc>
+                <a:spcPct val="100000"/>
+              </a:lnSpc>
+              <a:spcBef>
+                <a:spcPct val="0"/>
+              </a:spcBef>
+              <a:spcAft>
+                <a:spcPct val="0"/>
+              </a:spcAft>
+              <a:buClrTx/>
+              <a:buSzTx/>
+              <a:buFontTx/>
+              <a:buChar char="•"/>
+              <a:tabLst/>
+            </a:pPr>
+            <a:endParaRPr kumimoji="0" lang="en-US" altLang="en-US" sz="1800" b="1" i="0" u="none" strike="noStrike" cap="none" normalizeH="0" baseline="0" dirty="0">
+              <a:ln>
+                <a:noFill/>
+              </a:ln>
+              <a:solidFill>
+                <a:schemeClr val="tx1"/>
+              </a:solidFill>
+              <a:effectLst/>
+              <a:latin typeface="Arial" panose="020B0604020202020204" pitchFamily="34" charset="0"/>
+            </a:endParaRPr>
+          </a:p>
+          <a:p>
+            <a:pPr marL="0" marR="0" lvl="0" indent="0" algn="l" defTabSz="914400" rtl="0" eaLnBrk="0" fontAlgn="base" latinLnBrk="0" hangingPunct="0">
+              <a:lnSpc>
+                <a:spcPct val="100000"/>
+              </a:lnSpc>
+              <a:spcBef>
+                <a:spcPct val="0"/>
+              </a:spcBef>
+              <a:spcAft>
+                <a:spcPct val="0"/>
+              </a:spcAft>
+              <a:buClrTx/>
+              <a:buSzTx/>
+              <a:buFontTx/>
+              <a:buChar char="•"/>
+              <a:tabLst/>
+            </a:pPr>
+            <a:r>
+              <a:rPr kumimoji="0" lang="en-US" altLang="en-US" sz="1800" b="1" i="0" u="none" strike="noStrike" cap="none" normalizeH="0" baseline="0" dirty="0">
+                <a:ln>
+                  <a:noFill/>
+                </a:ln>
+                <a:solidFill>
+                  <a:schemeClr val="tx1"/>
+                </a:solidFill>
+                <a:effectLst/>
+                <a:latin typeface="Arial" panose="020B0604020202020204" pitchFamily="34" charset="0"/>
+              </a:rPr>
+              <a:t>Input (conversation history)</a:t>
+            </a:r>
+            <a:r>
+              <a:rPr kumimoji="0" lang="en-US" altLang="en-US" sz="1800" b="0" i="0" u="none" strike="noStrike" cap="none" normalizeH="0" baseline="0" dirty="0">
+                <a:ln>
+                  <a:noFill/>
+                </a:ln>
+                <a:solidFill>
+                  <a:schemeClr val="tx1"/>
+                </a:solidFill>
+                <a:effectLst/>
+                <a:latin typeface="Arial" panose="020B0604020202020204" pitchFamily="34" charset="0"/>
+              </a:rPr>
+              <a:t>:</a:t>
+            </a:r>
+          </a:p>
+          <a:p>
+            <a:pPr marL="457200" marR="0" lvl="1" indent="0" algn="l" defTabSz="914400" rtl="0" eaLnBrk="0" fontAlgn="base" latinLnBrk="0" hangingPunct="0">
+              <a:lnSpc>
+                <a:spcPct val="100000"/>
+              </a:lnSpc>
+              <a:spcBef>
+                <a:spcPct val="0"/>
+              </a:spcBef>
+              <a:spcAft>
+                <a:spcPct val="0"/>
+              </a:spcAft>
+              <a:buClrTx/>
+              <a:buSzTx/>
+              <a:buFontTx/>
+              <a:buChar char="•"/>
+              <a:tabLst/>
+            </a:pPr>
+            <a:r>
+              <a:rPr kumimoji="0" lang="en-US" altLang="en-US" sz="1800" b="0" i="0" u="none" strike="noStrike" cap="none" normalizeH="0" baseline="0" dirty="0">
+                <a:ln>
+                  <a:noFill/>
+                </a:ln>
+                <a:solidFill>
+                  <a:schemeClr val="tx1"/>
+                </a:solidFill>
+                <a:effectLst/>
+                <a:latin typeface="Arial" panose="020B0604020202020204" pitchFamily="34" charset="0"/>
+              </a:rPr>
+              <a:t>Human: "What is the capital of France?"</a:t>
+            </a:r>
+          </a:p>
+          <a:p>
+            <a:pPr marL="457200" marR="0" lvl="1" indent="0" algn="l" defTabSz="914400" rtl="0" eaLnBrk="0" fontAlgn="base" latinLnBrk="0" hangingPunct="0">
+              <a:lnSpc>
+                <a:spcPct val="100000"/>
+              </a:lnSpc>
+              <a:spcBef>
+                <a:spcPct val="0"/>
+              </a:spcBef>
+              <a:spcAft>
+                <a:spcPct val="0"/>
+              </a:spcAft>
+              <a:buClrTx/>
+              <a:buSzTx/>
+              <a:buFontTx/>
+              <a:buChar char="•"/>
+              <a:tabLst/>
+            </a:pPr>
+            <a:r>
+              <a:rPr kumimoji="0" lang="en-US" altLang="en-US" sz="1800" b="0" i="0" u="none" strike="noStrike" cap="none" normalizeH="0" baseline="0" dirty="0">
+                <a:ln>
+                  <a:noFill/>
+                </a:ln>
+                <a:solidFill>
+                  <a:schemeClr val="tx1"/>
+                </a:solidFill>
+                <a:effectLst/>
+                <a:latin typeface="Arial" panose="020B0604020202020204" pitchFamily="34" charset="0"/>
+              </a:rPr>
+              <a:t>Model: "The capital of France is ___"</a:t>
+            </a:r>
+          </a:p>
+          <a:p>
+            <a:pPr marL="0" marR="0" lvl="0" indent="0" algn="l" defTabSz="914400" rtl="0" eaLnBrk="0" fontAlgn="base" latinLnBrk="0" hangingPunct="0">
+              <a:lnSpc>
+                <a:spcPct val="100000"/>
+              </a:lnSpc>
+              <a:spcBef>
+                <a:spcPct val="0"/>
+              </a:spcBef>
+              <a:spcAft>
+                <a:spcPct val="0"/>
+              </a:spcAft>
+              <a:buClrTx/>
+              <a:buSzTx/>
+              <a:buFontTx/>
+              <a:buChar char="•"/>
+              <a:tabLst/>
+            </a:pPr>
+            <a:endParaRPr kumimoji="0" lang="en-US" altLang="en-US" sz="1800" b="1" i="0" u="none" strike="noStrike" cap="none" normalizeH="0" baseline="0" dirty="0">
+              <a:ln>
+                <a:noFill/>
+              </a:ln>
+              <a:solidFill>
+                <a:schemeClr val="tx1"/>
+              </a:solidFill>
+              <a:effectLst/>
+              <a:latin typeface="Arial" panose="020B0604020202020204" pitchFamily="34" charset="0"/>
+            </a:endParaRPr>
+          </a:p>
+          <a:p>
+            <a:pPr marL="0" marR="0" lvl="0" indent="0" algn="l" defTabSz="914400" rtl="0" eaLnBrk="0" fontAlgn="base" latinLnBrk="0" hangingPunct="0">
+              <a:lnSpc>
+                <a:spcPct val="100000"/>
+              </a:lnSpc>
+              <a:spcBef>
+                <a:spcPct val="0"/>
+              </a:spcBef>
+              <a:spcAft>
+                <a:spcPct val="0"/>
+              </a:spcAft>
+              <a:buClrTx/>
+              <a:buSzTx/>
+              <a:buFontTx/>
+              <a:buChar char="•"/>
+              <a:tabLst/>
+            </a:pPr>
+            <a:r>
+              <a:rPr kumimoji="0" lang="en-US" altLang="en-US" sz="1800" b="1" i="0" u="none" strike="noStrike" cap="none" normalizeH="0" baseline="0" dirty="0">
+                <a:ln>
+                  <a:noFill/>
+                </a:ln>
+                <a:solidFill>
+                  <a:schemeClr val="tx1"/>
+                </a:solidFill>
+                <a:effectLst/>
+                <a:latin typeface="Arial" panose="020B0604020202020204" pitchFamily="34" charset="0"/>
+              </a:rPr>
+              <a:t>True label (ideal response from the human-labeled dataset)</a:t>
+            </a:r>
+            <a:r>
+              <a:rPr kumimoji="0" lang="en-US" altLang="en-US" sz="1800" b="0" i="0" u="none" strike="noStrike" cap="none" normalizeH="0" baseline="0" dirty="0">
+                <a:ln>
+                  <a:noFill/>
+                </a:ln>
+                <a:solidFill>
+                  <a:schemeClr val="tx1"/>
+                </a:solidFill>
+                <a:effectLst/>
+                <a:latin typeface="Arial" panose="020B0604020202020204" pitchFamily="34" charset="0"/>
+              </a:rPr>
+              <a:t>:</a:t>
+            </a:r>
+          </a:p>
+          <a:p>
+            <a:pPr marL="457200" marR="0" lvl="1" indent="0" algn="l" defTabSz="914400" rtl="0" eaLnBrk="0" fontAlgn="base" latinLnBrk="0" hangingPunct="0">
+              <a:lnSpc>
+                <a:spcPct val="100000"/>
+              </a:lnSpc>
+              <a:spcBef>
+                <a:spcPct val="0"/>
+              </a:spcBef>
+              <a:spcAft>
+                <a:spcPct val="0"/>
+              </a:spcAft>
+              <a:buClrTx/>
+              <a:buSzTx/>
+              <a:buFontTx/>
+              <a:buChar char="•"/>
+              <a:tabLst/>
+            </a:pPr>
+            <a:r>
+              <a:rPr kumimoji="0" lang="en-US" altLang="en-US" sz="1800" b="0" i="0" u="none" strike="noStrike" cap="none" normalizeH="0" baseline="0" dirty="0">
+                <a:ln>
+                  <a:noFill/>
+                </a:ln>
+                <a:solidFill>
+                  <a:schemeClr val="tx1"/>
+                </a:solidFill>
+                <a:effectLst/>
+                <a:latin typeface="Arial" panose="020B0604020202020204" pitchFamily="34" charset="0"/>
+              </a:rPr>
+              <a:t>"Paris"</a:t>
+            </a:r>
+          </a:p>
+          <a:p>
+            <a:pPr marL="0" marR="0" lvl="0" indent="0" algn="l" defTabSz="914400" rtl="0" eaLnBrk="0" fontAlgn="base" latinLnBrk="0" hangingPunct="0">
+              <a:lnSpc>
+                <a:spcPct val="100000"/>
+              </a:lnSpc>
+              <a:spcBef>
+                <a:spcPct val="0"/>
+              </a:spcBef>
+              <a:spcAft>
+                <a:spcPct val="0"/>
+              </a:spcAft>
+              <a:buClrTx/>
+              <a:buSzTx/>
+              <a:buFontTx/>
+              <a:buChar char="•"/>
+              <a:tabLst/>
+            </a:pPr>
+            <a:r>
+              <a:rPr kumimoji="0" lang="en-US" altLang="en-US" sz="1800" b="1" i="0" u="none" strike="noStrike" cap="none" normalizeH="0" baseline="0" dirty="0">
+                <a:ln>
+                  <a:noFill/>
+                </a:ln>
+                <a:solidFill>
+                  <a:schemeClr val="tx1"/>
+                </a:solidFill>
+                <a:effectLst/>
+                <a:latin typeface="Arial" panose="020B0604020202020204" pitchFamily="34" charset="0"/>
+              </a:rPr>
+              <a:t>Predicted output (probability distribution over the vocabulary)</a:t>
+            </a:r>
+            <a:r>
+              <a:rPr kumimoji="0" lang="en-US" altLang="en-US" sz="1800" b="0" i="0" u="none" strike="noStrike" cap="none" normalizeH="0" baseline="0" dirty="0">
+                <a:ln>
+                  <a:noFill/>
+                </a:ln>
+                <a:solidFill>
+                  <a:schemeClr val="tx1"/>
+                </a:solidFill>
+                <a:effectLst/>
+                <a:latin typeface="Arial" panose="020B0604020202020204" pitchFamily="34" charset="0"/>
+              </a:rPr>
+              <a:t>:</a:t>
+            </a:r>
+          </a:p>
+          <a:p>
+            <a:pPr marL="457200" marR="0" lvl="1" indent="0" algn="l" defTabSz="914400" rtl="0" eaLnBrk="0" fontAlgn="base" latinLnBrk="0" hangingPunct="0">
+              <a:lnSpc>
+                <a:spcPct val="100000"/>
+              </a:lnSpc>
+              <a:spcBef>
+                <a:spcPct val="0"/>
+              </a:spcBef>
+              <a:spcAft>
+                <a:spcPct val="0"/>
+              </a:spcAft>
+              <a:buClrTx/>
+              <a:buSzTx/>
+              <a:buFontTx/>
+              <a:buChar char="•"/>
+              <a:tabLst/>
+            </a:pPr>
+            <a:r>
+              <a:rPr kumimoji="0" lang="en-US" altLang="en-US" sz="1800" b="0" i="0" u="none" strike="noStrike" cap="none" normalizeH="0" baseline="0" dirty="0">
+                <a:ln>
+                  <a:noFill/>
+                </a:ln>
+                <a:solidFill>
+                  <a:schemeClr val="tx1"/>
+                </a:solidFill>
+                <a:effectLst/>
+                <a:latin typeface="Arial" panose="020B0604020202020204" pitchFamily="34" charset="0"/>
+              </a:rPr>
+              <a:t>The model predicts the next word (token) in the sequence with a probability distribution over the entire vocabulary. Let’s say it predicts:</a:t>
+            </a:r>
+          </a:p>
+          <a:p>
+            <a:pPr marL="0" marR="0" lvl="0" indent="0" algn="l" defTabSz="914400" rtl="0" eaLnBrk="0" fontAlgn="base" latinLnBrk="0" hangingPunct="0">
+              <a:lnSpc>
+                <a:spcPct val="100000"/>
+              </a:lnSpc>
+              <a:spcBef>
+                <a:spcPct val="0"/>
+              </a:spcBef>
+              <a:spcAft>
+                <a:spcPct val="0"/>
+              </a:spcAft>
+              <a:buClrTx/>
+              <a:buSzTx/>
+              <a:buFontTx/>
+              <a:buNone/>
+              <a:tabLst/>
+            </a:pPr>
+            <a:endParaRPr kumimoji="0" lang="en-US" altLang="en-US" sz="1000" b="0" i="0" u="none" strike="noStrike" cap="none" normalizeH="0" baseline="0" dirty="0">
+              <a:ln>
+                <a:noFill/>
+              </a:ln>
+              <a:solidFill>
+                <a:schemeClr val="tx1"/>
+              </a:solidFill>
+              <a:effectLst/>
+              <a:latin typeface="Arial Unicode MS"/>
+            </a:endParaRPr>
+          </a:p>
+          <a:p>
+            <a:pPr marL="0" marR="0" lvl="0" indent="0" algn="l" defTabSz="914400" rtl="0" eaLnBrk="0" fontAlgn="base" latinLnBrk="0" hangingPunct="0">
+              <a:lnSpc>
+                <a:spcPct val="100000"/>
+              </a:lnSpc>
+              <a:spcBef>
+                <a:spcPct val="0"/>
+              </a:spcBef>
+              <a:spcAft>
+                <a:spcPct val="0"/>
+              </a:spcAft>
+              <a:buClrTx/>
+              <a:buSzTx/>
+              <a:buFontTx/>
+              <a:buNone/>
+              <a:tabLst/>
+            </a:pPr>
+            <a:r>
+              <a:rPr kumimoji="0" lang="en-US" altLang="en-US" sz="1000" b="0" i="0" u="none" strike="noStrike" cap="none" normalizeH="0" baseline="0" dirty="0">
+                <a:ln>
+                  <a:noFill/>
+                </a:ln>
+                <a:solidFill>
+                  <a:schemeClr val="tx1"/>
+                </a:solidFill>
+                <a:effectLst/>
+                <a:latin typeface="Arial Unicode MS"/>
+              </a:rPr>
+              <a:t>	</a:t>
+            </a:r>
+            <a:r>
+              <a:rPr kumimoji="0" lang="en-US" altLang="en-US" sz="1800" b="0" i="0" u="none" strike="noStrike" cap="none" normalizeH="0" baseline="0" dirty="0">
+                <a:ln>
+                  <a:noFill/>
+                </a:ln>
+                <a:solidFill>
+                  <a:schemeClr val="accent6">
+                    <a:lumMod val="50000"/>
+                  </a:schemeClr>
+                </a:solidFill>
+                <a:effectLst/>
+                <a:latin typeface="Arial Unicode MS"/>
+              </a:rPr>
+              <a:t>{'London': 0.2, 'Paris': 0.7, 'Berlin': 0.05, 'Rome': 0.05} </a:t>
+            </a:r>
+          </a:p>
+          <a:p>
+            <a:pPr marL="0" marR="0" lvl="0" indent="0" algn="l" defTabSz="914400" rtl="0" eaLnBrk="0" fontAlgn="base" latinLnBrk="0" hangingPunct="0">
+              <a:lnSpc>
+                <a:spcPct val="100000"/>
+              </a:lnSpc>
+              <a:spcBef>
+                <a:spcPct val="0"/>
+              </a:spcBef>
+              <a:spcAft>
+                <a:spcPct val="0"/>
+              </a:spcAft>
+              <a:buClrTx/>
+              <a:buSzTx/>
+              <a:buFontTx/>
+              <a:buNone/>
+              <a:tabLst/>
+            </a:pPr>
+            <a:endParaRPr kumimoji="0" lang="en-US" altLang="en-US" sz="800" b="0" i="0" u="none" strike="noStrike" cap="none" normalizeH="0" baseline="0" dirty="0">
+              <a:ln>
+                <a:noFill/>
+              </a:ln>
+              <a:solidFill>
+                <a:schemeClr val="tx1"/>
+              </a:solidFill>
+              <a:effectLst/>
+            </a:endParaRPr>
+          </a:p>
+          <a:p>
+            <a:pPr marL="457200" marR="0" lvl="1" indent="0" algn="l" defTabSz="914400" rtl="0" eaLnBrk="0" fontAlgn="base" latinLnBrk="0" hangingPunct="0">
+              <a:lnSpc>
+                <a:spcPct val="100000"/>
+              </a:lnSpc>
+              <a:spcBef>
+                <a:spcPct val="0"/>
+              </a:spcBef>
+              <a:spcAft>
+                <a:spcPct val="0"/>
+              </a:spcAft>
+              <a:buClrTx/>
+              <a:buSzTx/>
+              <a:buFontTx/>
+              <a:buChar char="•"/>
+              <a:tabLst/>
+            </a:pPr>
+            <a:r>
+              <a:rPr kumimoji="0" lang="en-US" altLang="en-US" sz="1800" b="0" i="0" u="none" strike="noStrike" cap="none" normalizeH="0" baseline="0" dirty="0">
+                <a:ln>
+                  <a:noFill/>
+                </a:ln>
+                <a:solidFill>
+                  <a:schemeClr val="tx1"/>
+                </a:solidFill>
+                <a:effectLst/>
+                <a:latin typeface="Arial" panose="020B0604020202020204" pitchFamily="34" charset="0"/>
+              </a:rPr>
+              <a:t>In this case, the model predicted "Paris" with a probability of 0.7, but its goal is to predict it with a probability close to 1.</a:t>
+            </a:r>
+          </a:p>
+          <a:p>
+            <a:pPr marL="0" marR="0" lvl="0" indent="0" algn="l" defTabSz="914400" rtl="0" eaLnBrk="0" fontAlgn="base" latinLnBrk="0" hangingPunct="0">
+              <a:lnSpc>
+                <a:spcPct val="100000"/>
+              </a:lnSpc>
+              <a:spcBef>
+                <a:spcPct val="0"/>
+              </a:spcBef>
+              <a:spcAft>
+                <a:spcPct val="0"/>
+              </a:spcAft>
+              <a:buClrTx/>
+              <a:buSzTx/>
+              <a:buFontTx/>
+              <a:buNone/>
+              <a:tabLst/>
+            </a:pPr>
+            <a:endParaRPr kumimoji="0" lang="en-US" altLang="en-US" sz="1800" b="0" i="0" u="none" strike="noStrike" cap="none" normalizeH="0" baseline="0" dirty="0">
+              <a:ln>
+                <a:noFill/>
+              </a:ln>
+              <a:solidFill>
+                <a:schemeClr val="tx1"/>
+              </a:solidFill>
+              <a:effectLst/>
+              <a:latin typeface="Arial" panose="020B0604020202020204" pitchFamily="34" charset="0"/>
+            </a:endParaRPr>
+          </a:p>
+        </p:txBody>
+      </p:sp>
+    </p:spTree>
+    <p:extLst>
+      <p:ext uri="{BB962C8B-B14F-4D97-AF65-F5344CB8AC3E}">
+        <p14:creationId xmlns:p14="http://schemas.microsoft.com/office/powerpoint/2010/main" val="2178326391"/>
+      </p:ext>
+    </p:extLst>
+  </p:cSld>
+  <p:clrMapOvr>
+    <a:masterClrMapping/>
+  </p:clrMapOvr>
+</p:sld>
+</file>
+
+<file path=ppt/slides/slide25.xml><?xml version="1.0" encoding="utf-8"?>
+<p:sld xmlns:a="http://schemas.openxmlformats.org/drawingml/2006/main" xmlns:r="http://schemas.openxmlformats.org/officeDocument/2006/relationships" xmlns:p="http://schemas.openxmlformats.org/presentationml/2006/main">
+  <p:cSld>
+    <p:spTree>
+      <p:nvGrpSpPr>
+        <p:cNvPr id="1" name=""/>
+        <p:cNvGrpSpPr/>
+        <p:nvPr/>
+      </p:nvGrpSpPr>
+      <p:grpSpPr>
+        <a:xfrm>
+          <a:off x="0" y="0"/>
+          <a:ext cx="0" cy="0"/>
+          <a:chOff x="0" y="0"/>
+          <a:chExt cx="0" cy="0"/>
+        </a:xfrm>
+      </p:grpSpPr>
+      <p:sp>
+        <p:nvSpPr>
+          <p:cNvPr id="2" name="Title 1">
+            <a:extLst>
+              <a:ext uri="{FF2B5EF4-FFF2-40B4-BE49-F238E27FC236}">
+                <a16:creationId xmlns:a16="http://schemas.microsoft.com/office/drawing/2014/main" id="{332138A5-7944-47C3-858A-1C3F6532F5D6}"/>
+              </a:ext>
+            </a:extLst>
+          </p:cNvPr>
+          <p:cNvSpPr>
+            <a:spLocks noGrp="1"/>
+          </p:cNvSpPr>
+          <p:nvPr>
+            <p:ph type="title"/>
+          </p:nvPr>
+        </p:nvSpPr>
+        <p:spPr/>
+        <p:txBody>
+          <a:bodyPr/>
+          <a:lstStyle/>
+          <a:p>
+            <a:endParaRPr lang="en-IN"/>
+          </a:p>
+        </p:txBody>
+      </p:sp>
+      <p:sp>
+        <p:nvSpPr>
+          <p:cNvPr id="3" name="Content Placeholder 2">
+            <a:extLst>
+              <a:ext uri="{FF2B5EF4-FFF2-40B4-BE49-F238E27FC236}">
+                <a16:creationId xmlns:a16="http://schemas.microsoft.com/office/drawing/2014/main" id="{C7C07FE1-8B03-4427-888C-194294C0ADF0}"/>
+              </a:ext>
+            </a:extLst>
+          </p:cNvPr>
+          <p:cNvSpPr>
+            <a:spLocks noGrp="1"/>
+          </p:cNvSpPr>
+          <p:nvPr>
+            <p:ph idx="1"/>
+          </p:nvPr>
+        </p:nvSpPr>
+        <p:spPr/>
+        <p:txBody>
+          <a:bodyPr>
+            <a:normAutofit fontScale="85000" lnSpcReduction="20000"/>
+          </a:bodyPr>
+          <a:lstStyle/>
+          <a:p>
+            <a:pPr marL="0" indent="0">
+              <a:buNone/>
+            </a:pPr>
+            <a:r>
+              <a:rPr lang="en-US" b="1" dirty="0">
+                <a:latin typeface="Times New Roman" panose="02020603050405020304" pitchFamily="18" charset="0"/>
+                <a:cs typeface="Times New Roman" panose="02020603050405020304" pitchFamily="18" charset="0"/>
+              </a:rPr>
+              <a:t>Categorical Cross-Entropy Loss Calculation</a:t>
+            </a:r>
+            <a:r>
+              <a:rPr lang="en-US" dirty="0">
+                <a:latin typeface="Times New Roman" panose="02020603050405020304" pitchFamily="18" charset="0"/>
+                <a:cs typeface="Times New Roman" panose="02020603050405020304" pitchFamily="18" charset="0"/>
+              </a:rPr>
+              <a:t>:</a:t>
+            </a:r>
+          </a:p>
+          <a:p>
+            <a:r>
+              <a:rPr lang="en-US" dirty="0">
+                <a:latin typeface="Times New Roman" panose="02020603050405020304" pitchFamily="18" charset="0"/>
+                <a:cs typeface="Times New Roman" panose="02020603050405020304" pitchFamily="18" charset="0"/>
+              </a:rPr>
+              <a:t>The loss is calculated as the </a:t>
+            </a:r>
+            <a:r>
+              <a:rPr lang="en-US" b="1" dirty="0">
+                <a:latin typeface="Times New Roman" panose="02020603050405020304" pitchFamily="18" charset="0"/>
+                <a:cs typeface="Times New Roman" panose="02020603050405020304" pitchFamily="18" charset="0"/>
+              </a:rPr>
+              <a:t>negative log likelihood</a:t>
+            </a:r>
+            <a:r>
+              <a:rPr lang="en-US" dirty="0">
+                <a:latin typeface="Times New Roman" panose="02020603050405020304" pitchFamily="18" charset="0"/>
+                <a:cs typeface="Times New Roman" panose="02020603050405020304" pitchFamily="18" charset="0"/>
+              </a:rPr>
+              <a:t> of the correct word (in this case, "Paris").</a:t>
+            </a:r>
+          </a:p>
+          <a:p>
+            <a:r>
+              <a:rPr lang="en-US" dirty="0">
+                <a:latin typeface="Times New Roman" panose="02020603050405020304" pitchFamily="18" charset="0"/>
+                <a:cs typeface="Times New Roman" panose="02020603050405020304" pitchFamily="18" charset="0"/>
+              </a:rPr>
+              <a:t>The formula for </a:t>
+            </a:r>
+            <a:r>
+              <a:rPr lang="en-US" b="1" dirty="0">
+                <a:latin typeface="Times New Roman" panose="02020603050405020304" pitchFamily="18" charset="0"/>
+                <a:cs typeface="Times New Roman" panose="02020603050405020304" pitchFamily="18" charset="0"/>
+              </a:rPr>
+              <a:t>categorical cross-entropy</a:t>
+            </a:r>
+            <a:r>
+              <a:rPr lang="en-US" dirty="0">
+                <a:latin typeface="Times New Roman" panose="02020603050405020304" pitchFamily="18" charset="0"/>
+                <a:cs typeface="Times New Roman" panose="02020603050405020304" pitchFamily="18" charset="0"/>
+              </a:rPr>
+              <a:t> is: </a:t>
+            </a:r>
+          </a:p>
+          <a:p>
+            <a:pPr marL="0" indent="0">
+              <a:buNone/>
+            </a:pPr>
+            <a:r>
+              <a:rPr lang="en-US" dirty="0">
+                <a:latin typeface="Times New Roman" panose="02020603050405020304" pitchFamily="18" charset="0"/>
+                <a:cs typeface="Times New Roman" panose="02020603050405020304" pitchFamily="18" charset="0"/>
+              </a:rPr>
+              <a:t>Loss = −∑(true probability × log(predicted probability))</a:t>
+            </a:r>
+          </a:p>
+          <a:p>
+            <a:endParaRPr lang="en-US" dirty="0">
+              <a:latin typeface="Times New Roman" panose="02020603050405020304" pitchFamily="18" charset="0"/>
+              <a:cs typeface="Times New Roman" panose="02020603050405020304" pitchFamily="18" charset="0"/>
+            </a:endParaRPr>
+          </a:p>
+          <a:p>
+            <a:r>
+              <a:rPr lang="en-US" dirty="0">
+                <a:latin typeface="Times New Roman" panose="02020603050405020304" pitchFamily="18" charset="0"/>
+                <a:cs typeface="Times New Roman" panose="02020603050405020304" pitchFamily="18" charset="0"/>
+              </a:rPr>
+              <a:t>For this example, the true probability for "Paris" is 1, so the loss will be: </a:t>
+            </a:r>
+          </a:p>
+          <a:p>
+            <a:pPr marL="0" indent="0">
+              <a:buNone/>
+            </a:pPr>
+            <a:endParaRPr lang="en-US" dirty="0">
+              <a:latin typeface="Times New Roman" panose="02020603050405020304" pitchFamily="18" charset="0"/>
+              <a:cs typeface="Times New Roman" panose="02020603050405020304" pitchFamily="18" charset="0"/>
+            </a:endParaRPr>
+          </a:p>
+          <a:p>
+            <a:pPr marL="0" indent="0">
+              <a:buNone/>
+            </a:pPr>
+            <a:r>
+              <a:rPr lang="en-US" dirty="0">
+                <a:latin typeface="Times New Roman" panose="02020603050405020304" pitchFamily="18" charset="0"/>
+                <a:cs typeface="Times New Roman" panose="02020603050405020304" pitchFamily="18" charset="0"/>
+              </a:rPr>
+              <a:t>Loss= - log(0.7) = 0.155</a:t>
+            </a:r>
+          </a:p>
+          <a:p>
+            <a:pPr marL="0" indent="0">
+              <a:buNone/>
+            </a:pPr>
+            <a:endParaRPr lang="en-US" dirty="0">
+              <a:latin typeface="Times New Roman" panose="02020603050405020304" pitchFamily="18" charset="0"/>
+              <a:cs typeface="Times New Roman" panose="02020603050405020304" pitchFamily="18" charset="0"/>
+            </a:endParaRPr>
+          </a:p>
+          <a:p>
+            <a:pPr marL="0" indent="0">
+              <a:buNone/>
+            </a:pPr>
+            <a:r>
+              <a:rPr lang="en-US" dirty="0">
+                <a:latin typeface="Times New Roman" panose="02020603050405020304" pitchFamily="18" charset="0"/>
+                <a:cs typeface="Times New Roman" panose="02020603050405020304" pitchFamily="18" charset="0"/>
+              </a:rPr>
+              <a:t>This loss is backpropagated, and the model is updated to </a:t>
+            </a:r>
+            <a:r>
+              <a:rPr lang="en-US" b="1" dirty="0">
+                <a:latin typeface="Times New Roman" panose="02020603050405020304" pitchFamily="18" charset="0"/>
+                <a:cs typeface="Times New Roman" panose="02020603050405020304" pitchFamily="18" charset="0"/>
+              </a:rPr>
+              <a:t>maximize the probability</a:t>
+            </a:r>
+            <a:r>
+              <a:rPr lang="en-US" dirty="0">
+                <a:latin typeface="Times New Roman" panose="02020603050405020304" pitchFamily="18" charset="0"/>
+                <a:cs typeface="Times New Roman" panose="02020603050405020304" pitchFamily="18" charset="0"/>
+              </a:rPr>
+              <a:t> of predicting the correct tokens for future responses.</a:t>
+            </a:r>
+          </a:p>
+          <a:p>
+            <a:endParaRPr lang="en-IN" dirty="0">
+              <a:latin typeface="Times New Roman" panose="02020603050405020304" pitchFamily="18" charset="0"/>
+              <a:cs typeface="Times New Roman" panose="02020603050405020304" pitchFamily="18" charset="0"/>
+            </a:endParaRPr>
+          </a:p>
+        </p:txBody>
+      </p:sp>
+    </p:spTree>
+    <p:extLst>
+      <p:ext uri="{BB962C8B-B14F-4D97-AF65-F5344CB8AC3E}">
+        <p14:creationId xmlns:p14="http://schemas.microsoft.com/office/powerpoint/2010/main" val="2244527819"/>
       </p:ext>
     </p:extLst>
   </p:cSld>
@@ -4444,6 +7929,973 @@
     <p:extLst>
       <p:ext uri="{BB962C8B-B14F-4D97-AF65-F5344CB8AC3E}">
         <p14:creationId xmlns:p14="http://schemas.microsoft.com/office/powerpoint/2010/main" val="42372579"/>
+      </p:ext>
+    </p:extLst>
+  </p:cSld>
+  <p:clrMapOvr>
+    <a:masterClrMapping/>
+  </p:clrMapOvr>
+</p:sld>
+</file>
+
+<file path=ppt/slides/slide6.xml><?xml version="1.0" encoding="utf-8"?>
+<p:sld xmlns:a="http://schemas.openxmlformats.org/drawingml/2006/main" xmlns:r="http://schemas.openxmlformats.org/officeDocument/2006/relationships" xmlns:p="http://schemas.openxmlformats.org/presentationml/2006/main">
+  <p:cSld>
+    <p:spTree>
+      <p:nvGrpSpPr>
+        <p:cNvPr id="1" name=""/>
+        <p:cNvGrpSpPr/>
+        <p:nvPr/>
+      </p:nvGrpSpPr>
+      <p:grpSpPr>
+        <a:xfrm>
+          <a:off x="0" y="0"/>
+          <a:ext cx="0" cy="0"/>
+          <a:chOff x="0" y="0"/>
+          <a:chExt cx="0" cy="0"/>
+        </a:xfrm>
+      </p:grpSpPr>
+      <p:sp>
+        <p:nvSpPr>
+          <p:cNvPr id="2" name="Title 1">
+            <a:extLst>
+              <a:ext uri="{FF2B5EF4-FFF2-40B4-BE49-F238E27FC236}">
+                <a16:creationId xmlns:a16="http://schemas.microsoft.com/office/drawing/2014/main" id="{79E64ABB-CD0A-4309-BB26-AC3F4BA23A26}"/>
+              </a:ext>
+            </a:extLst>
+          </p:cNvPr>
+          <p:cNvSpPr>
+            <a:spLocks noGrp="1"/>
+          </p:cNvSpPr>
+          <p:nvPr>
+            <p:ph type="title"/>
+          </p:nvPr>
+        </p:nvSpPr>
+        <p:spPr/>
+        <p:txBody>
+          <a:bodyPr/>
+          <a:lstStyle/>
+          <a:p>
+            <a:r>
+              <a:rPr lang="en-US" dirty="0"/>
+              <a:t>Steps in creating a Generative Model</a:t>
+            </a:r>
+            <a:endParaRPr lang="en-IN" dirty="0"/>
+          </a:p>
+        </p:txBody>
+      </p:sp>
+      <p:sp>
+        <p:nvSpPr>
+          <p:cNvPr id="4" name="Rectangle 1">
+            <a:extLst>
+              <a:ext uri="{FF2B5EF4-FFF2-40B4-BE49-F238E27FC236}">
+                <a16:creationId xmlns:a16="http://schemas.microsoft.com/office/drawing/2014/main" id="{C24553F8-4291-4D5C-9C5D-3073E2735F5D}"/>
+              </a:ext>
+            </a:extLst>
+          </p:cNvPr>
+          <p:cNvSpPr>
+            <a:spLocks noGrp="1" noChangeArrowheads="1"/>
+          </p:cNvSpPr>
+          <p:nvPr>
+            <p:ph idx="1"/>
+          </p:nvPr>
+        </p:nvSpPr>
+        <p:spPr bwMode="auto">
+          <a:xfrm>
+            <a:off x="838200" y="2154637"/>
+            <a:ext cx="10515600" cy="3693319"/>
+          </a:xfrm>
+          <a:prstGeom prst="rect">
+            <a:avLst/>
+          </a:prstGeom>
+          <a:noFill/>
+          <a:ln>
+            <a:noFill/>
+          </a:ln>
+          <a:effectLst/>
+          <a:extLst>
+            <a:ext uri="{909E8E84-426E-40DD-AFC4-6F175D3DCCD1}">
+              <a14:hiddenFill xmlns:a14="http://schemas.microsoft.com/office/drawing/2010/main">
+                <a:solidFill>
+                  <a:schemeClr val="accent1"/>
+                </a:solidFill>
+              </a14:hiddenFill>
+            </a:ext>
+            <a:ext uri="{91240B29-F687-4F45-9708-019B960494DF}">
+              <a14:hiddenLine xmlns:a14="http://schemas.microsoft.com/office/drawing/2010/main" w="9525">
+                <a:solidFill>
+                  <a:schemeClr val="tx1"/>
+                </a:solidFill>
+                <a:miter lim="800000"/>
+                <a:headEnd/>
+                <a:tailEnd/>
+              </a14:hiddenLine>
+            </a:ext>
+            <a:ext uri="{AF507438-7753-43E0-B8FC-AC1667EBCBE1}">
+              <a14:hiddenEffects xmlns:a14="http://schemas.microsoft.com/office/drawing/2010/main">
+                <a:effectLst>
+                  <a:outerShdw dist="35921" dir="2700000" algn="ctr" rotWithShape="0">
+                    <a:schemeClr val="bg2"/>
+                  </a:outerShdw>
+                </a:effectLst>
+              </a14:hiddenEffects>
+            </a:ext>
+          </a:extLst>
+        </p:spPr>
+        <p:txBody>
+          <a:bodyPr vert="horz" wrap="square" lIns="91440" tIns="45720" rIns="91440" bIns="45720" numCol="1" anchor="ctr" anchorCtr="0" compatLnSpc="1">
+            <a:prstTxWarp prst="textNoShape">
+              <a:avLst/>
+            </a:prstTxWarp>
+            <a:spAutoFit/>
+          </a:bodyPr>
+          <a:lstStyle/>
+          <a:p>
+            <a:pPr marL="0" marR="0" lvl="0" indent="0" algn="l" defTabSz="914400" rtl="0" eaLnBrk="0" fontAlgn="base" latinLnBrk="0" hangingPunct="0">
+              <a:lnSpc>
+                <a:spcPct val="100000"/>
+              </a:lnSpc>
+              <a:spcBef>
+                <a:spcPct val="0"/>
+              </a:spcBef>
+              <a:spcAft>
+                <a:spcPct val="0"/>
+              </a:spcAft>
+              <a:buClrTx/>
+              <a:buSzTx/>
+              <a:buFontTx/>
+              <a:buChar char="•"/>
+              <a:tabLst/>
+            </a:pPr>
+            <a:r>
+              <a:rPr kumimoji="0" lang="en-US" altLang="en-US" sz="1800" b="1" i="0" u="none" strike="noStrike" cap="none" normalizeH="0" baseline="0" dirty="0">
+                <a:ln>
+                  <a:noFill/>
+                </a:ln>
+                <a:solidFill>
+                  <a:schemeClr val="tx1"/>
+                </a:solidFill>
+                <a:effectLst/>
+                <a:latin typeface="Arial" panose="020B0604020202020204" pitchFamily="34" charset="0"/>
+              </a:rPr>
+              <a:t>Data Preparation:</a:t>
+            </a:r>
+            <a:r>
+              <a:rPr kumimoji="0" lang="en-US" altLang="en-US" sz="1800" b="0" i="0" u="none" strike="noStrike" cap="none" normalizeH="0" baseline="0" dirty="0">
+                <a:ln>
+                  <a:noFill/>
+                </a:ln>
+                <a:solidFill>
+                  <a:schemeClr val="tx1"/>
+                </a:solidFill>
+                <a:effectLst/>
+                <a:latin typeface="Arial" panose="020B0604020202020204" pitchFamily="34" charset="0"/>
+              </a:rPr>
+              <a:t> Clean, tokenize, and preprocess raw text data.</a:t>
+            </a:r>
+          </a:p>
+          <a:p>
+            <a:pPr marL="0" marR="0" lvl="0" indent="0" algn="l" defTabSz="914400" rtl="0" eaLnBrk="0" fontAlgn="base" latinLnBrk="0" hangingPunct="0">
+              <a:lnSpc>
+                <a:spcPct val="100000"/>
+              </a:lnSpc>
+              <a:spcBef>
+                <a:spcPct val="0"/>
+              </a:spcBef>
+              <a:spcAft>
+                <a:spcPct val="0"/>
+              </a:spcAft>
+              <a:buClrTx/>
+              <a:buSzTx/>
+              <a:buNone/>
+              <a:tabLst/>
+            </a:pPr>
+            <a:endParaRPr kumimoji="0" lang="en-US" altLang="en-US" sz="1800" b="0" i="0" u="none" strike="noStrike" cap="none" normalizeH="0" baseline="0" dirty="0">
+              <a:ln>
+                <a:noFill/>
+              </a:ln>
+              <a:solidFill>
+                <a:schemeClr val="tx1"/>
+              </a:solidFill>
+              <a:effectLst/>
+              <a:latin typeface="Arial" panose="020B0604020202020204" pitchFamily="34" charset="0"/>
+            </a:endParaRPr>
+          </a:p>
+          <a:p>
+            <a:pPr marL="0" marR="0" lvl="0" indent="0" algn="l" defTabSz="914400" rtl="0" eaLnBrk="0" fontAlgn="base" latinLnBrk="0" hangingPunct="0">
+              <a:lnSpc>
+                <a:spcPct val="100000"/>
+              </a:lnSpc>
+              <a:spcBef>
+                <a:spcPct val="0"/>
+              </a:spcBef>
+              <a:spcAft>
+                <a:spcPct val="0"/>
+              </a:spcAft>
+              <a:buClrTx/>
+              <a:buSzTx/>
+              <a:buFontTx/>
+              <a:buChar char="•"/>
+              <a:tabLst/>
+            </a:pPr>
+            <a:r>
+              <a:rPr kumimoji="0" lang="en-US" altLang="en-US" sz="1800" b="1" i="0" u="none" strike="noStrike" cap="none" normalizeH="0" baseline="0" dirty="0">
+                <a:ln>
+                  <a:noFill/>
+                </a:ln>
+                <a:solidFill>
+                  <a:schemeClr val="tx1"/>
+                </a:solidFill>
+                <a:effectLst/>
+                <a:latin typeface="Arial" panose="020B0604020202020204" pitchFamily="34" charset="0"/>
+              </a:rPr>
+              <a:t>Pretraining (Self-Supervised Learning):</a:t>
+            </a:r>
+            <a:r>
+              <a:rPr kumimoji="0" lang="en-US" altLang="en-US" sz="1800" b="0" i="0" u="none" strike="noStrike" cap="none" normalizeH="0" baseline="0" dirty="0">
+                <a:ln>
+                  <a:noFill/>
+                </a:ln>
+                <a:solidFill>
+                  <a:schemeClr val="tx1"/>
+                </a:solidFill>
+                <a:effectLst/>
+                <a:latin typeface="Arial" panose="020B0604020202020204" pitchFamily="34" charset="0"/>
+              </a:rPr>
+              <a:t> Train the model using unsupervised tasks like MLM and NSP to understand language patterns.</a:t>
+            </a:r>
+          </a:p>
+          <a:p>
+            <a:pPr marL="0" marR="0" lvl="0" indent="0" algn="l" defTabSz="914400" rtl="0" eaLnBrk="0" fontAlgn="base" latinLnBrk="0" hangingPunct="0">
+              <a:lnSpc>
+                <a:spcPct val="100000"/>
+              </a:lnSpc>
+              <a:spcBef>
+                <a:spcPct val="0"/>
+              </a:spcBef>
+              <a:spcAft>
+                <a:spcPct val="0"/>
+              </a:spcAft>
+              <a:buClrTx/>
+              <a:buSzTx/>
+              <a:buNone/>
+              <a:tabLst/>
+            </a:pPr>
+            <a:endParaRPr kumimoji="0" lang="en-US" altLang="en-US" sz="1800" b="0" i="0" u="none" strike="noStrike" cap="none" normalizeH="0" baseline="0" dirty="0">
+              <a:ln>
+                <a:noFill/>
+              </a:ln>
+              <a:solidFill>
+                <a:schemeClr val="tx1"/>
+              </a:solidFill>
+              <a:effectLst/>
+              <a:latin typeface="Arial" panose="020B0604020202020204" pitchFamily="34" charset="0"/>
+            </a:endParaRPr>
+          </a:p>
+          <a:p>
+            <a:pPr marL="0" marR="0" lvl="0" indent="0" algn="l" defTabSz="914400" rtl="0" eaLnBrk="0" fontAlgn="base" latinLnBrk="0" hangingPunct="0">
+              <a:lnSpc>
+                <a:spcPct val="100000"/>
+              </a:lnSpc>
+              <a:spcBef>
+                <a:spcPct val="0"/>
+              </a:spcBef>
+              <a:spcAft>
+                <a:spcPct val="0"/>
+              </a:spcAft>
+              <a:buClrTx/>
+              <a:buSzTx/>
+              <a:buFontTx/>
+              <a:buChar char="•"/>
+              <a:tabLst/>
+            </a:pPr>
+            <a:r>
+              <a:rPr kumimoji="0" lang="en-US" altLang="en-US" sz="1800" b="1" i="0" u="none" strike="noStrike" cap="none" normalizeH="0" baseline="0" dirty="0">
+                <a:ln>
+                  <a:noFill/>
+                </a:ln>
+                <a:solidFill>
+                  <a:schemeClr val="tx1"/>
+                </a:solidFill>
+                <a:effectLst/>
+                <a:latin typeface="Arial" panose="020B0604020202020204" pitchFamily="34" charset="0"/>
+              </a:rPr>
+              <a:t>Supervised Fine-Tuning:</a:t>
+            </a:r>
+            <a:r>
+              <a:rPr kumimoji="0" lang="en-US" altLang="en-US" sz="1800" b="0" i="0" u="none" strike="noStrike" cap="none" normalizeH="0" baseline="0" dirty="0">
+                <a:ln>
+                  <a:noFill/>
+                </a:ln>
+                <a:solidFill>
+                  <a:schemeClr val="tx1"/>
+                </a:solidFill>
+                <a:effectLst/>
+                <a:latin typeface="Arial" panose="020B0604020202020204" pitchFamily="34" charset="0"/>
+              </a:rPr>
+              <a:t> Fine-tune the model on curated human-labeled data for specific tasks.</a:t>
+            </a:r>
+          </a:p>
+          <a:p>
+            <a:pPr marL="0" marR="0" lvl="0" indent="0" algn="l" defTabSz="914400" rtl="0" eaLnBrk="0" fontAlgn="base" latinLnBrk="0" hangingPunct="0">
+              <a:lnSpc>
+                <a:spcPct val="100000"/>
+              </a:lnSpc>
+              <a:spcBef>
+                <a:spcPct val="0"/>
+              </a:spcBef>
+              <a:spcAft>
+                <a:spcPct val="0"/>
+              </a:spcAft>
+              <a:buClrTx/>
+              <a:buSzTx/>
+              <a:buNone/>
+              <a:tabLst/>
+            </a:pPr>
+            <a:endParaRPr kumimoji="0" lang="en-US" altLang="en-US" sz="1800" b="0" i="0" u="none" strike="noStrike" cap="none" normalizeH="0" baseline="0" dirty="0">
+              <a:ln>
+                <a:noFill/>
+              </a:ln>
+              <a:solidFill>
+                <a:schemeClr val="tx1"/>
+              </a:solidFill>
+              <a:effectLst/>
+              <a:latin typeface="Arial" panose="020B0604020202020204" pitchFamily="34" charset="0"/>
+            </a:endParaRPr>
+          </a:p>
+          <a:p>
+            <a:pPr marL="0" marR="0" lvl="0" indent="0" algn="l" defTabSz="914400" rtl="0" eaLnBrk="0" fontAlgn="base" latinLnBrk="0" hangingPunct="0">
+              <a:lnSpc>
+                <a:spcPct val="100000"/>
+              </a:lnSpc>
+              <a:spcBef>
+                <a:spcPct val="0"/>
+              </a:spcBef>
+              <a:spcAft>
+                <a:spcPct val="0"/>
+              </a:spcAft>
+              <a:buClrTx/>
+              <a:buSzTx/>
+              <a:buFontTx/>
+              <a:buChar char="•"/>
+              <a:tabLst/>
+            </a:pPr>
+            <a:r>
+              <a:rPr kumimoji="0" lang="en-US" altLang="en-US" sz="1800" b="1" i="0" u="none" strike="noStrike" cap="none" normalizeH="0" baseline="0" dirty="0">
+                <a:ln>
+                  <a:noFill/>
+                </a:ln>
+                <a:solidFill>
+                  <a:schemeClr val="tx1"/>
+                </a:solidFill>
+                <a:effectLst/>
+                <a:latin typeface="Arial" panose="020B0604020202020204" pitchFamily="34" charset="0"/>
+              </a:rPr>
+              <a:t>Reward Modeling:</a:t>
+            </a:r>
+            <a:r>
+              <a:rPr kumimoji="0" lang="en-US" altLang="en-US" sz="1800" b="0" i="0" u="none" strike="noStrike" cap="none" normalizeH="0" baseline="0" dirty="0">
+                <a:ln>
+                  <a:noFill/>
+                </a:ln>
+                <a:solidFill>
+                  <a:schemeClr val="tx1"/>
+                </a:solidFill>
+                <a:effectLst/>
+                <a:latin typeface="Arial" panose="020B0604020202020204" pitchFamily="34" charset="0"/>
+              </a:rPr>
+              <a:t> Train a model to rank responses based on human feedback.</a:t>
+            </a:r>
+          </a:p>
+          <a:p>
+            <a:pPr marL="0" marR="0" lvl="0" indent="0" algn="l" defTabSz="914400" rtl="0" eaLnBrk="0" fontAlgn="base" latinLnBrk="0" hangingPunct="0">
+              <a:lnSpc>
+                <a:spcPct val="100000"/>
+              </a:lnSpc>
+              <a:spcBef>
+                <a:spcPct val="0"/>
+              </a:spcBef>
+              <a:spcAft>
+                <a:spcPct val="0"/>
+              </a:spcAft>
+              <a:buClrTx/>
+              <a:buSzTx/>
+              <a:buNone/>
+              <a:tabLst/>
+            </a:pPr>
+            <a:endParaRPr kumimoji="0" lang="en-US" altLang="en-US" sz="1800" b="0" i="0" u="none" strike="noStrike" cap="none" normalizeH="0" baseline="0" dirty="0">
+              <a:ln>
+                <a:noFill/>
+              </a:ln>
+              <a:solidFill>
+                <a:schemeClr val="tx1"/>
+              </a:solidFill>
+              <a:effectLst/>
+              <a:latin typeface="Arial" panose="020B0604020202020204" pitchFamily="34" charset="0"/>
+            </a:endParaRPr>
+          </a:p>
+          <a:p>
+            <a:pPr marL="0" marR="0" lvl="0" indent="0" algn="l" defTabSz="914400" rtl="0" eaLnBrk="0" fontAlgn="base" latinLnBrk="0" hangingPunct="0">
+              <a:lnSpc>
+                <a:spcPct val="100000"/>
+              </a:lnSpc>
+              <a:spcBef>
+                <a:spcPct val="0"/>
+              </a:spcBef>
+              <a:spcAft>
+                <a:spcPct val="0"/>
+              </a:spcAft>
+              <a:buClrTx/>
+              <a:buSzTx/>
+              <a:buFontTx/>
+              <a:buChar char="•"/>
+              <a:tabLst/>
+            </a:pPr>
+            <a:r>
+              <a:rPr kumimoji="0" lang="en-US" altLang="en-US" sz="1800" b="1" i="0" u="none" strike="noStrike" cap="none" normalizeH="0" baseline="0" dirty="0">
+                <a:ln>
+                  <a:noFill/>
+                </a:ln>
+                <a:solidFill>
+                  <a:schemeClr val="tx1"/>
+                </a:solidFill>
+                <a:effectLst/>
+                <a:latin typeface="Arial" panose="020B0604020202020204" pitchFamily="34" charset="0"/>
+              </a:rPr>
+              <a:t>Reinforcement Learning (RLHF):</a:t>
+            </a:r>
+            <a:r>
+              <a:rPr kumimoji="0" lang="en-US" altLang="en-US" sz="1800" b="0" i="0" u="none" strike="noStrike" cap="none" normalizeH="0" baseline="0" dirty="0">
+                <a:ln>
+                  <a:noFill/>
+                </a:ln>
+                <a:solidFill>
+                  <a:schemeClr val="tx1"/>
+                </a:solidFill>
+                <a:effectLst/>
+                <a:latin typeface="Arial" panose="020B0604020202020204" pitchFamily="34" charset="0"/>
+              </a:rPr>
+              <a:t> Use reinforcement learning to optimize the model further using the reward model.</a:t>
+            </a:r>
+          </a:p>
+          <a:p>
+            <a:pPr marL="0" marR="0" lvl="0" indent="0" algn="l" defTabSz="914400" rtl="0" eaLnBrk="0" fontAlgn="base" latinLnBrk="0" hangingPunct="0">
+              <a:lnSpc>
+                <a:spcPct val="100000"/>
+              </a:lnSpc>
+              <a:spcBef>
+                <a:spcPct val="0"/>
+              </a:spcBef>
+              <a:spcAft>
+                <a:spcPct val="0"/>
+              </a:spcAft>
+              <a:buClrTx/>
+              <a:buSzTx/>
+              <a:buNone/>
+              <a:tabLst/>
+            </a:pPr>
+            <a:endParaRPr kumimoji="0" lang="en-US" altLang="en-US" sz="1800" b="0" i="0" u="none" strike="noStrike" cap="none" normalizeH="0" baseline="0" dirty="0">
+              <a:ln>
+                <a:noFill/>
+              </a:ln>
+              <a:solidFill>
+                <a:schemeClr val="tx1"/>
+              </a:solidFill>
+              <a:effectLst/>
+              <a:latin typeface="Arial" panose="020B0604020202020204" pitchFamily="34" charset="0"/>
+            </a:endParaRPr>
+          </a:p>
+          <a:p>
+            <a:pPr marL="0" marR="0" lvl="0" indent="0" algn="l" defTabSz="914400" rtl="0" eaLnBrk="0" fontAlgn="base" latinLnBrk="0" hangingPunct="0">
+              <a:lnSpc>
+                <a:spcPct val="100000"/>
+              </a:lnSpc>
+              <a:spcBef>
+                <a:spcPct val="0"/>
+              </a:spcBef>
+              <a:spcAft>
+                <a:spcPct val="0"/>
+              </a:spcAft>
+              <a:buClrTx/>
+              <a:buSzTx/>
+              <a:buFontTx/>
+              <a:buChar char="•"/>
+              <a:tabLst/>
+            </a:pPr>
+            <a:r>
+              <a:rPr kumimoji="0" lang="en-US" altLang="en-US" sz="1800" b="1" i="0" u="none" strike="noStrike" cap="none" normalizeH="0" baseline="0" dirty="0">
+                <a:ln>
+                  <a:noFill/>
+                </a:ln>
+                <a:solidFill>
+                  <a:schemeClr val="tx1"/>
+                </a:solidFill>
+                <a:effectLst/>
+                <a:latin typeface="Arial" panose="020B0604020202020204" pitchFamily="34" charset="0"/>
+              </a:rPr>
+              <a:t>Deployment:</a:t>
+            </a:r>
+            <a:r>
+              <a:rPr kumimoji="0" lang="en-US" altLang="en-US" sz="1800" b="0" i="0" u="none" strike="noStrike" cap="none" normalizeH="0" baseline="0" dirty="0">
+                <a:ln>
+                  <a:noFill/>
+                </a:ln>
+                <a:solidFill>
+                  <a:schemeClr val="tx1"/>
+                </a:solidFill>
+                <a:effectLst/>
+                <a:latin typeface="Arial" panose="020B0604020202020204" pitchFamily="34" charset="0"/>
+              </a:rPr>
+              <a:t> Deploy the model and monitor its performance for continuous improvements. </a:t>
+            </a:r>
+          </a:p>
+        </p:txBody>
+      </p:sp>
+    </p:spTree>
+    <p:extLst>
+      <p:ext uri="{BB962C8B-B14F-4D97-AF65-F5344CB8AC3E}">
+        <p14:creationId xmlns:p14="http://schemas.microsoft.com/office/powerpoint/2010/main" val="2397162497"/>
+      </p:ext>
+    </p:extLst>
+  </p:cSld>
+  <p:clrMapOvr>
+    <a:masterClrMapping/>
+  </p:clrMapOvr>
+</p:sld>
+</file>
+
+<file path=ppt/slides/slide7.xml><?xml version="1.0" encoding="utf-8"?>
+<p:sld xmlns:a="http://schemas.openxmlformats.org/drawingml/2006/main" xmlns:r="http://schemas.openxmlformats.org/officeDocument/2006/relationships" xmlns:p="http://schemas.openxmlformats.org/presentationml/2006/main">
+  <p:cSld>
+    <p:spTree>
+      <p:nvGrpSpPr>
+        <p:cNvPr id="1" name=""/>
+        <p:cNvGrpSpPr/>
+        <p:nvPr/>
+      </p:nvGrpSpPr>
+      <p:grpSpPr>
+        <a:xfrm>
+          <a:off x="0" y="0"/>
+          <a:ext cx="0" cy="0"/>
+          <a:chOff x="0" y="0"/>
+          <a:chExt cx="0" cy="0"/>
+        </a:xfrm>
+      </p:grpSpPr>
+      <p:sp>
+        <p:nvSpPr>
+          <p:cNvPr id="2" name="Title 1">
+            <a:extLst>
+              <a:ext uri="{FF2B5EF4-FFF2-40B4-BE49-F238E27FC236}">
+                <a16:creationId xmlns:a16="http://schemas.microsoft.com/office/drawing/2014/main" id="{E4845B8A-95C1-43A5-A128-DD2998588BFC}"/>
+              </a:ext>
+            </a:extLst>
+          </p:cNvPr>
+          <p:cNvSpPr>
+            <a:spLocks noGrp="1"/>
+          </p:cNvSpPr>
+          <p:nvPr>
+            <p:ph type="title"/>
+          </p:nvPr>
+        </p:nvSpPr>
+        <p:spPr>
+          <a:xfrm>
+            <a:off x="838200" y="0"/>
+            <a:ext cx="10515600" cy="1325563"/>
+          </a:xfrm>
+        </p:spPr>
+        <p:txBody>
+          <a:bodyPr/>
+          <a:lstStyle/>
+          <a:p>
+            <a:r>
+              <a:rPr lang="en-US" dirty="0"/>
+              <a:t>How Chat GPT is Trained</a:t>
+            </a:r>
+            <a:endParaRPr lang="en-IN" dirty="0"/>
+          </a:p>
+        </p:txBody>
+      </p:sp>
+      <p:pic>
+        <p:nvPicPr>
+          <p:cNvPr id="9" name="Picture 8">
+            <a:extLst>
+              <a:ext uri="{FF2B5EF4-FFF2-40B4-BE49-F238E27FC236}">
+                <a16:creationId xmlns:a16="http://schemas.microsoft.com/office/drawing/2014/main" id="{9244CF2A-2FA7-424C-A6D3-F082AA3178C5}"/>
+              </a:ext>
+            </a:extLst>
+          </p:cNvPr>
+          <p:cNvPicPr>
+            <a:picLocks noChangeAspect="1"/>
+          </p:cNvPicPr>
+          <p:nvPr/>
+        </p:nvPicPr>
+        <p:blipFill>
+          <a:blip r:embed="rId2"/>
+          <a:stretch>
+            <a:fillRect/>
+          </a:stretch>
+        </p:blipFill>
+        <p:spPr>
+          <a:xfrm>
+            <a:off x="838200" y="1142325"/>
+            <a:ext cx="6011114" cy="5649113"/>
+          </a:xfrm>
+          <a:prstGeom prst="rect">
+            <a:avLst/>
+          </a:prstGeom>
+        </p:spPr>
+      </p:pic>
+    </p:spTree>
+    <p:extLst>
+      <p:ext uri="{BB962C8B-B14F-4D97-AF65-F5344CB8AC3E}">
+        <p14:creationId xmlns:p14="http://schemas.microsoft.com/office/powerpoint/2010/main" val="2717472491"/>
+      </p:ext>
+    </p:extLst>
+  </p:cSld>
+  <p:clrMapOvr>
+    <a:masterClrMapping/>
+  </p:clrMapOvr>
+</p:sld>
+</file>
+
+<file path=ppt/slides/slide8.xml><?xml version="1.0" encoding="utf-8"?>
+<p:sld xmlns:a="http://schemas.openxmlformats.org/drawingml/2006/main" xmlns:r="http://schemas.openxmlformats.org/officeDocument/2006/relationships" xmlns:p="http://schemas.openxmlformats.org/presentationml/2006/main">
+  <p:cSld>
+    <p:spTree>
+      <p:nvGrpSpPr>
+        <p:cNvPr id="1" name=""/>
+        <p:cNvGrpSpPr/>
+        <p:nvPr/>
+      </p:nvGrpSpPr>
+      <p:grpSpPr>
+        <a:xfrm>
+          <a:off x="0" y="0"/>
+          <a:ext cx="0" cy="0"/>
+          <a:chOff x="0" y="0"/>
+          <a:chExt cx="0" cy="0"/>
+        </a:xfrm>
+      </p:grpSpPr>
+      <p:sp>
+        <p:nvSpPr>
+          <p:cNvPr id="2" name="Title 1">
+            <a:extLst>
+              <a:ext uri="{FF2B5EF4-FFF2-40B4-BE49-F238E27FC236}">
+                <a16:creationId xmlns:a16="http://schemas.microsoft.com/office/drawing/2014/main" id="{A7D4111E-D9FC-4923-B280-918D874BC879}"/>
+              </a:ext>
+            </a:extLst>
+          </p:cNvPr>
+          <p:cNvSpPr>
+            <a:spLocks noGrp="1"/>
+          </p:cNvSpPr>
+          <p:nvPr>
+            <p:ph type="title"/>
+          </p:nvPr>
+        </p:nvSpPr>
+        <p:spPr/>
+        <p:txBody>
+          <a:bodyPr/>
+          <a:lstStyle/>
+          <a:p>
+            <a:r>
+              <a:rPr lang="en-US" dirty="0"/>
+              <a:t>Stage 1 Generative Pre-training </a:t>
+            </a:r>
+            <a:endParaRPr lang="en-IN" dirty="0"/>
+          </a:p>
+        </p:txBody>
+      </p:sp>
+      <p:sp>
+        <p:nvSpPr>
+          <p:cNvPr id="3" name="Content Placeholder 2">
+            <a:extLst>
+              <a:ext uri="{FF2B5EF4-FFF2-40B4-BE49-F238E27FC236}">
+                <a16:creationId xmlns:a16="http://schemas.microsoft.com/office/drawing/2014/main" id="{5609B83C-9052-43BB-BE5D-94964CBA4C76}"/>
+              </a:ext>
+            </a:extLst>
+          </p:cNvPr>
+          <p:cNvSpPr>
+            <a:spLocks noGrp="1"/>
+          </p:cNvSpPr>
+          <p:nvPr>
+            <p:ph idx="1"/>
+          </p:nvPr>
+        </p:nvSpPr>
+        <p:spPr/>
+        <p:txBody>
+          <a:bodyPr/>
+          <a:lstStyle/>
+          <a:p>
+            <a:endParaRPr lang="en-IN" dirty="0"/>
+          </a:p>
+        </p:txBody>
+      </p:sp>
+      <p:pic>
+        <p:nvPicPr>
+          <p:cNvPr id="4" name="Picture 3">
+            <a:extLst>
+              <a:ext uri="{FF2B5EF4-FFF2-40B4-BE49-F238E27FC236}">
+                <a16:creationId xmlns:a16="http://schemas.microsoft.com/office/drawing/2014/main" id="{DC8CBBB2-A986-4FD6-81B5-AC3E71500F5D}"/>
+              </a:ext>
+            </a:extLst>
+          </p:cNvPr>
+          <p:cNvPicPr>
+            <a:picLocks noChangeAspect="1"/>
+          </p:cNvPicPr>
+          <p:nvPr/>
+        </p:nvPicPr>
+        <p:blipFill>
+          <a:blip r:embed="rId2"/>
+          <a:stretch>
+            <a:fillRect/>
+          </a:stretch>
+        </p:blipFill>
+        <p:spPr>
+          <a:xfrm>
+            <a:off x="838200" y="1825625"/>
+            <a:ext cx="10515600" cy="4351338"/>
+          </a:xfrm>
+          <a:prstGeom prst="rect">
+            <a:avLst/>
+          </a:prstGeom>
+        </p:spPr>
+      </p:pic>
+    </p:spTree>
+    <p:extLst>
+      <p:ext uri="{BB962C8B-B14F-4D97-AF65-F5344CB8AC3E}">
+        <p14:creationId xmlns:p14="http://schemas.microsoft.com/office/powerpoint/2010/main" val="588986486"/>
+      </p:ext>
+    </p:extLst>
+  </p:cSld>
+  <p:clrMapOvr>
+    <a:masterClrMapping/>
+  </p:clrMapOvr>
+</p:sld>
+</file>
+
+<file path=ppt/slides/slide9.xml><?xml version="1.0" encoding="utf-8"?>
+<p:sld xmlns:a="http://schemas.openxmlformats.org/drawingml/2006/main" xmlns:r="http://schemas.openxmlformats.org/officeDocument/2006/relationships" xmlns:p="http://schemas.openxmlformats.org/presentationml/2006/main">
+  <p:cSld>
+    <p:spTree>
+      <p:nvGrpSpPr>
+        <p:cNvPr id="1" name=""/>
+        <p:cNvGrpSpPr/>
+        <p:nvPr/>
+      </p:nvGrpSpPr>
+      <p:grpSpPr>
+        <a:xfrm>
+          <a:off x="0" y="0"/>
+          <a:ext cx="0" cy="0"/>
+          <a:chOff x="0" y="0"/>
+          <a:chExt cx="0" cy="0"/>
+        </a:xfrm>
+      </p:grpSpPr>
+      <p:sp>
+        <p:nvSpPr>
+          <p:cNvPr id="2" name="Title 1">
+            <a:extLst>
+              <a:ext uri="{FF2B5EF4-FFF2-40B4-BE49-F238E27FC236}">
+                <a16:creationId xmlns:a16="http://schemas.microsoft.com/office/drawing/2014/main" id="{4267DF03-F62E-4F73-98AC-6DEA467718F5}"/>
+              </a:ext>
+            </a:extLst>
+          </p:cNvPr>
+          <p:cNvSpPr>
+            <a:spLocks noGrp="1"/>
+          </p:cNvSpPr>
+          <p:nvPr>
+            <p:ph type="title"/>
+          </p:nvPr>
+        </p:nvSpPr>
+        <p:spPr/>
+        <p:txBody>
+          <a:bodyPr/>
+          <a:lstStyle/>
+          <a:p>
+            <a:r>
+              <a:rPr lang="en-US" dirty="0"/>
+              <a:t>Stage -1</a:t>
+            </a:r>
+            <a:endParaRPr lang="en-IN" dirty="0"/>
+          </a:p>
+        </p:txBody>
+      </p:sp>
+      <p:sp>
+        <p:nvSpPr>
+          <p:cNvPr id="3" name="Content Placeholder 2">
+            <a:extLst>
+              <a:ext uri="{FF2B5EF4-FFF2-40B4-BE49-F238E27FC236}">
+                <a16:creationId xmlns:a16="http://schemas.microsoft.com/office/drawing/2014/main" id="{EAACC9A7-59EC-40E4-AD7A-C4786FEFFAE6}"/>
+              </a:ext>
+            </a:extLst>
+          </p:cNvPr>
+          <p:cNvSpPr>
+            <a:spLocks noGrp="1"/>
+          </p:cNvSpPr>
+          <p:nvPr>
+            <p:ph idx="1"/>
+          </p:nvPr>
+        </p:nvSpPr>
+        <p:spPr/>
+        <p:txBody>
+          <a:bodyPr>
+            <a:normAutofit fontScale="92500" lnSpcReduction="20000"/>
+          </a:bodyPr>
+          <a:lstStyle/>
+          <a:p>
+            <a:r>
+              <a:rPr lang="en-US" b="1" dirty="0">
+                <a:latin typeface="Times New Roman" panose="02020603050405020304" pitchFamily="18" charset="0"/>
+                <a:cs typeface="Times New Roman" panose="02020603050405020304" pitchFamily="18" charset="0"/>
+              </a:rPr>
+              <a:t>Data Preparation</a:t>
+            </a:r>
+          </a:p>
+          <a:p>
+            <a:r>
+              <a:rPr lang="en-US" b="1" dirty="0">
+                <a:latin typeface="Times New Roman" panose="02020603050405020304" pitchFamily="18" charset="0"/>
+                <a:cs typeface="Times New Roman" panose="02020603050405020304" pitchFamily="18" charset="0"/>
+              </a:rPr>
+              <a:t>Objective:</a:t>
+            </a:r>
+            <a:r>
+              <a:rPr lang="en-US" dirty="0">
+                <a:latin typeface="Times New Roman" panose="02020603050405020304" pitchFamily="18" charset="0"/>
+                <a:cs typeface="Times New Roman" panose="02020603050405020304" pitchFamily="18" charset="0"/>
+              </a:rPr>
+              <a:t> Collect and clean raw data for pretraining the model.</a:t>
+            </a:r>
+          </a:p>
+          <a:p>
+            <a:r>
+              <a:rPr lang="en-US" b="1" dirty="0">
+                <a:latin typeface="Times New Roman" panose="02020603050405020304" pitchFamily="18" charset="0"/>
+                <a:cs typeface="Times New Roman" panose="02020603050405020304" pitchFamily="18" charset="0"/>
+              </a:rPr>
+              <a:t>Key Components:</a:t>
+            </a:r>
+            <a:endParaRPr lang="en-US" dirty="0">
+              <a:latin typeface="Times New Roman" panose="02020603050405020304" pitchFamily="18" charset="0"/>
+              <a:cs typeface="Times New Roman" panose="02020603050405020304" pitchFamily="18" charset="0"/>
+            </a:endParaRPr>
+          </a:p>
+          <a:p>
+            <a:pPr lvl="1"/>
+            <a:r>
+              <a:rPr lang="en-US" b="1" dirty="0">
+                <a:latin typeface="Times New Roman" panose="02020603050405020304" pitchFamily="18" charset="0"/>
+                <a:cs typeface="Times New Roman" panose="02020603050405020304" pitchFamily="18" charset="0"/>
+              </a:rPr>
+              <a:t>Data Collection:</a:t>
+            </a:r>
+            <a:r>
+              <a:rPr lang="en-US" dirty="0">
+                <a:latin typeface="Times New Roman" panose="02020603050405020304" pitchFamily="18" charset="0"/>
+                <a:cs typeface="Times New Roman" panose="02020603050405020304" pitchFamily="18" charset="0"/>
+              </a:rPr>
+              <a:t> Gather large-scale datasets from various sources like books, websites, or text documents.</a:t>
+            </a:r>
+          </a:p>
+          <a:p>
+            <a:pPr lvl="1"/>
+            <a:r>
+              <a:rPr lang="en-US" b="1" dirty="0">
+                <a:latin typeface="Times New Roman" panose="02020603050405020304" pitchFamily="18" charset="0"/>
+                <a:cs typeface="Times New Roman" panose="02020603050405020304" pitchFamily="18" charset="0"/>
+              </a:rPr>
+              <a:t>Data Cleaning:</a:t>
+            </a:r>
+            <a:r>
+              <a:rPr lang="en-US" dirty="0">
+                <a:latin typeface="Times New Roman" panose="02020603050405020304" pitchFamily="18" charset="0"/>
+                <a:cs typeface="Times New Roman" panose="02020603050405020304" pitchFamily="18" charset="0"/>
+              </a:rPr>
+              <a:t> Clean the data by removing noise (e.g., special characters, incomplete sentences) and handling missing data or outliers. Preprocessing is crucial to ensure the model doesn't learn from noisy data.</a:t>
+            </a:r>
+          </a:p>
+          <a:p>
+            <a:pPr lvl="1"/>
+            <a:r>
+              <a:rPr lang="en-US" b="1" dirty="0">
+                <a:latin typeface="Times New Roman" panose="02020603050405020304" pitchFamily="18" charset="0"/>
+                <a:cs typeface="Times New Roman" panose="02020603050405020304" pitchFamily="18" charset="0"/>
+              </a:rPr>
+              <a:t>Tokenization:</a:t>
+            </a:r>
+            <a:r>
+              <a:rPr lang="en-US" dirty="0">
+                <a:latin typeface="Times New Roman" panose="02020603050405020304" pitchFamily="18" charset="0"/>
+                <a:cs typeface="Times New Roman" panose="02020603050405020304" pitchFamily="18" charset="0"/>
+              </a:rPr>
+              <a:t> Convert the cleaned text into tokens (small units like words or </a:t>
+            </a:r>
+            <a:r>
+              <a:rPr lang="en-US" dirty="0" err="1">
+                <a:latin typeface="Times New Roman" panose="02020603050405020304" pitchFamily="18" charset="0"/>
+                <a:cs typeface="Times New Roman" panose="02020603050405020304" pitchFamily="18" charset="0"/>
+              </a:rPr>
+              <a:t>subwords</a:t>
+            </a:r>
+            <a:r>
+              <a:rPr lang="en-US" dirty="0">
+                <a:latin typeface="Times New Roman" panose="02020603050405020304" pitchFamily="18" charset="0"/>
+                <a:cs typeface="Times New Roman" panose="02020603050405020304" pitchFamily="18" charset="0"/>
+              </a:rPr>
+              <a:t>). This is done using tokenizers like </a:t>
+            </a:r>
+            <a:r>
+              <a:rPr lang="en-US" dirty="0">
+                <a:solidFill>
+                  <a:srgbClr val="FF0000"/>
+                </a:solidFill>
+                <a:latin typeface="Times New Roman" panose="02020603050405020304" pitchFamily="18" charset="0"/>
+                <a:cs typeface="Times New Roman" panose="02020603050405020304" pitchFamily="18" charset="0"/>
+              </a:rPr>
+              <a:t>Byte Pair Encoding (BPE) or </a:t>
+            </a:r>
+            <a:r>
+              <a:rPr lang="en-US" dirty="0" err="1">
+                <a:solidFill>
+                  <a:srgbClr val="FF0000"/>
+                </a:solidFill>
+                <a:latin typeface="Times New Roman" panose="02020603050405020304" pitchFamily="18" charset="0"/>
+                <a:cs typeface="Times New Roman" panose="02020603050405020304" pitchFamily="18" charset="0"/>
+              </a:rPr>
+              <a:t>WordPiece</a:t>
+            </a:r>
+            <a:r>
+              <a:rPr lang="en-US" dirty="0">
+                <a:latin typeface="Times New Roman" panose="02020603050405020304" pitchFamily="18" charset="0"/>
+                <a:cs typeface="Times New Roman" panose="02020603050405020304" pitchFamily="18" charset="0"/>
+              </a:rPr>
+              <a:t>. The tokenization process breaks the text into manageable chunks and assigns each token a unique index.</a:t>
+            </a:r>
+          </a:p>
+          <a:p>
+            <a:pPr lvl="1"/>
+            <a:r>
+              <a:rPr lang="en-US" b="1" dirty="0">
+                <a:latin typeface="Times New Roman" panose="02020603050405020304" pitchFamily="18" charset="0"/>
+                <a:cs typeface="Times New Roman" panose="02020603050405020304" pitchFamily="18" charset="0"/>
+              </a:rPr>
+              <a:t>Outcome:</a:t>
+            </a:r>
+            <a:r>
+              <a:rPr lang="en-US" dirty="0">
+                <a:latin typeface="Times New Roman" panose="02020603050405020304" pitchFamily="18" charset="0"/>
+                <a:cs typeface="Times New Roman" panose="02020603050405020304" pitchFamily="18" charset="0"/>
+              </a:rPr>
+              <a:t> The raw text is converted into numerical data (tokens) that the model can understand and use for training.</a:t>
+            </a:r>
+          </a:p>
+          <a:p>
+            <a:endParaRPr lang="en-IN" dirty="0"/>
+          </a:p>
+        </p:txBody>
+      </p:sp>
+    </p:spTree>
+    <p:extLst>
+      <p:ext uri="{BB962C8B-B14F-4D97-AF65-F5344CB8AC3E}">
+        <p14:creationId xmlns:p14="http://schemas.microsoft.com/office/powerpoint/2010/main" val="3143340735"/>
       </p:ext>
     </p:extLst>
   </p:cSld>

</xml_diff>